<commit_message>
Newcokb3d: WIP: run estimation, manual updates.
</commit_message>
<xml_diff>
--- a/docs/figures.pptx
+++ b/docs/figures.pptx
@@ -6,6 +6,7 @@
   </p:sldMasterIdLst>
   <p:sldIdLst>
     <p:sldId id="256" r:id="rId2"/>
+    <p:sldId id="257" r:id="rId3"/>
   </p:sldIdLst>
   <p:sldSz cx="12192000" cy="6858000"/>
   <p:notesSz cx="6858000" cy="9144000"/>
@@ -104,6 +105,11 @@
       </a:defRPr>
     </a:lvl9pPr>
   </p:defaultTextStyle>
+  <p:extLst>
+    <p:ext uri="{EFAFB233-063F-42B5-8137-9DF3F51BA10A}">
+      <p15:sldGuideLst xmlns:p15="http://schemas.microsoft.com/office/powerpoint/2012/main"/>
+    </p:ext>
+  </p:extLst>
 </p:presentation>
 </file>
 
@@ -238,7 +244,7 @@
           <a:p>
             <a:fld id="{5827CF75-21ED-4285-9C22-184A8788EFA2}" type="datetimeFigureOut">
               <a:rPr lang="pt-BR" smtClean="0"/>
-              <a:t>15/11/2016</a:t>
+              <a:t>31/12/2017</a:t>
             </a:fld>
             <a:endParaRPr lang="pt-BR"/>
           </a:p>
@@ -408,7 +414,7 @@
           <a:p>
             <a:fld id="{5827CF75-21ED-4285-9C22-184A8788EFA2}" type="datetimeFigureOut">
               <a:rPr lang="pt-BR" smtClean="0"/>
-              <a:t>15/11/2016</a:t>
+              <a:t>31/12/2017</a:t>
             </a:fld>
             <a:endParaRPr lang="pt-BR"/>
           </a:p>
@@ -588,7 +594,7 @@
           <a:p>
             <a:fld id="{5827CF75-21ED-4285-9C22-184A8788EFA2}" type="datetimeFigureOut">
               <a:rPr lang="pt-BR" smtClean="0"/>
-              <a:t>15/11/2016</a:t>
+              <a:t>31/12/2017</a:t>
             </a:fld>
             <a:endParaRPr lang="pt-BR"/>
           </a:p>
@@ -758,7 +764,7 @@
           <a:p>
             <a:fld id="{5827CF75-21ED-4285-9C22-184A8788EFA2}" type="datetimeFigureOut">
               <a:rPr lang="pt-BR" smtClean="0"/>
-              <a:t>15/11/2016</a:t>
+              <a:t>31/12/2017</a:t>
             </a:fld>
             <a:endParaRPr lang="pt-BR"/>
           </a:p>
@@ -1004,7 +1010,7 @@
           <a:p>
             <a:fld id="{5827CF75-21ED-4285-9C22-184A8788EFA2}" type="datetimeFigureOut">
               <a:rPr lang="pt-BR" smtClean="0"/>
-              <a:t>15/11/2016</a:t>
+              <a:t>31/12/2017</a:t>
             </a:fld>
             <a:endParaRPr lang="pt-BR"/>
           </a:p>
@@ -1236,7 +1242,7 @@
           <a:p>
             <a:fld id="{5827CF75-21ED-4285-9C22-184A8788EFA2}" type="datetimeFigureOut">
               <a:rPr lang="pt-BR" smtClean="0"/>
-              <a:t>15/11/2016</a:t>
+              <a:t>31/12/2017</a:t>
             </a:fld>
             <a:endParaRPr lang="pt-BR"/>
           </a:p>
@@ -1603,7 +1609,7 @@
           <a:p>
             <a:fld id="{5827CF75-21ED-4285-9C22-184A8788EFA2}" type="datetimeFigureOut">
               <a:rPr lang="pt-BR" smtClean="0"/>
-              <a:t>15/11/2016</a:t>
+              <a:t>31/12/2017</a:t>
             </a:fld>
             <a:endParaRPr lang="pt-BR"/>
           </a:p>
@@ -1721,7 +1727,7 @@
           <a:p>
             <a:fld id="{5827CF75-21ED-4285-9C22-184A8788EFA2}" type="datetimeFigureOut">
               <a:rPr lang="pt-BR" smtClean="0"/>
-              <a:t>15/11/2016</a:t>
+              <a:t>31/12/2017</a:t>
             </a:fld>
             <a:endParaRPr lang="pt-BR"/>
           </a:p>
@@ -1816,7 +1822,7 @@
           <a:p>
             <a:fld id="{5827CF75-21ED-4285-9C22-184A8788EFA2}" type="datetimeFigureOut">
               <a:rPr lang="pt-BR" smtClean="0"/>
-              <a:t>15/11/2016</a:t>
+              <a:t>31/12/2017</a:t>
             </a:fld>
             <a:endParaRPr lang="pt-BR"/>
           </a:p>
@@ -2093,7 +2099,7 @@
           <a:p>
             <a:fld id="{5827CF75-21ED-4285-9C22-184A8788EFA2}" type="datetimeFigureOut">
               <a:rPr lang="pt-BR" smtClean="0"/>
-              <a:t>15/11/2016</a:t>
+              <a:t>31/12/2017</a:t>
             </a:fld>
             <a:endParaRPr lang="pt-BR"/>
           </a:p>
@@ -2346,7 +2352,7 @@
           <a:p>
             <a:fld id="{5827CF75-21ED-4285-9C22-184A8788EFA2}" type="datetimeFigureOut">
               <a:rPr lang="pt-BR" smtClean="0"/>
-              <a:t>15/11/2016</a:t>
+              <a:t>31/12/2017</a:t>
             </a:fld>
             <a:endParaRPr lang="pt-BR"/>
           </a:p>
@@ -2559,7 +2565,7 @@
           <a:p>
             <a:fld id="{5827CF75-21ED-4285-9C22-184A8788EFA2}" type="datetimeFigureOut">
               <a:rPr lang="pt-BR" smtClean="0"/>
-              <a:t>15/11/2016</a:t>
+              <a:t>31/12/2017</a:t>
             </a:fld>
             <a:endParaRPr lang="pt-BR"/>
           </a:p>
@@ -3782,7 +3788,7 @@
         <p:spPr>
           <a:xfrm>
             <a:off x="2071089" y="2202872"/>
-            <a:ext cx="1815112" cy="369332"/>
+            <a:ext cx="1936941" cy="369332"/>
           </a:xfrm>
           <a:prstGeom prst="rect">
             <a:avLst/>
@@ -3801,11 +3807,15 @@
             </a:r>
             <a:r>
               <a:rPr lang="pt-BR" dirty="0" err="1" smtClean="0"/>
-              <a:t>bouding</a:t>
+              <a:t>bounding</a:t>
             </a:r>
             <a:r>
               <a:rPr lang="pt-BR" dirty="0" smtClean="0"/>
-              <a:t> box</a:t>
+              <a:t> </a:t>
+            </a:r>
+            <a:r>
+              <a:rPr lang="pt-BR" dirty="0" smtClean="0"/>
+              <a:t>box</a:t>
             </a:r>
             <a:endParaRPr lang="pt-BR" dirty="0"/>
           </a:p>
@@ -3973,8 +3983,8 @@
         </p:nvCxnSpPr>
         <p:spPr>
           <a:xfrm>
-            <a:off x="3886201" y="2387538"/>
-            <a:ext cx="875803" cy="120551"/>
+            <a:off x="4008030" y="2387538"/>
+            <a:ext cx="753974" cy="120551"/>
           </a:xfrm>
           <a:prstGeom prst="straightConnector1">
             <a:avLst/>
@@ -4037,6 +4047,2537 @@
     <p:extLst>
       <p:ext uri="{BB962C8B-B14F-4D97-AF65-F5344CB8AC3E}">
         <p14:creationId xmlns:p14="http://schemas.microsoft.com/office/powerpoint/2010/main" val="2117222638"/>
+      </p:ext>
+    </p:extLst>
+  </p:cSld>
+  <p:clrMapOvr>
+    <a:masterClrMapping/>
+  </p:clrMapOvr>
+</p:sld>
+</file>
+
+<file path=ppt/slides/slide2.xml><?xml version="1.0" encoding="utf-8"?>
+<p:sld xmlns:a="http://schemas.openxmlformats.org/drawingml/2006/main" xmlns:r="http://schemas.openxmlformats.org/officeDocument/2006/relationships" xmlns:p="http://schemas.openxmlformats.org/presentationml/2006/main">
+  <p:cSld>
+    <p:spTree>
+      <p:nvGrpSpPr>
+        <p:cNvPr id="1" name=""/>
+        <p:cNvGrpSpPr/>
+        <p:nvPr/>
+      </p:nvGrpSpPr>
+      <p:grpSpPr>
+        <a:xfrm>
+          <a:off x="0" y="0"/>
+          <a:ext cx="0" cy="0"/>
+          <a:chOff x="0" y="0"/>
+          <a:chExt cx="0" cy="0"/>
+        </a:xfrm>
+      </p:grpSpPr>
+      <p:grpSp>
+        <p:nvGrpSpPr>
+          <p:cNvPr id="2" name="Grupo 1"/>
+          <p:cNvGrpSpPr/>
+          <p:nvPr/>
+        </p:nvGrpSpPr>
+        <p:grpSpPr>
+          <a:xfrm>
+            <a:off x="1900052" y="1223158"/>
+            <a:ext cx="3740727" cy="1256808"/>
+            <a:chOff x="1104407" y="1472540"/>
+            <a:chExt cx="3740727" cy="3740726"/>
+          </a:xfrm>
+        </p:grpSpPr>
+        <p:sp>
+          <p:nvSpPr>
+            <p:cNvPr id="4" name="Retângulo 3"/>
+            <p:cNvSpPr/>
+            <p:nvPr/>
+          </p:nvSpPr>
+          <p:spPr>
+            <a:xfrm>
+              <a:off x="1104408" y="1472540"/>
+              <a:ext cx="1246909" cy="1246909"/>
+            </a:xfrm>
+            <a:prstGeom prst="rect">
+              <a:avLst/>
+            </a:prstGeom>
+            <a:noFill/>
+          </p:spPr>
+          <p:style>
+            <a:lnRef idx="2">
+              <a:schemeClr val="accent1">
+                <a:shade val="50000"/>
+              </a:schemeClr>
+            </a:lnRef>
+            <a:fillRef idx="1">
+              <a:schemeClr val="accent1"/>
+            </a:fillRef>
+            <a:effectRef idx="0">
+              <a:schemeClr val="accent1"/>
+            </a:effectRef>
+            <a:fontRef idx="minor">
+              <a:schemeClr val="lt1"/>
+            </a:fontRef>
+          </p:style>
+          <p:txBody>
+            <a:bodyPr rtlCol="0" anchor="ctr"/>
+            <a:lstStyle/>
+            <a:p>
+              <a:pPr algn="ctr"/>
+              <a:endParaRPr lang="pt-BR"/>
+            </a:p>
+          </p:txBody>
+        </p:sp>
+        <p:sp>
+          <p:nvSpPr>
+            <p:cNvPr id="5" name="Retângulo 4"/>
+            <p:cNvSpPr/>
+            <p:nvPr/>
+          </p:nvSpPr>
+          <p:spPr>
+            <a:xfrm>
+              <a:off x="2351317" y="1472540"/>
+              <a:ext cx="1246909" cy="1246909"/>
+            </a:xfrm>
+            <a:prstGeom prst="rect">
+              <a:avLst/>
+            </a:prstGeom>
+            <a:noFill/>
+          </p:spPr>
+          <p:style>
+            <a:lnRef idx="2">
+              <a:schemeClr val="accent1">
+                <a:shade val="50000"/>
+              </a:schemeClr>
+            </a:lnRef>
+            <a:fillRef idx="1">
+              <a:schemeClr val="accent1"/>
+            </a:fillRef>
+            <a:effectRef idx="0">
+              <a:schemeClr val="accent1"/>
+            </a:effectRef>
+            <a:fontRef idx="minor">
+              <a:schemeClr val="lt1"/>
+            </a:fontRef>
+          </p:style>
+          <p:txBody>
+            <a:bodyPr rtlCol="0" anchor="ctr"/>
+            <a:lstStyle/>
+            <a:p>
+              <a:pPr algn="ctr"/>
+              <a:endParaRPr lang="pt-BR"/>
+            </a:p>
+          </p:txBody>
+        </p:sp>
+        <p:sp>
+          <p:nvSpPr>
+            <p:cNvPr id="6" name="Retângulo 5"/>
+            <p:cNvSpPr/>
+            <p:nvPr/>
+          </p:nvSpPr>
+          <p:spPr>
+            <a:xfrm>
+              <a:off x="1104407" y="2719449"/>
+              <a:ext cx="1246909" cy="1246909"/>
+            </a:xfrm>
+            <a:prstGeom prst="rect">
+              <a:avLst/>
+            </a:prstGeom>
+            <a:noFill/>
+          </p:spPr>
+          <p:style>
+            <a:lnRef idx="2">
+              <a:schemeClr val="accent1">
+                <a:shade val="50000"/>
+              </a:schemeClr>
+            </a:lnRef>
+            <a:fillRef idx="1">
+              <a:schemeClr val="accent1"/>
+            </a:fillRef>
+            <a:effectRef idx="0">
+              <a:schemeClr val="accent1"/>
+            </a:effectRef>
+            <a:fontRef idx="minor">
+              <a:schemeClr val="lt1"/>
+            </a:fontRef>
+          </p:style>
+          <p:txBody>
+            <a:bodyPr rtlCol="0" anchor="ctr"/>
+            <a:lstStyle/>
+            <a:p>
+              <a:pPr algn="ctr"/>
+              <a:endParaRPr lang="pt-BR"/>
+            </a:p>
+          </p:txBody>
+        </p:sp>
+        <p:sp>
+          <p:nvSpPr>
+            <p:cNvPr id="7" name="Retângulo 6"/>
+            <p:cNvSpPr/>
+            <p:nvPr/>
+          </p:nvSpPr>
+          <p:spPr>
+            <a:xfrm>
+              <a:off x="2351316" y="2719448"/>
+              <a:ext cx="1246909" cy="1246909"/>
+            </a:xfrm>
+            <a:prstGeom prst="rect">
+              <a:avLst/>
+            </a:prstGeom>
+            <a:noFill/>
+          </p:spPr>
+          <p:style>
+            <a:lnRef idx="2">
+              <a:schemeClr val="accent1">
+                <a:shade val="50000"/>
+              </a:schemeClr>
+            </a:lnRef>
+            <a:fillRef idx="1">
+              <a:schemeClr val="accent1"/>
+            </a:fillRef>
+            <a:effectRef idx="0">
+              <a:schemeClr val="accent1"/>
+            </a:effectRef>
+            <a:fontRef idx="minor">
+              <a:schemeClr val="lt1"/>
+            </a:fontRef>
+          </p:style>
+          <p:txBody>
+            <a:bodyPr rtlCol="0" anchor="ctr"/>
+            <a:lstStyle/>
+            <a:p>
+              <a:pPr algn="ctr"/>
+              <a:endParaRPr lang="pt-BR"/>
+            </a:p>
+          </p:txBody>
+        </p:sp>
+        <p:sp>
+          <p:nvSpPr>
+            <p:cNvPr id="8" name="Retângulo 7"/>
+            <p:cNvSpPr/>
+            <p:nvPr/>
+          </p:nvSpPr>
+          <p:spPr>
+            <a:xfrm>
+              <a:off x="1104407" y="3966357"/>
+              <a:ext cx="1246909" cy="1246909"/>
+            </a:xfrm>
+            <a:prstGeom prst="rect">
+              <a:avLst/>
+            </a:prstGeom>
+            <a:noFill/>
+          </p:spPr>
+          <p:style>
+            <a:lnRef idx="2">
+              <a:schemeClr val="accent1">
+                <a:shade val="50000"/>
+              </a:schemeClr>
+            </a:lnRef>
+            <a:fillRef idx="1">
+              <a:schemeClr val="accent1"/>
+            </a:fillRef>
+            <a:effectRef idx="0">
+              <a:schemeClr val="accent1"/>
+            </a:effectRef>
+            <a:fontRef idx="minor">
+              <a:schemeClr val="lt1"/>
+            </a:fontRef>
+          </p:style>
+          <p:txBody>
+            <a:bodyPr rtlCol="0" anchor="ctr"/>
+            <a:lstStyle/>
+            <a:p>
+              <a:pPr algn="ctr"/>
+              <a:endParaRPr lang="pt-BR"/>
+            </a:p>
+          </p:txBody>
+        </p:sp>
+        <p:sp>
+          <p:nvSpPr>
+            <p:cNvPr id="9" name="Retângulo 8"/>
+            <p:cNvSpPr/>
+            <p:nvPr/>
+          </p:nvSpPr>
+          <p:spPr>
+            <a:xfrm>
+              <a:off x="2351316" y="3966356"/>
+              <a:ext cx="1246909" cy="1246909"/>
+            </a:xfrm>
+            <a:prstGeom prst="rect">
+              <a:avLst/>
+            </a:prstGeom>
+            <a:noFill/>
+          </p:spPr>
+          <p:style>
+            <a:lnRef idx="2">
+              <a:schemeClr val="accent1">
+                <a:shade val="50000"/>
+              </a:schemeClr>
+            </a:lnRef>
+            <a:fillRef idx="1">
+              <a:schemeClr val="accent1"/>
+            </a:fillRef>
+            <a:effectRef idx="0">
+              <a:schemeClr val="accent1"/>
+            </a:effectRef>
+            <a:fontRef idx="minor">
+              <a:schemeClr val="lt1"/>
+            </a:fontRef>
+          </p:style>
+          <p:txBody>
+            <a:bodyPr rtlCol="0" anchor="ctr"/>
+            <a:lstStyle/>
+            <a:p>
+              <a:pPr algn="ctr"/>
+              <a:endParaRPr lang="pt-BR"/>
+            </a:p>
+          </p:txBody>
+        </p:sp>
+        <p:sp>
+          <p:nvSpPr>
+            <p:cNvPr id="12" name="Retângulo 11"/>
+            <p:cNvSpPr/>
+            <p:nvPr/>
+          </p:nvSpPr>
+          <p:spPr>
+            <a:xfrm>
+              <a:off x="3598225" y="1472540"/>
+              <a:ext cx="1246909" cy="1246909"/>
+            </a:xfrm>
+            <a:prstGeom prst="rect">
+              <a:avLst/>
+            </a:prstGeom>
+            <a:noFill/>
+          </p:spPr>
+          <p:style>
+            <a:lnRef idx="2">
+              <a:schemeClr val="accent1">
+                <a:shade val="50000"/>
+              </a:schemeClr>
+            </a:lnRef>
+            <a:fillRef idx="1">
+              <a:schemeClr val="accent1"/>
+            </a:fillRef>
+            <a:effectRef idx="0">
+              <a:schemeClr val="accent1"/>
+            </a:effectRef>
+            <a:fontRef idx="minor">
+              <a:schemeClr val="lt1"/>
+            </a:fontRef>
+          </p:style>
+          <p:txBody>
+            <a:bodyPr rtlCol="0" anchor="ctr"/>
+            <a:lstStyle/>
+            <a:p>
+              <a:pPr algn="ctr"/>
+              <a:endParaRPr lang="pt-BR"/>
+            </a:p>
+          </p:txBody>
+        </p:sp>
+        <p:sp>
+          <p:nvSpPr>
+            <p:cNvPr id="13" name="Retângulo 12"/>
+            <p:cNvSpPr/>
+            <p:nvPr/>
+          </p:nvSpPr>
+          <p:spPr>
+            <a:xfrm>
+              <a:off x="3598224" y="2719448"/>
+              <a:ext cx="1246909" cy="1246909"/>
+            </a:xfrm>
+            <a:prstGeom prst="rect">
+              <a:avLst/>
+            </a:prstGeom>
+            <a:noFill/>
+          </p:spPr>
+          <p:style>
+            <a:lnRef idx="2">
+              <a:schemeClr val="accent1">
+                <a:shade val="50000"/>
+              </a:schemeClr>
+            </a:lnRef>
+            <a:fillRef idx="1">
+              <a:schemeClr val="accent1"/>
+            </a:fillRef>
+            <a:effectRef idx="0">
+              <a:schemeClr val="accent1"/>
+            </a:effectRef>
+            <a:fontRef idx="minor">
+              <a:schemeClr val="lt1"/>
+            </a:fontRef>
+          </p:style>
+          <p:txBody>
+            <a:bodyPr rtlCol="0" anchor="ctr"/>
+            <a:lstStyle/>
+            <a:p>
+              <a:pPr algn="ctr"/>
+              <a:endParaRPr lang="pt-BR"/>
+            </a:p>
+          </p:txBody>
+        </p:sp>
+        <p:sp>
+          <p:nvSpPr>
+            <p:cNvPr id="14" name="Retângulo 13"/>
+            <p:cNvSpPr/>
+            <p:nvPr/>
+          </p:nvSpPr>
+          <p:spPr>
+            <a:xfrm>
+              <a:off x="3598224" y="3966356"/>
+              <a:ext cx="1246909" cy="1246909"/>
+            </a:xfrm>
+            <a:prstGeom prst="rect">
+              <a:avLst/>
+            </a:prstGeom>
+            <a:noFill/>
+          </p:spPr>
+          <p:style>
+            <a:lnRef idx="2">
+              <a:schemeClr val="accent1">
+                <a:shade val="50000"/>
+              </a:schemeClr>
+            </a:lnRef>
+            <a:fillRef idx="1">
+              <a:schemeClr val="accent1"/>
+            </a:fillRef>
+            <a:effectRef idx="0">
+              <a:schemeClr val="accent1"/>
+            </a:effectRef>
+            <a:fontRef idx="minor">
+              <a:schemeClr val="lt1"/>
+            </a:fontRef>
+          </p:style>
+          <p:txBody>
+            <a:bodyPr rtlCol="0" anchor="ctr"/>
+            <a:lstStyle/>
+            <a:p>
+              <a:pPr algn="ctr"/>
+              <a:endParaRPr lang="pt-BR"/>
+            </a:p>
+          </p:txBody>
+        </p:sp>
+      </p:grpSp>
+      <p:sp>
+        <p:nvSpPr>
+          <p:cNvPr id="16" name="Elipse 15"/>
+          <p:cNvSpPr/>
+          <p:nvPr/>
+        </p:nvSpPr>
+        <p:spPr>
+          <a:xfrm>
+            <a:off x="4280064" y="1142017"/>
+            <a:ext cx="213756" cy="213756"/>
+          </a:xfrm>
+          <a:prstGeom prst="ellipse">
+            <a:avLst/>
+          </a:prstGeom>
+        </p:spPr>
+        <p:style>
+          <a:lnRef idx="2">
+            <a:schemeClr val="accent1">
+              <a:shade val="50000"/>
+            </a:schemeClr>
+          </a:lnRef>
+          <a:fillRef idx="1">
+            <a:schemeClr val="accent1"/>
+          </a:fillRef>
+          <a:effectRef idx="0">
+            <a:schemeClr val="accent1"/>
+          </a:effectRef>
+          <a:fontRef idx="minor">
+            <a:schemeClr val="lt1"/>
+          </a:fontRef>
+        </p:style>
+        <p:txBody>
+          <a:bodyPr rtlCol="0" anchor="ctr"/>
+          <a:lstStyle/>
+          <a:p>
+            <a:pPr algn="ctr"/>
+            <a:endParaRPr lang="pt-BR"/>
+          </a:p>
+        </p:txBody>
+      </p:sp>
+      <p:sp>
+        <p:nvSpPr>
+          <p:cNvPr id="17" name="Elipse 16"/>
+          <p:cNvSpPr/>
+          <p:nvPr/>
+        </p:nvSpPr>
+        <p:spPr>
+          <a:xfrm>
+            <a:off x="4099955" y="1878526"/>
+            <a:ext cx="213756" cy="213756"/>
+          </a:xfrm>
+          <a:prstGeom prst="ellipse">
+            <a:avLst/>
+          </a:prstGeom>
+        </p:spPr>
+        <p:style>
+          <a:lnRef idx="2">
+            <a:schemeClr val="accent1">
+              <a:shade val="50000"/>
+            </a:schemeClr>
+          </a:lnRef>
+          <a:fillRef idx="1">
+            <a:schemeClr val="accent1"/>
+          </a:fillRef>
+          <a:effectRef idx="0">
+            <a:schemeClr val="accent1"/>
+          </a:effectRef>
+          <a:fontRef idx="minor">
+            <a:schemeClr val="lt1"/>
+          </a:fontRef>
+        </p:style>
+        <p:txBody>
+          <a:bodyPr rtlCol="0" anchor="ctr"/>
+          <a:lstStyle/>
+          <a:p>
+            <a:pPr algn="ctr"/>
+            <a:endParaRPr lang="pt-BR"/>
+          </a:p>
+        </p:txBody>
+      </p:sp>
+      <p:sp>
+        <p:nvSpPr>
+          <p:cNvPr id="20" name="Elipse 19"/>
+          <p:cNvSpPr/>
+          <p:nvPr/>
+        </p:nvSpPr>
+        <p:spPr>
+          <a:xfrm>
+            <a:off x="3933699" y="2750620"/>
+            <a:ext cx="213756" cy="213756"/>
+          </a:xfrm>
+          <a:prstGeom prst="ellipse">
+            <a:avLst/>
+          </a:prstGeom>
+        </p:spPr>
+        <p:style>
+          <a:lnRef idx="2">
+            <a:schemeClr val="accent1">
+              <a:shade val="50000"/>
+            </a:schemeClr>
+          </a:lnRef>
+          <a:fillRef idx="1">
+            <a:schemeClr val="accent1"/>
+          </a:fillRef>
+          <a:effectRef idx="0">
+            <a:schemeClr val="accent1"/>
+          </a:effectRef>
+          <a:fontRef idx="minor">
+            <a:schemeClr val="lt1"/>
+          </a:fontRef>
+        </p:style>
+        <p:txBody>
+          <a:bodyPr rtlCol="0" anchor="ctr"/>
+          <a:lstStyle/>
+          <a:p>
+            <a:pPr algn="ctr"/>
+            <a:endParaRPr lang="pt-BR"/>
+          </a:p>
+        </p:txBody>
+      </p:sp>
+      <p:sp>
+        <p:nvSpPr>
+          <p:cNvPr id="22" name="Elipse 21"/>
+          <p:cNvSpPr/>
+          <p:nvPr/>
+        </p:nvSpPr>
+        <p:spPr>
+          <a:xfrm>
+            <a:off x="3283529" y="4885209"/>
+            <a:ext cx="213756" cy="213756"/>
+          </a:xfrm>
+          <a:prstGeom prst="ellipse">
+            <a:avLst/>
+          </a:prstGeom>
+        </p:spPr>
+        <p:style>
+          <a:lnRef idx="2">
+            <a:schemeClr val="accent1">
+              <a:shade val="50000"/>
+            </a:schemeClr>
+          </a:lnRef>
+          <a:fillRef idx="1">
+            <a:schemeClr val="accent1"/>
+          </a:fillRef>
+          <a:effectRef idx="0">
+            <a:schemeClr val="accent1"/>
+          </a:effectRef>
+          <a:fontRef idx="minor">
+            <a:schemeClr val="lt1"/>
+          </a:fontRef>
+        </p:style>
+        <p:txBody>
+          <a:bodyPr rtlCol="0" anchor="ctr"/>
+          <a:lstStyle/>
+          <a:p>
+            <a:pPr algn="ctr"/>
+            <a:endParaRPr lang="pt-BR"/>
+          </a:p>
+        </p:txBody>
+      </p:sp>
+      <p:sp>
+        <p:nvSpPr>
+          <p:cNvPr id="23" name="Elipse 22"/>
+          <p:cNvSpPr/>
+          <p:nvPr/>
+        </p:nvSpPr>
+        <p:spPr>
+          <a:xfrm>
+            <a:off x="3675412" y="3816429"/>
+            <a:ext cx="213756" cy="213756"/>
+          </a:xfrm>
+          <a:prstGeom prst="ellipse">
+            <a:avLst/>
+          </a:prstGeom>
+        </p:spPr>
+        <p:style>
+          <a:lnRef idx="2">
+            <a:schemeClr val="accent1">
+              <a:shade val="50000"/>
+            </a:schemeClr>
+          </a:lnRef>
+          <a:fillRef idx="1">
+            <a:schemeClr val="accent1"/>
+          </a:fillRef>
+          <a:effectRef idx="0">
+            <a:schemeClr val="accent1"/>
+          </a:effectRef>
+          <a:fontRef idx="minor">
+            <a:schemeClr val="lt1"/>
+          </a:fontRef>
+        </p:style>
+        <p:txBody>
+          <a:bodyPr rtlCol="0" anchor="ctr"/>
+          <a:lstStyle/>
+          <a:p>
+            <a:pPr algn="ctr"/>
+            <a:endParaRPr lang="pt-BR"/>
+          </a:p>
+        </p:txBody>
+      </p:sp>
+      <p:sp>
+        <p:nvSpPr>
+          <p:cNvPr id="33" name="Retângulo 32"/>
+          <p:cNvSpPr/>
+          <p:nvPr/>
+        </p:nvSpPr>
+        <p:spPr>
+          <a:xfrm>
+            <a:off x="6624446" y="1256812"/>
+            <a:ext cx="1246909" cy="1246909"/>
+          </a:xfrm>
+          <a:prstGeom prst="rect">
+            <a:avLst/>
+          </a:prstGeom>
+          <a:noFill/>
+        </p:spPr>
+        <p:style>
+          <a:lnRef idx="2">
+            <a:schemeClr val="accent1">
+              <a:shade val="50000"/>
+            </a:schemeClr>
+          </a:lnRef>
+          <a:fillRef idx="1">
+            <a:schemeClr val="accent1"/>
+          </a:fillRef>
+          <a:effectRef idx="0">
+            <a:schemeClr val="accent1"/>
+          </a:effectRef>
+          <a:fontRef idx="minor">
+            <a:schemeClr val="lt1"/>
+          </a:fontRef>
+        </p:style>
+        <p:txBody>
+          <a:bodyPr rtlCol="0" anchor="ctr"/>
+          <a:lstStyle/>
+          <a:p>
+            <a:pPr algn="ctr"/>
+            <a:endParaRPr lang="pt-BR"/>
+          </a:p>
+        </p:txBody>
+      </p:sp>
+      <p:sp>
+        <p:nvSpPr>
+          <p:cNvPr id="36" name="Retângulo 35"/>
+          <p:cNvSpPr/>
+          <p:nvPr/>
+        </p:nvSpPr>
+        <p:spPr>
+          <a:xfrm>
+            <a:off x="7871355" y="1256812"/>
+            <a:ext cx="1246909" cy="1246909"/>
+          </a:xfrm>
+          <a:prstGeom prst="rect">
+            <a:avLst/>
+          </a:prstGeom>
+          <a:noFill/>
+        </p:spPr>
+        <p:style>
+          <a:lnRef idx="2">
+            <a:schemeClr val="accent1">
+              <a:shade val="50000"/>
+            </a:schemeClr>
+          </a:lnRef>
+          <a:fillRef idx="1">
+            <a:schemeClr val="accent1"/>
+          </a:fillRef>
+          <a:effectRef idx="0">
+            <a:schemeClr val="accent1"/>
+          </a:effectRef>
+          <a:fontRef idx="minor">
+            <a:schemeClr val="lt1"/>
+          </a:fontRef>
+        </p:style>
+        <p:txBody>
+          <a:bodyPr rtlCol="0" anchor="ctr"/>
+          <a:lstStyle/>
+          <a:p>
+            <a:pPr algn="ctr"/>
+            <a:endParaRPr lang="pt-BR"/>
+          </a:p>
+        </p:txBody>
+      </p:sp>
+      <p:sp>
+        <p:nvSpPr>
+          <p:cNvPr id="37" name="Retângulo 36"/>
+          <p:cNvSpPr/>
+          <p:nvPr/>
+        </p:nvSpPr>
+        <p:spPr>
+          <a:xfrm>
+            <a:off x="6624445" y="2503721"/>
+            <a:ext cx="1246909" cy="1246909"/>
+          </a:xfrm>
+          <a:prstGeom prst="rect">
+            <a:avLst/>
+          </a:prstGeom>
+          <a:noFill/>
+        </p:spPr>
+        <p:style>
+          <a:lnRef idx="2">
+            <a:schemeClr val="accent1">
+              <a:shade val="50000"/>
+            </a:schemeClr>
+          </a:lnRef>
+          <a:fillRef idx="1">
+            <a:schemeClr val="accent1"/>
+          </a:fillRef>
+          <a:effectRef idx="0">
+            <a:schemeClr val="accent1"/>
+          </a:effectRef>
+          <a:fontRef idx="minor">
+            <a:schemeClr val="lt1"/>
+          </a:fontRef>
+        </p:style>
+        <p:txBody>
+          <a:bodyPr rtlCol="0" anchor="ctr"/>
+          <a:lstStyle/>
+          <a:p>
+            <a:pPr algn="ctr"/>
+            <a:endParaRPr lang="pt-BR"/>
+          </a:p>
+        </p:txBody>
+      </p:sp>
+      <p:sp>
+        <p:nvSpPr>
+          <p:cNvPr id="39" name="Retângulo 38"/>
+          <p:cNvSpPr/>
+          <p:nvPr/>
+        </p:nvSpPr>
+        <p:spPr>
+          <a:xfrm>
+            <a:off x="7871354" y="2503720"/>
+            <a:ext cx="1246909" cy="1246909"/>
+          </a:xfrm>
+          <a:prstGeom prst="rect">
+            <a:avLst/>
+          </a:prstGeom>
+          <a:noFill/>
+        </p:spPr>
+        <p:style>
+          <a:lnRef idx="2">
+            <a:schemeClr val="accent1">
+              <a:shade val="50000"/>
+            </a:schemeClr>
+          </a:lnRef>
+          <a:fillRef idx="1">
+            <a:schemeClr val="accent1"/>
+          </a:fillRef>
+          <a:effectRef idx="0">
+            <a:schemeClr val="accent1"/>
+          </a:effectRef>
+          <a:fontRef idx="minor">
+            <a:schemeClr val="lt1"/>
+          </a:fontRef>
+        </p:style>
+        <p:txBody>
+          <a:bodyPr rtlCol="0" anchor="ctr"/>
+          <a:lstStyle/>
+          <a:p>
+            <a:pPr algn="ctr"/>
+            <a:endParaRPr lang="pt-BR"/>
+          </a:p>
+        </p:txBody>
+      </p:sp>
+      <p:sp>
+        <p:nvSpPr>
+          <p:cNvPr id="40" name="Retângulo 39"/>
+          <p:cNvSpPr/>
+          <p:nvPr/>
+        </p:nvSpPr>
+        <p:spPr>
+          <a:xfrm>
+            <a:off x="6624445" y="3750629"/>
+            <a:ext cx="1246909" cy="1246909"/>
+          </a:xfrm>
+          <a:prstGeom prst="rect">
+            <a:avLst/>
+          </a:prstGeom>
+          <a:noFill/>
+        </p:spPr>
+        <p:style>
+          <a:lnRef idx="2">
+            <a:schemeClr val="accent1">
+              <a:shade val="50000"/>
+            </a:schemeClr>
+          </a:lnRef>
+          <a:fillRef idx="1">
+            <a:schemeClr val="accent1"/>
+          </a:fillRef>
+          <a:effectRef idx="0">
+            <a:schemeClr val="accent1"/>
+          </a:effectRef>
+          <a:fontRef idx="minor">
+            <a:schemeClr val="lt1"/>
+          </a:fontRef>
+        </p:style>
+        <p:txBody>
+          <a:bodyPr rtlCol="0" anchor="ctr"/>
+          <a:lstStyle/>
+          <a:p>
+            <a:pPr algn="ctr"/>
+            <a:endParaRPr lang="pt-BR"/>
+          </a:p>
+        </p:txBody>
+      </p:sp>
+      <p:sp>
+        <p:nvSpPr>
+          <p:cNvPr id="42" name="Retângulo 41"/>
+          <p:cNvSpPr/>
+          <p:nvPr/>
+        </p:nvSpPr>
+        <p:spPr>
+          <a:xfrm>
+            <a:off x="7871354" y="3750628"/>
+            <a:ext cx="1246909" cy="1246909"/>
+          </a:xfrm>
+          <a:prstGeom prst="rect">
+            <a:avLst/>
+          </a:prstGeom>
+          <a:noFill/>
+        </p:spPr>
+        <p:style>
+          <a:lnRef idx="2">
+            <a:schemeClr val="accent1">
+              <a:shade val="50000"/>
+            </a:schemeClr>
+          </a:lnRef>
+          <a:fillRef idx="1">
+            <a:schemeClr val="accent1"/>
+          </a:fillRef>
+          <a:effectRef idx="0">
+            <a:schemeClr val="accent1"/>
+          </a:effectRef>
+          <a:fontRef idx="minor">
+            <a:schemeClr val="lt1"/>
+          </a:fontRef>
+        </p:style>
+        <p:txBody>
+          <a:bodyPr rtlCol="0" anchor="ctr"/>
+          <a:lstStyle/>
+          <a:p>
+            <a:pPr algn="ctr"/>
+            <a:endParaRPr lang="pt-BR"/>
+          </a:p>
+        </p:txBody>
+      </p:sp>
+      <p:sp>
+        <p:nvSpPr>
+          <p:cNvPr id="43" name="Retângulo 42"/>
+          <p:cNvSpPr/>
+          <p:nvPr/>
+        </p:nvSpPr>
+        <p:spPr>
+          <a:xfrm>
+            <a:off x="9118263" y="1256812"/>
+            <a:ext cx="1246909" cy="1246909"/>
+          </a:xfrm>
+          <a:prstGeom prst="rect">
+            <a:avLst/>
+          </a:prstGeom>
+          <a:noFill/>
+        </p:spPr>
+        <p:style>
+          <a:lnRef idx="2">
+            <a:schemeClr val="accent1">
+              <a:shade val="50000"/>
+            </a:schemeClr>
+          </a:lnRef>
+          <a:fillRef idx="1">
+            <a:schemeClr val="accent1"/>
+          </a:fillRef>
+          <a:effectRef idx="0">
+            <a:schemeClr val="accent1"/>
+          </a:effectRef>
+          <a:fontRef idx="minor">
+            <a:schemeClr val="lt1"/>
+          </a:fontRef>
+        </p:style>
+        <p:txBody>
+          <a:bodyPr rtlCol="0" anchor="ctr"/>
+          <a:lstStyle/>
+          <a:p>
+            <a:pPr algn="ctr"/>
+            <a:endParaRPr lang="pt-BR"/>
+          </a:p>
+        </p:txBody>
+      </p:sp>
+      <p:sp>
+        <p:nvSpPr>
+          <p:cNvPr id="44" name="Retângulo 43"/>
+          <p:cNvSpPr/>
+          <p:nvPr/>
+        </p:nvSpPr>
+        <p:spPr>
+          <a:xfrm>
+            <a:off x="9118262" y="2503720"/>
+            <a:ext cx="1246909" cy="1246909"/>
+          </a:xfrm>
+          <a:prstGeom prst="rect">
+            <a:avLst/>
+          </a:prstGeom>
+          <a:noFill/>
+        </p:spPr>
+        <p:style>
+          <a:lnRef idx="2">
+            <a:schemeClr val="accent1">
+              <a:shade val="50000"/>
+            </a:schemeClr>
+          </a:lnRef>
+          <a:fillRef idx="1">
+            <a:schemeClr val="accent1"/>
+          </a:fillRef>
+          <a:effectRef idx="0">
+            <a:schemeClr val="accent1"/>
+          </a:effectRef>
+          <a:fontRef idx="minor">
+            <a:schemeClr val="lt1"/>
+          </a:fontRef>
+        </p:style>
+        <p:txBody>
+          <a:bodyPr rtlCol="0" anchor="ctr"/>
+          <a:lstStyle/>
+          <a:p>
+            <a:pPr algn="ctr"/>
+            <a:endParaRPr lang="pt-BR"/>
+          </a:p>
+        </p:txBody>
+      </p:sp>
+      <p:sp>
+        <p:nvSpPr>
+          <p:cNvPr id="45" name="Retângulo 44"/>
+          <p:cNvSpPr/>
+          <p:nvPr/>
+        </p:nvSpPr>
+        <p:spPr>
+          <a:xfrm>
+            <a:off x="9118262" y="3750628"/>
+            <a:ext cx="1246909" cy="1246909"/>
+          </a:xfrm>
+          <a:prstGeom prst="rect">
+            <a:avLst/>
+          </a:prstGeom>
+          <a:noFill/>
+        </p:spPr>
+        <p:style>
+          <a:lnRef idx="2">
+            <a:schemeClr val="accent1">
+              <a:shade val="50000"/>
+            </a:schemeClr>
+          </a:lnRef>
+          <a:fillRef idx="1">
+            <a:schemeClr val="accent1"/>
+          </a:fillRef>
+          <a:effectRef idx="0">
+            <a:schemeClr val="accent1"/>
+          </a:effectRef>
+          <a:fontRef idx="minor">
+            <a:schemeClr val="lt1"/>
+          </a:fontRef>
+        </p:style>
+        <p:txBody>
+          <a:bodyPr rtlCol="0" anchor="ctr"/>
+          <a:lstStyle/>
+          <a:p>
+            <a:pPr algn="ctr"/>
+            <a:endParaRPr lang="pt-BR"/>
+          </a:p>
+        </p:txBody>
+      </p:sp>
+      <p:sp>
+        <p:nvSpPr>
+          <p:cNvPr id="46" name="Elipse 45"/>
+          <p:cNvSpPr/>
+          <p:nvPr/>
+        </p:nvSpPr>
+        <p:spPr>
+          <a:xfrm>
+            <a:off x="8487878" y="2318660"/>
+            <a:ext cx="213756" cy="213756"/>
+          </a:xfrm>
+          <a:prstGeom prst="ellipse">
+            <a:avLst/>
+          </a:prstGeom>
+        </p:spPr>
+        <p:style>
+          <a:lnRef idx="2">
+            <a:schemeClr val="accent1">
+              <a:shade val="50000"/>
+            </a:schemeClr>
+          </a:lnRef>
+          <a:fillRef idx="1">
+            <a:schemeClr val="accent1"/>
+          </a:fillRef>
+          <a:effectRef idx="0">
+            <a:schemeClr val="accent1"/>
+          </a:effectRef>
+          <a:fontRef idx="minor">
+            <a:schemeClr val="lt1"/>
+          </a:fontRef>
+        </p:style>
+        <p:txBody>
+          <a:bodyPr rtlCol="0" anchor="ctr"/>
+          <a:lstStyle/>
+          <a:p>
+            <a:pPr algn="ctr"/>
+            <a:endParaRPr lang="pt-BR"/>
+          </a:p>
+        </p:txBody>
+      </p:sp>
+      <p:sp>
+        <p:nvSpPr>
+          <p:cNvPr id="47" name="Elipse 46"/>
+          <p:cNvSpPr/>
+          <p:nvPr/>
+        </p:nvSpPr>
+        <p:spPr>
+          <a:xfrm>
+            <a:off x="8601686" y="1878526"/>
+            <a:ext cx="213756" cy="213756"/>
+          </a:xfrm>
+          <a:prstGeom prst="ellipse">
+            <a:avLst/>
+          </a:prstGeom>
+        </p:spPr>
+        <p:style>
+          <a:lnRef idx="2">
+            <a:schemeClr val="accent1">
+              <a:shade val="50000"/>
+            </a:schemeClr>
+          </a:lnRef>
+          <a:fillRef idx="1">
+            <a:schemeClr val="accent1"/>
+          </a:fillRef>
+          <a:effectRef idx="0">
+            <a:schemeClr val="accent1"/>
+          </a:effectRef>
+          <a:fontRef idx="minor">
+            <a:schemeClr val="lt1"/>
+          </a:fontRef>
+        </p:style>
+        <p:txBody>
+          <a:bodyPr rtlCol="0" anchor="ctr"/>
+          <a:lstStyle/>
+          <a:p>
+            <a:pPr algn="ctr"/>
+            <a:endParaRPr lang="pt-BR"/>
+          </a:p>
+        </p:txBody>
+      </p:sp>
+      <p:sp>
+        <p:nvSpPr>
+          <p:cNvPr id="48" name="Elipse 47"/>
+          <p:cNvSpPr/>
+          <p:nvPr/>
+        </p:nvSpPr>
+        <p:spPr>
+          <a:xfrm>
+            <a:off x="8708564" y="1393624"/>
+            <a:ext cx="213756" cy="213756"/>
+          </a:xfrm>
+          <a:prstGeom prst="ellipse">
+            <a:avLst/>
+          </a:prstGeom>
+        </p:spPr>
+        <p:style>
+          <a:lnRef idx="2">
+            <a:schemeClr val="accent1">
+              <a:shade val="50000"/>
+            </a:schemeClr>
+          </a:lnRef>
+          <a:fillRef idx="1">
+            <a:schemeClr val="accent1"/>
+          </a:fillRef>
+          <a:effectRef idx="0">
+            <a:schemeClr val="accent1"/>
+          </a:effectRef>
+          <a:fontRef idx="minor">
+            <a:schemeClr val="lt1"/>
+          </a:fontRef>
+        </p:style>
+        <p:txBody>
+          <a:bodyPr rtlCol="0" anchor="ctr"/>
+          <a:lstStyle/>
+          <a:p>
+            <a:pPr algn="ctr"/>
+            <a:endParaRPr lang="pt-BR"/>
+          </a:p>
+        </p:txBody>
+      </p:sp>
+      <p:sp>
+        <p:nvSpPr>
+          <p:cNvPr id="49" name="Elipse 48"/>
+          <p:cNvSpPr/>
+          <p:nvPr/>
+        </p:nvSpPr>
+        <p:spPr>
+          <a:xfrm>
+            <a:off x="8325576" y="3094655"/>
+            <a:ext cx="213756" cy="213756"/>
+          </a:xfrm>
+          <a:prstGeom prst="ellipse">
+            <a:avLst/>
+          </a:prstGeom>
+        </p:spPr>
+        <p:style>
+          <a:lnRef idx="2">
+            <a:schemeClr val="accent1">
+              <a:shade val="50000"/>
+            </a:schemeClr>
+          </a:lnRef>
+          <a:fillRef idx="1">
+            <a:schemeClr val="accent1"/>
+          </a:fillRef>
+          <a:effectRef idx="0">
+            <a:schemeClr val="accent1"/>
+          </a:effectRef>
+          <a:fontRef idx="minor">
+            <a:schemeClr val="lt1"/>
+          </a:fontRef>
+        </p:style>
+        <p:txBody>
+          <a:bodyPr rtlCol="0" anchor="ctr"/>
+          <a:lstStyle/>
+          <a:p>
+            <a:pPr algn="ctr"/>
+            <a:endParaRPr lang="pt-BR"/>
+          </a:p>
+        </p:txBody>
+      </p:sp>
+      <p:sp>
+        <p:nvSpPr>
+          <p:cNvPr id="50" name="Elipse 49"/>
+          <p:cNvSpPr/>
+          <p:nvPr/>
+        </p:nvSpPr>
+        <p:spPr>
+          <a:xfrm>
+            <a:off x="8439383" y="2730232"/>
+            <a:ext cx="213756" cy="213756"/>
+          </a:xfrm>
+          <a:prstGeom prst="ellipse">
+            <a:avLst/>
+          </a:prstGeom>
+        </p:spPr>
+        <p:style>
+          <a:lnRef idx="2">
+            <a:schemeClr val="accent1">
+              <a:shade val="50000"/>
+            </a:schemeClr>
+          </a:lnRef>
+          <a:fillRef idx="1">
+            <a:schemeClr val="accent1"/>
+          </a:fillRef>
+          <a:effectRef idx="0">
+            <a:schemeClr val="accent1"/>
+          </a:effectRef>
+          <a:fontRef idx="minor">
+            <a:schemeClr val="lt1"/>
+          </a:fontRef>
+        </p:style>
+        <p:txBody>
+          <a:bodyPr rtlCol="0" anchor="ctr"/>
+          <a:lstStyle/>
+          <a:p>
+            <a:pPr algn="ctr"/>
+            <a:endParaRPr lang="pt-BR"/>
+          </a:p>
+        </p:txBody>
+      </p:sp>
+      <p:sp>
+        <p:nvSpPr>
+          <p:cNvPr id="51" name="Elipse 50"/>
+          <p:cNvSpPr/>
+          <p:nvPr/>
+        </p:nvSpPr>
+        <p:spPr>
+          <a:xfrm>
+            <a:off x="7973267" y="4531105"/>
+            <a:ext cx="213756" cy="213756"/>
+          </a:xfrm>
+          <a:prstGeom prst="ellipse">
+            <a:avLst/>
+          </a:prstGeom>
+        </p:spPr>
+        <p:style>
+          <a:lnRef idx="2">
+            <a:schemeClr val="accent1">
+              <a:shade val="50000"/>
+            </a:schemeClr>
+          </a:lnRef>
+          <a:fillRef idx="1">
+            <a:schemeClr val="accent1"/>
+          </a:fillRef>
+          <a:effectRef idx="0">
+            <a:schemeClr val="accent1"/>
+          </a:effectRef>
+          <a:fontRef idx="minor">
+            <a:schemeClr val="lt1"/>
+          </a:fontRef>
+        </p:style>
+        <p:txBody>
+          <a:bodyPr rtlCol="0" anchor="ctr"/>
+          <a:lstStyle/>
+          <a:p>
+            <a:pPr algn="ctr"/>
+            <a:endParaRPr lang="pt-BR"/>
+          </a:p>
+        </p:txBody>
+      </p:sp>
+      <p:sp>
+        <p:nvSpPr>
+          <p:cNvPr id="52" name="Elipse 51"/>
+          <p:cNvSpPr/>
+          <p:nvPr/>
+        </p:nvSpPr>
+        <p:spPr>
+          <a:xfrm>
+            <a:off x="8111820" y="3855462"/>
+            <a:ext cx="213756" cy="213756"/>
+          </a:xfrm>
+          <a:prstGeom prst="ellipse">
+            <a:avLst/>
+          </a:prstGeom>
+        </p:spPr>
+        <p:style>
+          <a:lnRef idx="2">
+            <a:schemeClr val="accent1">
+              <a:shade val="50000"/>
+            </a:schemeClr>
+          </a:lnRef>
+          <a:fillRef idx="1">
+            <a:schemeClr val="accent1"/>
+          </a:fillRef>
+          <a:effectRef idx="0">
+            <a:schemeClr val="accent1"/>
+          </a:effectRef>
+          <a:fontRef idx="minor">
+            <a:schemeClr val="lt1"/>
+          </a:fontRef>
+        </p:style>
+        <p:txBody>
+          <a:bodyPr rtlCol="0" anchor="ctr"/>
+          <a:lstStyle/>
+          <a:p>
+            <a:pPr algn="ctr"/>
+            <a:endParaRPr lang="pt-BR"/>
+          </a:p>
+        </p:txBody>
+      </p:sp>
+      <p:sp>
+        <p:nvSpPr>
+          <p:cNvPr id="53" name="Elipse 52"/>
+          <p:cNvSpPr/>
+          <p:nvPr/>
+        </p:nvSpPr>
+        <p:spPr>
+          <a:xfrm>
+            <a:off x="8218698" y="3448869"/>
+            <a:ext cx="213756" cy="213756"/>
+          </a:xfrm>
+          <a:prstGeom prst="ellipse">
+            <a:avLst/>
+          </a:prstGeom>
+        </p:spPr>
+        <p:style>
+          <a:lnRef idx="2">
+            <a:schemeClr val="accent1">
+              <a:shade val="50000"/>
+            </a:schemeClr>
+          </a:lnRef>
+          <a:fillRef idx="1">
+            <a:schemeClr val="accent1"/>
+          </a:fillRef>
+          <a:effectRef idx="0">
+            <a:schemeClr val="accent1"/>
+          </a:effectRef>
+          <a:fontRef idx="minor">
+            <a:schemeClr val="lt1"/>
+          </a:fontRef>
+        </p:style>
+        <p:txBody>
+          <a:bodyPr rtlCol="0" anchor="ctr"/>
+          <a:lstStyle/>
+          <a:p>
+            <a:pPr algn="ctr"/>
+            <a:endParaRPr lang="pt-BR"/>
+          </a:p>
+        </p:txBody>
+      </p:sp>
+      <p:sp>
+        <p:nvSpPr>
+          <p:cNvPr id="54" name="Elipse 53"/>
+          <p:cNvSpPr/>
+          <p:nvPr/>
+        </p:nvSpPr>
+        <p:spPr>
+          <a:xfrm>
+            <a:off x="8068270" y="4207162"/>
+            <a:ext cx="213756" cy="213756"/>
+          </a:xfrm>
+          <a:prstGeom prst="ellipse">
+            <a:avLst/>
+          </a:prstGeom>
+        </p:spPr>
+        <p:style>
+          <a:lnRef idx="2">
+            <a:schemeClr val="accent1">
+              <a:shade val="50000"/>
+            </a:schemeClr>
+          </a:lnRef>
+          <a:fillRef idx="1">
+            <a:schemeClr val="accent1"/>
+          </a:fillRef>
+          <a:effectRef idx="0">
+            <a:schemeClr val="accent1"/>
+          </a:effectRef>
+          <a:fontRef idx="minor">
+            <a:schemeClr val="lt1"/>
+          </a:fontRef>
+        </p:style>
+        <p:txBody>
+          <a:bodyPr rtlCol="0" anchor="ctr"/>
+          <a:lstStyle/>
+          <a:p>
+            <a:pPr algn="ctr"/>
+            <a:endParaRPr lang="pt-BR"/>
+          </a:p>
+        </p:txBody>
+      </p:sp>
+      <p:grpSp>
+        <p:nvGrpSpPr>
+          <p:cNvPr id="55" name="Grupo 54"/>
+          <p:cNvGrpSpPr/>
+          <p:nvPr/>
+        </p:nvGrpSpPr>
+        <p:grpSpPr>
+          <a:xfrm>
+            <a:off x="1900051" y="2478480"/>
+            <a:ext cx="3740727" cy="1256808"/>
+            <a:chOff x="1104407" y="1472540"/>
+            <a:chExt cx="3740727" cy="3740726"/>
+          </a:xfrm>
+        </p:grpSpPr>
+        <p:sp>
+          <p:nvSpPr>
+            <p:cNvPr id="56" name="Retângulo 55"/>
+            <p:cNvSpPr/>
+            <p:nvPr/>
+          </p:nvSpPr>
+          <p:spPr>
+            <a:xfrm>
+              <a:off x="1104408" y="1472540"/>
+              <a:ext cx="1246909" cy="1246909"/>
+            </a:xfrm>
+            <a:prstGeom prst="rect">
+              <a:avLst/>
+            </a:prstGeom>
+            <a:noFill/>
+          </p:spPr>
+          <p:style>
+            <a:lnRef idx="2">
+              <a:schemeClr val="accent1">
+                <a:shade val="50000"/>
+              </a:schemeClr>
+            </a:lnRef>
+            <a:fillRef idx="1">
+              <a:schemeClr val="accent1"/>
+            </a:fillRef>
+            <a:effectRef idx="0">
+              <a:schemeClr val="accent1"/>
+            </a:effectRef>
+            <a:fontRef idx="minor">
+              <a:schemeClr val="lt1"/>
+            </a:fontRef>
+          </p:style>
+          <p:txBody>
+            <a:bodyPr rtlCol="0" anchor="ctr"/>
+            <a:lstStyle/>
+            <a:p>
+              <a:pPr algn="ctr"/>
+              <a:endParaRPr lang="pt-BR"/>
+            </a:p>
+          </p:txBody>
+        </p:sp>
+        <p:sp>
+          <p:nvSpPr>
+            <p:cNvPr id="57" name="Retângulo 56"/>
+            <p:cNvSpPr/>
+            <p:nvPr/>
+          </p:nvSpPr>
+          <p:spPr>
+            <a:xfrm>
+              <a:off x="2351317" y="1472540"/>
+              <a:ext cx="1246909" cy="1246909"/>
+            </a:xfrm>
+            <a:prstGeom prst="rect">
+              <a:avLst/>
+            </a:prstGeom>
+            <a:noFill/>
+          </p:spPr>
+          <p:style>
+            <a:lnRef idx="2">
+              <a:schemeClr val="accent1">
+                <a:shade val="50000"/>
+              </a:schemeClr>
+            </a:lnRef>
+            <a:fillRef idx="1">
+              <a:schemeClr val="accent1"/>
+            </a:fillRef>
+            <a:effectRef idx="0">
+              <a:schemeClr val="accent1"/>
+            </a:effectRef>
+            <a:fontRef idx="minor">
+              <a:schemeClr val="lt1"/>
+            </a:fontRef>
+          </p:style>
+          <p:txBody>
+            <a:bodyPr rtlCol="0" anchor="ctr"/>
+            <a:lstStyle/>
+            <a:p>
+              <a:pPr algn="ctr"/>
+              <a:endParaRPr lang="pt-BR"/>
+            </a:p>
+          </p:txBody>
+        </p:sp>
+        <p:sp>
+          <p:nvSpPr>
+            <p:cNvPr id="58" name="Retângulo 57"/>
+            <p:cNvSpPr/>
+            <p:nvPr/>
+          </p:nvSpPr>
+          <p:spPr>
+            <a:xfrm>
+              <a:off x="1104407" y="2719449"/>
+              <a:ext cx="1246909" cy="1246909"/>
+            </a:xfrm>
+            <a:prstGeom prst="rect">
+              <a:avLst/>
+            </a:prstGeom>
+            <a:noFill/>
+          </p:spPr>
+          <p:style>
+            <a:lnRef idx="2">
+              <a:schemeClr val="accent1">
+                <a:shade val="50000"/>
+              </a:schemeClr>
+            </a:lnRef>
+            <a:fillRef idx="1">
+              <a:schemeClr val="accent1"/>
+            </a:fillRef>
+            <a:effectRef idx="0">
+              <a:schemeClr val="accent1"/>
+            </a:effectRef>
+            <a:fontRef idx="minor">
+              <a:schemeClr val="lt1"/>
+            </a:fontRef>
+          </p:style>
+          <p:txBody>
+            <a:bodyPr rtlCol="0" anchor="ctr"/>
+            <a:lstStyle/>
+            <a:p>
+              <a:pPr algn="ctr"/>
+              <a:endParaRPr lang="pt-BR"/>
+            </a:p>
+          </p:txBody>
+        </p:sp>
+        <p:sp>
+          <p:nvSpPr>
+            <p:cNvPr id="59" name="Retângulo 58"/>
+            <p:cNvSpPr/>
+            <p:nvPr/>
+          </p:nvSpPr>
+          <p:spPr>
+            <a:xfrm>
+              <a:off x="2351316" y="2719448"/>
+              <a:ext cx="1246909" cy="1246909"/>
+            </a:xfrm>
+            <a:prstGeom prst="rect">
+              <a:avLst/>
+            </a:prstGeom>
+            <a:noFill/>
+          </p:spPr>
+          <p:style>
+            <a:lnRef idx="2">
+              <a:schemeClr val="accent1">
+                <a:shade val="50000"/>
+              </a:schemeClr>
+            </a:lnRef>
+            <a:fillRef idx="1">
+              <a:schemeClr val="accent1"/>
+            </a:fillRef>
+            <a:effectRef idx="0">
+              <a:schemeClr val="accent1"/>
+            </a:effectRef>
+            <a:fontRef idx="minor">
+              <a:schemeClr val="lt1"/>
+            </a:fontRef>
+          </p:style>
+          <p:txBody>
+            <a:bodyPr rtlCol="0" anchor="ctr"/>
+            <a:lstStyle/>
+            <a:p>
+              <a:pPr algn="ctr"/>
+              <a:endParaRPr lang="pt-BR"/>
+            </a:p>
+          </p:txBody>
+        </p:sp>
+        <p:sp>
+          <p:nvSpPr>
+            <p:cNvPr id="60" name="Retângulo 59"/>
+            <p:cNvSpPr/>
+            <p:nvPr/>
+          </p:nvSpPr>
+          <p:spPr>
+            <a:xfrm>
+              <a:off x="1104407" y="3966357"/>
+              <a:ext cx="1246909" cy="1246909"/>
+            </a:xfrm>
+            <a:prstGeom prst="rect">
+              <a:avLst/>
+            </a:prstGeom>
+            <a:noFill/>
+          </p:spPr>
+          <p:style>
+            <a:lnRef idx="2">
+              <a:schemeClr val="accent1">
+                <a:shade val="50000"/>
+              </a:schemeClr>
+            </a:lnRef>
+            <a:fillRef idx="1">
+              <a:schemeClr val="accent1"/>
+            </a:fillRef>
+            <a:effectRef idx="0">
+              <a:schemeClr val="accent1"/>
+            </a:effectRef>
+            <a:fontRef idx="minor">
+              <a:schemeClr val="lt1"/>
+            </a:fontRef>
+          </p:style>
+          <p:txBody>
+            <a:bodyPr rtlCol="0" anchor="ctr"/>
+            <a:lstStyle/>
+            <a:p>
+              <a:pPr algn="ctr"/>
+              <a:endParaRPr lang="pt-BR"/>
+            </a:p>
+          </p:txBody>
+        </p:sp>
+        <p:sp>
+          <p:nvSpPr>
+            <p:cNvPr id="61" name="Retângulo 60"/>
+            <p:cNvSpPr/>
+            <p:nvPr/>
+          </p:nvSpPr>
+          <p:spPr>
+            <a:xfrm>
+              <a:off x="2351316" y="3966356"/>
+              <a:ext cx="1246909" cy="1246909"/>
+            </a:xfrm>
+            <a:prstGeom prst="rect">
+              <a:avLst/>
+            </a:prstGeom>
+            <a:noFill/>
+          </p:spPr>
+          <p:style>
+            <a:lnRef idx="2">
+              <a:schemeClr val="accent1">
+                <a:shade val="50000"/>
+              </a:schemeClr>
+            </a:lnRef>
+            <a:fillRef idx="1">
+              <a:schemeClr val="accent1"/>
+            </a:fillRef>
+            <a:effectRef idx="0">
+              <a:schemeClr val="accent1"/>
+            </a:effectRef>
+            <a:fontRef idx="minor">
+              <a:schemeClr val="lt1"/>
+            </a:fontRef>
+          </p:style>
+          <p:txBody>
+            <a:bodyPr rtlCol="0" anchor="ctr"/>
+            <a:lstStyle/>
+            <a:p>
+              <a:pPr algn="ctr"/>
+              <a:endParaRPr lang="pt-BR"/>
+            </a:p>
+          </p:txBody>
+        </p:sp>
+        <p:sp>
+          <p:nvSpPr>
+            <p:cNvPr id="62" name="Retângulo 61"/>
+            <p:cNvSpPr/>
+            <p:nvPr/>
+          </p:nvSpPr>
+          <p:spPr>
+            <a:xfrm>
+              <a:off x="3598225" y="1472540"/>
+              <a:ext cx="1246909" cy="1246909"/>
+            </a:xfrm>
+            <a:prstGeom prst="rect">
+              <a:avLst/>
+            </a:prstGeom>
+            <a:noFill/>
+          </p:spPr>
+          <p:style>
+            <a:lnRef idx="2">
+              <a:schemeClr val="accent1">
+                <a:shade val="50000"/>
+              </a:schemeClr>
+            </a:lnRef>
+            <a:fillRef idx="1">
+              <a:schemeClr val="accent1"/>
+            </a:fillRef>
+            <a:effectRef idx="0">
+              <a:schemeClr val="accent1"/>
+            </a:effectRef>
+            <a:fontRef idx="minor">
+              <a:schemeClr val="lt1"/>
+            </a:fontRef>
+          </p:style>
+          <p:txBody>
+            <a:bodyPr rtlCol="0" anchor="ctr"/>
+            <a:lstStyle/>
+            <a:p>
+              <a:pPr algn="ctr"/>
+              <a:endParaRPr lang="pt-BR"/>
+            </a:p>
+          </p:txBody>
+        </p:sp>
+        <p:sp>
+          <p:nvSpPr>
+            <p:cNvPr id="63" name="Retângulo 62"/>
+            <p:cNvSpPr/>
+            <p:nvPr/>
+          </p:nvSpPr>
+          <p:spPr>
+            <a:xfrm>
+              <a:off x="3598224" y="2719448"/>
+              <a:ext cx="1246909" cy="1246909"/>
+            </a:xfrm>
+            <a:prstGeom prst="rect">
+              <a:avLst/>
+            </a:prstGeom>
+            <a:noFill/>
+          </p:spPr>
+          <p:style>
+            <a:lnRef idx="2">
+              <a:schemeClr val="accent1">
+                <a:shade val="50000"/>
+              </a:schemeClr>
+            </a:lnRef>
+            <a:fillRef idx="1">
+              <a:schemeClr val="accent1"/>
+            </a:fillRef>
+            <a:effectRef idx="0">
+              <a:schemeClr val="accent1"/>
+            </a:effectRef>
+            <a:fontRef idx="minor">
+              <a:schemeClr val="lt1"/>
+            </a:fontRef>
+          </p:style>
+          <p:txBody>
+            <a:bodyPr rtlCol="0" anchor="ctr"/>
+            <a:lstStyle/>
+            <a:p>
+              <a:pPr algn="ctr"/>
+              <a:endParaRPr lang="pt-BR"/>
+            </a:p>
+          </p:txBody>
+        </p:sp>
+        <p:sp>
+          <p:nvSpPr>
+            <p:cNvPr id="64" name="Retângulo 63"/>
+            <p:cNvSpPr/>
+            <p:nvPr/>
+          </p:nvSpPr>
+          <p:spPr>
+            <a:xfrm>
+              <a:off x="3598224" y="3966356"/>
+              <a:ext cx="1246909" cy="1246909"/>
+            </a:xfrm>
+            <a:prstGeom prst="rect">
+              <a:avLst/>
+            </a:prstGeom>
+            <a:noFill/>
+          </p:spPr>
+          <p:style>
+            <a:lnRef idx="2">
+              <a:schemeClr val="accent1">
+                <a:shade val="50000"/>
+              </a:schemeClr>
+            </a:lnRef>
+            <a:fillRef idx="1">
+              <a:schemeClr val="accent1"/>
+            </a:fillRef>
+            <a:effectRef idx="0">
+              <a:schemeClr val="accent1"/>
+            </a:effectRef>
+            <a:fontRef idx="minor">
+              <a:schemeClr val="lt1"/>
+            </a:fontRef>
+          </p:style>
+          <p:txBody>
+            <a:bodyPr rtlCol="0" anchor="ctr"/>
+            <a:lstStyle/>
+            <a:p>
+              <a:pPr algn="ctr"/>
+              <a:endParaRPr lang="pt-BR"/>
+            </a:p>
+          </p:txBody>
+        </p:sp>
+      </p:grpSp>
+      <p:grpSp>
+        <p:nvGrpSpPr>
+          <p:cNvPr id="65" name="Grupo 64"/>
+          <p:cNvGrpSpPr/>
+          <p:nvPr/>
+        </p:nvGrpSpPr>
+        <p:grpSpPr>
+          <a:xfrm>
+            <a:off x="1900050" y="3735279"/>
+            <a:ext cx="3740727" cy="1256808"/>
+            <a:chOff x="1104407" y="1472540"/>
+            <a:chExt cx="3740727" cy="3740726"/>
+          </a:xfrm>
+        </p:grpSpPr>
+        <p:sp>
+          <p:nvSpPr>
+            <p:cNvPr id="66" name="Retângulo 65"/>
+            <p:cNvSpPr/>
+            <p:nvPr/>
+          </p:nvSpPr>
+          <p:spPr>
+            <a:xfrm>
+              <a:off x="1104408" y="1472540"/>
+              <a:ext cx="1246909" cy="1246909"/>
+            </a:xfrm>
+            <a:prstGeom prst="rect">
+              <a:avLst/>
+            </a:prstGeom>
+            <a:noFill/>
+          </p:spPr>
+          <p:style>
+            <a:lnRef idx="2">
+              <a:schemeClr val="accent1">
+                <a:shade val="50000"/>
+              </a:schemeClr>
+            </a:lnRef>
+            <a:fillRef idx="1">
+              <a:schemeClr val="accent1"/>
+            </a:fillRef>
+            <a:effectRef idx="0">
+              <a:schemeClr val="accent1"/>
+            </a:effectRef>
+            <a:fontRef idx="minor">
+              <a:schemeClr val="lt1"/>
+            </a:fontRef>
+          </p:style>
+          <p:txBody>
+            <a:bodyPr rtlCol="0" anchor="ctr"/>
+            <a:lstStyle/>
+            <a:p>
+              <a:pPr algn="ctr"/>
+              <a:endParaRPr lang="pt-BR"/>
+            </a:p>
+          </p:txBody>
+        </p:sp>
+        <p:sp>
+          <p:nvSpPr>
+            <p:cNvPr id="67" name="Retângulo 66"/>
+            <p:cNvSpPr/>
+            <p:nvPr/>
+          </p:nvSpPr>
+          <p:spPr>
+            <a:xfrm>
+              <a:off x="2351317" y="1472540"/>
+              <a:ext cx="1246909" cy="1246909"/>
+            </a:xfrm>
+            <a:prstGeom prst="rect">
+              <a:avLst/>
+            </a:prstGeom>
+            <a:noFill/>
+          </p:spPr>
+          <p:style>
+            <a:lnRef idx="2">
+              <a:schemeClr val="accent1">
+                <a:shade val="50000"/>
+              </a:schemeClr>
+            </a:lnRef>
+            <a:fillRef idx="1">
+              <a:schemeClr val="accent1"/>
+            </a:fillRef>
+            <a:effectRef idx="0">
+              <a:schemeClr val="accent1"/>
+            </a:effectRef>
+            <a:fontRef idx="minor">
+              <a:schemeClr val="lt1"/>
+            </a:fontRef>
+          </p:style>
+          <p:txBody>
+            <a:bodyPr rtlCol="0" anchor="ctr"/>
+            <a:lstStyle/>
+            <a:p>
+              <a:pPr algn="ctr"/>
+              <a:endParaRPr lang="pt-BR"/>
+            </a:p>
+          </p:txBody>
+        </p:sp>
+        <p:sp>
+          <p:nvSpPr>
+            <p:cNvPr id="68" name="Retângulo 67"/>
+            <p:cNvSpPr/>
+            <p:nvPr/>
+          </p:nvSpPr>
+          <p:spPr>
+            <a:xfrm>
+              <a:off x="1104407" y="2719449"/>
+              <a:ext cx="1246909" cy="1246909"/>
+            </a:xfrm>
+            <a:prstGeom prst="rect">
+              <a:avLst/>
+            </a:prstGeom>
+            <a:noFill/>
+          </p:spPr>
+          <p:style>
+            <a:lnRef idx="2">
+              <a:schemeClr val="accent1">
+                <a:shade val="50000"/>
+              </a:schemeClr>
+            </a:lnRef>
+            <a:fillRef idx="1">
+              <a:schemeClr val="accent1"/>
+            </a:fillRef>
+            <a:effectRef idx="0">
+              <a:schemeClr val="accent1"/>
+            </a:effectRef>
+            <a:fontRef idx="minor">
+              <a:schemeClr val="lt1"/>
+            </a:fontRef>
+          </p:style>
+          <p:txBody>
+            <a:bodyPr rtlCol="0" anchor="ctr"/>
+            <a:lstStyle/>
+            <a:p>
+              <a:pPr algn="ctr"/>
+              <a:endParaRPr lang="pt-BR"/>
+            </a:p>
+          </p:txBody>
+        </p:sp>
+        <p:sp>
+          <p:nvSpPr>
+            <p:cNvPr id="69" name="Retângulo 68"/>
+            <p:cNvSpPr/>
+            <p:nvPr/>
+          </p:nvSpPr>
+          <p:spPr>
+            <a:xfrm>
+              <a:off x="2351316" y="2719448"/>
+              <a:ext cx="1246909" cy="1246909"/>
+            </a:xfrm>
+            <a:prstGeom prst="rect">
+              <a:avLst/>
+            </a:prstGeom>
+            <a:noFill/>
+          </p:spPr>
+          <p:style>
+            <a:lnRef idx="2">
+              <a:schemeClr val="accent1">
+                <a:shade val="50000"/>
+              </a:schemeClr>
+            </a:lnRef>
+            <a:fillRef idx="1">
+              <a:schemeClr val="accent1"/>
+            </a:fillRef>
+            <a:effectRef idx="0">
+              <a:schemeClr val="accent1"/>
+            </a:effectRef>
+            <a:fontRef idx="minor">
+              <a:schemeClr val="lt1"/>
+            </a:fontRef>
+          </p:style>
+          <p:txBody>
+            <a:bodyPr rtlCol="0" anchor="ctr"/>
+            <a:lstStyle/>
+            <a:p>
+              <a:pPr algn="ctr"/>
+              <a:endParaRPr lang="pt-BR"/>
+            </a:p>
+          </p:txBody>
+        </p:sp>
+        <p:sp>
+          <p:nvSpPr>
+            <p:cNvPr id="70" name="Retângulo 69"/>
+            <p:cNvSpPr/>
+            <p:nvPr/>
+          </p:nvSpPr>
+          <p:spPr>
+            <a:xfrm>
+              <a:off x="1104407" y="3966357"/>
+              <a:ext cx="1246909" cy="1246909"/>
+            </a:xfrm>
+            <a:prstGeom prst="rect">
+              <a:avLst/>
+            </a:prstGeom>
+            <a:noFill/>
+          </p:spPr>
+          <p:style>
+            <a:lnRef idx="2">
+              <a:schemeClr val="accent1">
+                <a:shade val="50000"/>
+              </a:schemeClr>
+            </a:lnRef>
+            <a:fillRef idx="1">
+              <a:schemeClr val="accent1"/>
+            </a:fillRef>
+            <a:effectRef idx="0">
+              <a:schemeClr val="accent1"/>
+            </a:effectRef>
+            <a:fontRef idx="minor">
+              <a:schemeClr val="lt1"/>
+            </a:fontRef>
+          </p:style>
+          <p:txBody>
+            <a:bodyPr rtlCol="0" anchor="ctr"/>
+            <a:lstStyle/>
+            <a:p>
+              <a:pPr algn="ctr"/>
+              <a:endParaRPr lang="pt-BR"/>
+            </a:p>
+          </p:txBody>
+        </p:sp>
+        <p:sp>
+          <p:nvSpPr>
+            <p:cNvPr id="71" name="Retângulo 70"/>
+            <p:cNvSpPr/>
+            <p:nvPr/>
+          </p:nvSpPr>
+          <p:spPr>
+            <a:xfrm>
+              <a:off x="2351316" y="3966356"/>
+              <a:ext cx="1246909" cy="1246909"/>
+            </a:xfrm>
+            <a:prstGeom prst="rect">
+              <a:avLst/>
+            </a:prstGeom>
+            <a:noFill/>
+          </p:spPr>
+          <p:style>
+            <a:lnRef idx="2">
+              <a:schemeClr val="accent1">
+                <a:shade val="50000"/>
+              </a:schemeClr>
+            </a:lnRef>
+            <a:fillRef idx="1">
+              <a:schemeClr val="accent1"/>
+            </a:fillRef>
+            <a:effectRef idx="0">
+              <a:schemeClr val="accent1"/>
+            </a:effectRef>
+            <a:fontRef idx="minor">
+              <a:schemeClr val="lt1"/>
+            </a:fontRef>
+          </p:style>
+          <p:txBody>
+            <a:bodyPr rtlCol="0" anchor="ctr"/>
+            <a:lstStyle/>
+            <a:p>
+              <a:pPr algn="ctr"/>
+              <a:endParaRPr lang="pt-BR"/>
+            </a:p>
+          </p:txBody>
+        </p:sp>
+        <p:sp>
+          <p:nvSpPr>
+            <p:cNvPr id="72" name="Retângulo 71"/>
+            <p:cNvSpPr/>
+            <p:nvPr/>
+          </p:nvSpPr>
+          <p:spPr>
+            <a:xfrm>
+              <a:off x="3598225" y="1472540"/>
+              <a:ext cx="1246909" cy="1246909"/>
+            </a:xfrm>
+            <a:prstGeom prst="rect">
+              <a:avLst/>
+            </a:prstGeom>
+            <a:noFill/>
+          </p:spPr>
+          <p:style>
+            <a:lnRef idx="2">
+              <a:schemeClr val="accent1">
+                <a:shade val="50000"/>
+              </a:schemeClr>
+            </a:lnRef>
+            <a:fillRef idx="1">
+              <a:schemeClr val="accent1"/>
+            </a:fillRef>
+            <a:effectRef idx="0">
+              <a:schemeClr val="accent1"/>
+            </a:effectRef>
+            <a:fontRef idx="minor">
+              <a:schemeClr val="lt1"/>
+            </a:fontRef>
+          </p:style>
+          <p:txBody>
+            <a:bodyPr rtlCol="0" anchor="ctr"/>
+            <a:lstStyle/>
+            <a:p>
+              <a:pPr algn="ctr"/>
+              <a:endParaRPr lang="pt-BR"/>
+            </a:p>
+          </p:txBody>
+        </p:sp>
+        <p:sp>
+          <p:nvSpPr>
+            <p:cNvPr id="73" name="Retângulo 72"/>
+            <p:cNvSpPr/>
+            <p:nvPr/>
+          </p:nvSpPr>
+          <p:spPr>
+            <a:xfrm>
+              <a:off x="3598224" y="2719448"/>
+              <a:ext cx="1246909" cy="1246909"/>
+            </a:xfrm>
+            <a:prstGeom prst="rect">
+              <a:avLst/>
+            </a:prstGeom>
+            <a:noFill/>
+          </p:spPr>
+          <p:style>
+            <a:lnRef idx="2">
+              <a:schemeClr val="accent1">
+                <a:shade val="50000"/>
+              </a:schemeClr>
+            </a:lnRef>
+            <a:fillRef idx="1">
+              <a:schemeClr val="accent1"/>
+            </a:fillRef>
+            <a:effectRef idx="0">
+              <a:schemeClr val="accent1"/>
+            </a:effectRef>
+            <a:fontRef idx="minor">
+              <a:schemeClr val="lt1"/>
+            </a:fontRef>
+          </p:style>
+          <p:txBody>
+            <a:bodyPr rtlCol="0" anchor="ctr"/>
+            <a:lstStyle/>
+            <a:p>
+              <a:pPr algn="ctr"/>
+              <a:endParaRPr lang="pt-BR"/>
+            </a:p>
+          </p:txBody>
+        </p:sp>
+        <p:sp>
+          <p:nvSpPr>
+            <p:cNvPr id="74" name="Retângulo 73"/>
+            <p:cNvSpPr/>
+            <p:nvPr/>
+          </p:nvSpPr>
+          <p:spPr>
+            <a:xfrm>
+              <a:off x="3598224" y="3966356"/>
+              <a:ext cx="1246909" cy="1246909"/>
+            </a:xfrm>
+            <a:prstGeom prst="rect">
+              <a:avLst/>
+            </a:prstGeom>
+            <a:noFill/>
+          </p:spPr>
+          <p:style>
+            <a:lnRef idx="2">
+              <a:schemeClr val="accent1">
+                <a:shade val="50000"/>
+              </a:schemeClr>
+            </a:lnRef>
+            <a:fillRef idx="1">
+              <a:schemeClr val="accent1"/>
+            </a:fillRef>
+            <a:effectRef idx="0">
+              <a:schemeClr val="accent1"/>
+            </a:effectRef>
+            <a:fontRef idx="minor">
+              <a:schemeClr val="lt1"/>
+            </a:fontRef>
+          </p:style>
+          <p:txBody>
+            <a:bodyPr rtlCol="0" anchor="ctr"/>
+            <a:lstStyle/>
+            <a:p>
+              <a:pPr algn="ctr"/>
+              <a:endParaRPr lang="pt-BR"/>
+            </a:p>
+          </p:txBody>
+        </p:sp>
+      </p:grpSp>
+      <p:cxnSp>
+        <p:nvCxnSpPr>
+          <p:cNvPr id="75" name="Conector de seta reta 74"/>
+          <p:cNvCxnSpPr/>
+          <p:nvPr/>
+        </p:nvCxnSpPr>
+        <p:spPr>
+          <a:xfrm flipV="1">
+            <a:off x="1006435" y="1387439"/>
+            <a:ext cx="0" cy="4345075"/>
+          </a:xfrm>
+          <a:prstGeom prst="straightConnector1">
+            <a:avLst/>
+          </a:prstGeom>
+          <a:ln>
+            <a:tailEnd type="triangle"/>
+          </a:ln>
+        </p:spPr>
+        <p:style>
+          <a:lnRef idx="1">
+            <a:schemeClr val="accent1"/>
+          </a:lnRef>
+          <a:fillRef idx="0">
+            <a:schemeClr val="accent1"/>
+          </a:fillRef>
+          <a:effectRef idx="0">
+            <a:schemeClr val="accent1"/>
+          </a:effectRef>
+          <a:fontRef idx="minor">
+            <a:schemeClr val="tx1"/>
+          </a:fontRef>
+        </p:style>
+      </p:cxnSp>
+      <p:cxnSp>
+        <p:nvCxnSpPr>
+          <p:cNvPr id="76" name="Conector de seta reta 75"/>
+          <p:cNvCxnSpPr/>
+          <p:nvPr/>
+        </p:nvCxnSpPr>
+        <p:spPr>
+          <a:xfrm>
+            <a:off x="1006435" y="5725127"/>
+            <a:ext cx="9788234" cy="7387"/>
+          </a:xfrm>
+          <a:prstGeom prst="straightConnector1">
+            <a:avLst/>
+          </a:prstGeom>
+          <a:ln>
+            <a:tailEnd type="triangle"/>
+          </a:ln>
+        </p:spPr>
+        <p:style>
+          <a:lnRef idx="1">
+            <a:schemeClr val="accent1"/>
+          </a:lnRef>
+          <a:fillRef idx="0">
+            <a:schemeClr val="accent1"/>
+          </a:fillRef>
+          <a:effectRef idx="0">
+            <a:schemeClr val="accent1"/>
+          </a:effectRef>
+          <a:fontRef idx="minor">
+            <a:schemeClr val="tx1"/>
+          </a:fontRef>
+        </p:style>
+      </p:cxnSp>
+      <p:sp>
+        <p:nvSpPr>
+          <p:cNvPr id="77" name="CaixaDeTexto 76"/>
+          <p:cNvSpPr txBox="1"/>
+          <p:nvPr/>
+        </p:nvSpPr>
+        <p:spPr>
+          <a:xfrm rot="16200000">
+            <a:off x="394383" y="3285646"/>
+            <a:ext cx="871392" cy="369332"/>
+          </a:xfrm>
+          <a:prstGeom prst="rect">
+            <a:avLst/>
+          </a:prstGeom>
+          <a:noFill/>
+        </p:spPr>
+        <p:txBody>
+          <a:bodyPr wrap="none" rtlCol="0">
+            <a:spAutoFit/>
+          </a:bodyPr>
+          <a:lstStyle/>
+          <a:p>
+            <a:r>
+              <a:rPr lang="pt-BR" dirty="0" smtClean="0"/>
+              <a:t>vertical</a:t>
+            </a:r>
+            <a:endParaRPr lang="pt-BR" dirty="0"/>
+          </a:p>
+        </p:txBody>
+      </p:sp>
+      <p:sp>
+        <p:nvSpPr>
+          <p:cNvPr id="78" name="CaixaDeTexto 77"/>
+          <p:cNvSpPr txBox="1"/>
+          <p:nvPr/>
+        </p:nvSpPr>
+        <p:spPr>
+          <a:xfrm>
+            <a:off x="5492336" y="5798497"/>
+            <a:ext cx="1126847" cy="369332"/>
+          </a:xfrm>
+          <a:prstGeom prst="rect">
+            <a:avLst/>
+          </a:prstGeom>
+          <a:noFill/>
+        </p:spPr>
+        <p:txBody>
+          <a:bodyPr wrap="none" rtlCol="0">
+            <a:spAutoFit/>
+          </a:bodyPr>
+          <a:lstStyle/>
+          <a:p>
+            <a:r>
+              <a:rPr lang="pt-BR" dirty="0" smtClean="0"/>
+              <a:t>horizontal</a:t>
+            </a:r>
+            <a:endParaRPr lang="pt-BR" dirty="0"/>
+          </a:p>
+        </p:txBody>
+      </p:sp>
+      <p:cxnSp>
+        <p:nvCxnSpPr>
+          <p:cNvPr id="79" name="Conector de seta reta 78"/>
+          <p:cNvCxnSpPr/>
+          <p:nvPr/>
+        </p:nvCxnSpPr>
+        <p:spPr>
+          <a:xfrm>
+            <a:off x="3570409" y="892993"/>
+            <a:ext cx="726579" cy="288575"/>
+          </a:xfrm>
+          <a:prstGeom prst="straightConnector1">
+            <a:avLst/>
+          </a:prstGeom>
+          <a:ln>
+            <a:tailEnd type="triangle"/>
+          </a:ln>
+        </p:spPr>
+        <p:style>
+          <a:lnRef idx="1">
+            <a:schemeClr val="accent1"/>
+          </a:lnRef>
+          <a:fillRef idx="0">
+            <a:schemeClr val="accent1"/>
+          </a:fillRef>
+          <a:effectRef idx="0">
+            <a:schemeClr val="accent1"/>
+          </a:effectRef>
+          <a:fontRef idx="minor">
+            <a:schemeClr val="tx1"/>
+          </a:fontRef>
+        </p:style>
+      </p:cxnSp>
+      <p:cxnSp>
+        <p:nvCxnSpPr>
+          <p:cNvPr id="80" name="Conector de seta reta 79"/>
+          <p:cNvCxnSpPr/>
+          <p:nvPr/>
+        </p:nvCxnSpPr>
+        <p:spPr>
+          <a:xfrm>
+            <a:off x="7981984" y="1151479"/>
+            <a:ext cx="726579" cy="288575"/>
+          </a:xfrm>
+          <a:prstGeom prst="straightConnector1">
+            <a:avLst/>
+          </a:prstGeom>
+          <a:ln>
+            <a:tailEnd type="triangle"/>
+          </a:ln>
+        </p:spPr>
+        <p:style>
+          <a:lnRef idx="1">
+            <a:schemeClr val="accent1"/>
+          </a:lnRef>
+          <a:fillRef idx="0">
+            <a:schemeClr val="accent1"/>
+          </a:fillRef>
+          <a:effectRef idx="0">
+            <a:schemeClr val="accent1"/>
+          </a:effectRef>
+          <a:fontRef idx="minor">
+            <a:schemeClr val="tx1"/>
+          </a:fontRef>
+        </p:style>
+      </p:cxnSp>
+      <p:cxnSp>
+        <p:nvCxnSpPr>
+          <p:cNvPr id="81" name="Conector de seta reta 80"/>
+          <p:cNvCxnSpPr/>
+          <p:nvPr/>
+        </p:nvCxnSpPr>
+        <p:spPr>
+          <a:xfrm flipH="1">
+            <a:off x="5396055" y="1059980"/>
+            <a:ext cx="504497" cy="253192"/>
+          </a:xfrm>
+          <a:prstGeom prst="straightConnector1">
+            <a:avLst/>
+          </a:prstGeom>
+          <a:ln>
+            <a:tailEnd type="triangle"/>
+          </a:ln>
+        </p:spPr>
+        <p:style>
+          <a:lnRef idx="1">
+            <a:schemeClr val="accent1"/>
+          </a:lnRef>
+          <a:fillRef idx="0">
+            <a:schemeClr val="accent1"/>
+          </a:fillRef>
+          <a:effectRef idx="0">
+            <a:schemeClr val="accent1"/>
+          </a:effectRef>
+          <a:fontRef idx="minor">
+            <a:schemeClr val="tx1"/>
+          </a:fontRef>
+        </p:style>
+      </p:cxnSp>
+      <p:cxnSp>
+        <p:nvCxnSpPr>
+          <p:cNvPr id="82" name="Conector de seta reta 81"/>
+          <p:cNvCxnSpPr/>
+          <p:nvPr/>
+        </p:nvCxnSpPr>
+        <p:spPr>
+          <a:xfrm>
+            <a:off x="6142593" y="1045878"/>
+            <a:ext cx="726579" cy="288575"/>
+          </a:xfrm>
+          <a:prstGeom prst="straightConnector1">
+            <a:avLst/>
+          </a:prstGeom>
+          <a:ln>
+            <a:tailEnd type="triangle"/>
+          </a:ln>
+        </p:spPr>
+        <p:style>
+          <a:lnRef idx="1">
+            <a:schemeClr val="accent1"/>
+          </a:lnRef>
+          <a:fillRef idx="0">
+            <a:schemeClr val="accent1"/>
+          </a:fillRef>
+          <a:effectRef idx="0">
+            <a:schemeClr val="accent1"/>
+          </a:effectRef>
+          <a:fontRef idx="minor">
+            <a:schemeClr val="tx1"/>
+          </a:fontRef>
+        </p:style>
+      </p:cxnSp>
+      <p:sp>
+        <p:nvSpPr>
+          <p:cNvPr id="83" name="CaixaDeTexto 82"/>
+          <p:cNvSpPr txBox="1"/>
+          <p:nvPr/>
+        </p:nvSpPr>
+        <p:spPr>
+          <a:xfrm>
+            <a:off x="1795205" y="601449"/>
+            <a:ext cx="2492285" cy="369332"/>
+          </a:xfrm>
+          <a:prstGeom prst="rect">
+            <a:avLst/>
+          </a:prstGeom>
+          <a:noFill/>
+        </p:spPr>
+        <p:txBody>
+          <a:bodyPr wrap="none" rtlCol="0">
+            <a:spAutoFit/>
+          </a:bodyPr>
+          <a:lstStyle/>
+          <a:p>
+            <a:r>
+              <a:rPr lang="pt-BR" dirty="0" err="1" smtClean="0"/>
+              <a:t>primary</a:t>
+            </a:r>
+            <a:r>
+              <a:rPr lang="pt-BR" dirty="0" smtClean="0"/>
+              <a:t> data in point set</a:t>
+            </a:r>
+            <a:endParaRPr lang="pt-BR" dirty="0"/>
+          </a:p>
+        </p:txBody>
+      </p:sp>
+      <p:sp>
+        <p:nvSpPr>
+          <p:cNvPr id="84" name="CaixaDeTexto 83"/>
+          <p:cNvSpPr txBox="1"/>
+          <p:nvPr/>
+        </p:nvSpPr>
+        <p:spPr>
+          <a:xfrm>
+            <a:off x="7455491" y="804354"/>
+            <a:ext cx="2492285" cy="369332"/>
+          </a:xfrm>
+          <a:prstGeom prst="rect">
+            <a:avLst/>
+          </a:prstGeom>
+          <a:noFill/>
+        </p:spPr>
+        <p:txBody>
+          <a:bodyPr wrap="none" rtlCol="0">
+            <a:spAutoFit/>
+          </a:bodyPr>
+          <a:lstStyle/>
+          <a:p>
+            <a:r>
+              <a:rPr lang="pt-BR" dirty="0" err="1" smtClean="0"/>
+              <a:t>primary</a:t>
+            </a:r>
+            <a:r>
+              <a:rPr lang="pt-BR" dirty="0" smtClean="0"/>
+              <a:t> data in point set</a:t>
+            </a:r>
+            <a:endParaRPr lang="pt-BR" dirty="0"/>
+          </a:p>
+        </p:txBody>
+      </p:sp>
+      <p:sp>
+        <p:nvSpPr>
+          <p:cNvPr id="85" name="CaixaDeTexto 84"/>
+          <p:cNvSpPr txBox="1"/>
+          <p:nvPr/>
+        </p:nvSpPr>
+        <p:spPr>
+          <a:xfrm>
+            <a:off x="5048161" y="708327"/>
+            <a:ext cx="2048061" cy="369332"/>
+          </a:xfrm>
+          <a:prstGeom prst="rect">
+            <a:avLst/>
+          </a:prstGeom>
+          <a:noFill/>
+        </p:spPr>
+        <p:txBody>
+          <a:bodyPr wrap="none" rtlCol="0">
+            <a:spAutoFit/>
+          </a:bodyPr>
+          <a:lstStyle/>
+          <a:p>
+            <a:r>
+              <a:rPr lang="pt-BR" dirty="0" err="1" smtClean="0"/>
+              <a:t>secondary</a:t>
+            </a:r>
+            <a:r>
+              <a:rPr lang="pt-BR" dirty="0" smtClean="0"/>
+              <a:t> data grid</a:t>
+            </a:r>
+            <a:endParaRPr lang="pt-BR" dirty="0"/>
+          </a:p>
+        </p:txBody>
+      </p:sp>
+      <p:sp>
+        <p:nvSpPr>
+          <p:cNvPr id="86" name="CaixaDeTexto 85"/>
+          <p:cNvSpPr txBox="1"/>
+          <p:nvPr/>
+        </p:nvSpPr>
+        <p:spPr>
+          <a:xfrm>
+            <a:off x="3060280" y="5278942"/>
+            <a:ext cx="1508683" cy="369332"/>
+          </a:xfrm>
+          <a:prstGeom prst="rect">
+            <a:avLst/>
+          </a:prstGeom>
+          <a:noFill/>
+        </p:spPr>
+        <p:txBody>
+          <a:bodyPr wrap="none" rtlCol="0">
+            <a:spAutoFit/>
+          </a:bodyPr>
+          <a:lstStyle/>
+          <a:p>
+            <a:r>
+              <a:rPr lang="pt-BR" dirty="0" smtClean="0"/>
+              <a:t>case for MM1</a:t>
+            </a:r>
+            <a:endParaRPr lang="pt-BR" dirty="0"/>
+          </a:p>
+        </p:txBody>
+      </p:sp>
+      <p:sp>
+        <p:nvSpPr>
+          <p:cNvPr id="87" name="CaixaDeTexto 86"/>
+          <p:cNvSpPr txBox="1"/>
+          <p:nvPr/>
+        </p:nvSpPr>
+        <p:spPr>
+          <a:xfrm>
+            <a:off x="7816664" y="5250750"/>
+            <a:ext cx="1508683" cy="369332"/>
+          </a:xfrm>
+          <a:prstGeom prst="rect">
+            <a:avLst/>
+          </a:prstGeom>
+          <a:noFill/>
+        </p:spPr>
+        <p:txBody>
+          <a:bodyPr wrap="none" rtlCol="0">
+            <a:spAutoFit/>
+          </a:bodyPr>
+          <a:lstStyle/>
+          <a:p>
+            <a:r>
+              <a:rPr lang="pt-BR" dirty="0" smtClean="0"/>
+              <a:t>case for MM2</a:t>
+            </a:r>
+            <a:endParaRPr lang="pt-BR" dirty="0"/>
+          </a:p>
+        </p:txBody>
+      </p:sp>
+    </p:spTree>
+    <p:extLst>
+      <p:ext uri="{BB962C8B-B14F-4D97-AF65-F5344CB8AC3E}">
+        <p14:creationId xmlns:p14="http://schemas.microsoft.com/office/powerpoint/2010/main" val="2572700560"/>
       </p:ext>
     </p:extLst>
   </p:cSld>

</xml_diff>

<commit_message>
Gabor: final changes and manual updates.
</commit_message>
<xml_diff>
--- a/docs/figures.pptx
+++ b/docs/figures.pptx
@@ -20,6 +20,10 @@
     <p:sldId id="269" r:id="rId14"/>
     <p:sldId id="270" r:id="rId15"/>
     <p:sldId id="271" r:id="rId16"/>
+    <p:sldId id="272" r:id="rId17"/>
+    <p:sldId id="274" r:id="rId18"/>
+    <p:sldId id="275" r:id="rId19"/>
+    <p:sldId id="273" r:id="rId20"/>
   </p:sldIdLst>
   <p:sldSz cx="12192000" cy="6858000"/>
   <p:notesSz cx="6858000" cy="9144000"/>
@@ -268,7 +272,7 @@
           <a:p>
             <a:fld id="{5827CF75-21ED-4285-9C22-184A8788EFA2}" type="datetimeFigureOut">
               <a:rPr lang="pt-BR" smtClean="0"/>
-              <a:t>24/11/2018</a:t>
+              <a:t>14/01/2019</a:t>
             </a:fld>
             <a:endParaRPr lang="pt-BR"/>
           </a:p>
@@ -438,7 +442,7 @@
           <a:p>
             <a:fld id="{5827CF75-21ED-4285-9C22-184A8788EFA2}" type="datetimeFigureOut">
               <a:rPr lang="pt-BR" smtClean="0"/>
-              <a:t>24/11/2018</a:t>
+              <a:t>14/01/2019</a:t>
             </a:fld>
             <a:endParaRPr lang="pt-BR"/>
           </a:p>
@@ -618,7 +622,7 @@
           <a:p>
             <a:fld id="{5827CF75-21ED-4285-9C22-184A8788EFA2}" type="datetimeFigureOut">
               <a:rPr lang="pt-BR" smtClean="0"/>
-              <a:t>24/11/2018</a:t>
+              <a:t>14/01/2019</a:t>
             </a:fld>
             <a:endParaRPr lang="pt-BR"/>
           </a:p>
@@ -788,7 +792,7 @@
           <a:p>
             <a:fld id="{5827CF75-21ED-4285-9C22-184A8788EFA2}" type="datetimeFigureOut">
               <a:rPr lang="pt-BR" smtClean="0"/>
-              <a:t>24/11/2018</a:t>
+              <a:t>14/01/2019</a:t>
             </a:fld>
             <a:endParaRPr lang="pt-BR"/>
           </a:p>
@@ -1034,7 +1038,7 @@
           <a:p>
             <a:fld id="{5827CF75-21ED-4285-9C22-184A8788EFA2}" type="datetimeFigureOut">
               <a:rPr lang="pt-BR" smtClean="0"/>
-              <a:t>24/11/2018</a:t>
+              <a:t>14/01/2019</a:t>
             </a:fld>
             <a:endParaRPr lang="pt-BR"/>
           </a:p>
@@ -1266,7 +1270,7 @@
           <a:p>
             <a:fld id="{5827CF75-21ED-4285-9C22-184A8788EFA2}" type="datetimeFigureOut">
               <a:rPr lang="pt-BR" smtClean="0"/>
-              <a:t>24/11/2018</a:t>
+              <a:t>14/01/2019</a:t>
             </a:fld>
             <a:endParaRPr lang="pt-BR"/>
           </a:p>
@@ -1633,7 +1637,7 @@
           <a:p>
             <a:fld id="{5827CF75-21ED-4285-9C22-184A8788EFA2}" type="datetimeFigureOut">
               <a:rPr lang="pt-BR" smtClean="0"/>
-              <a:t>24/11/2018</a:t>
+              <a:t>14/01/2019</a:t>
             </a:fld>
             <a:endParaRPr lang="pt-BR"/>
           </a:p>
@@ -1751,7 +1755,7 @@
           <a:p>
             <a:fld id="{5827CF75-21ED-4285-9C22-184A8788EFA2}" type="datetimeFigureOut">
               <a:rPr lang="pt-BR" smtClean="0"/>
-              <a:t>24/11/2018</a:t>
+              <a:t>14/01/2019</a:t>
             </a:fld>
             <a:endParaRPr lang="pt-BR"/>
           </a:p>
@@ -1846,7 +1850,7 @@
           <a:p>
             <a:fld id="{5827CF75-21ED-4285-9C22-184A8788EFA2}" type="datetimeFigureOut">
               <a:rPr lang="pt-BR" smtClean="0"/>
-              <a:t>24/11/2018</a:t>
+              <a:t>14/01/2019</a:t>
             </a:fld>
             <a:endParaRPr lang="pt-BR"/>
           </a:p>
@@ -2123,7 +2127,7 @@
           <a:p>
             <a:fld id="{5827CF75-21ED-4285-9C22-184A8788EFA2}" type="datetimeFigureOut">
               <a:rPr lang="pt-BR" smtClean="0"/>
-              <a:t>24/11/2018</a:t>
+              <a:t>14/01/2019</a:t>
             </a:fld>
             <a:endParaRPr lang="pt-BR"/>
           </a:p>
@@ -2376,7 +2380,7 @@
           <a:p>
             <a:fld id="{5827CF75-21ED-4285-9C22-184A8788EFA2}" type="datetimeFigureOut">
               <a:rPr lang="pt-BR" smtClean="0"/>
-              <a:t>24/11/2018</a:t>
+              <a:t>14/01/2019</a:t>
             </a:fld>
             <a:endParaRPr lang="pt-BR"/>
           </a:p>
@@ -2589,7 +2593,7 @@
           <a:p>
             <a:fld id="{5827CF75-21ED-4285-9C22-184A8788EFA2}" type="datetimeFigureOut">
               <a:rPr lang="pt-BR" smtClean="0"/>
-              <a:t>24/11/2018</a:t>
+              <a:t>14/01/2019</a:t>
             </a:fld>
             <a:endParaRPr lang="pt-BR"/>
           </a:p>
@@ -4991,7 +4995,6 @@
               <a:rPr lang="pt-BR" dirty="0"/>
               <a:t>x</a:t>
             </a:r>
-            <a:endParaRPr lang="pt-BR" dirty="0"/>
           </a:p>
         </p:txBody>
       </p:sp>
@@ -5195,7 +5198,6 @@
               <a:rPr lang="pt-BR" dirty="0"/>
               <a:t>x</a:t>
             </a:r>
-            <a:endParaRPr lang="pt-BR" dirty="0"/>
           </a:p>
         </p:txBody>
       </p:sp>
@@ -5399,7 +5401,6 @@
               <a:rPr lang="pt-BR" dirty="0"/>
               <a:t>x</a:t>
             </a:r>
-            <a:endParaRPr lang="pt-BR" dirty="0"/>
           </a:p>
         </p:txBody>
       </p:sp>
@@ -5568,7 +5569,6 @@
               <a:rPr lang="pt-BR" dirty="0"/>
               <a:t>x</a:t>
             </a:r>
-            <a:endParaRPr lang="pt-BR" dirty="0"/>
           </a:p>
         </p:txBody>
       </p:sp>
@@ -5677,6 +5677,2719 @@
     <p:extLst>
       <p:ext uri="{BB962C8B-B14F-4D97-AF65-F5344CB8AC3E}">
         <p14:creationId xmlns:p14="http://schemas.microsoft.com/office/powerpoint/2010/main" val="1648656838"/>
+      </p:ext>
+    </p:extLst>
+  </p:cSld>
+  <p:clrMapOvr>
+    <a:masterClrMapping/>
+  </p:clrMapOvr>
+  <p:timing>
+    <p:tnLst>
+      <p:par>
+        <p:cTn id="1" dur="indefinite" restart="never" nodeType="tmRoot"/>
+      </p:par>
+    </p:tnLst>
+  </p:timing>
+</p:sld>
+</file>
+
+<file path=ppt/slides/slide16.xml><?xml version="1.0" encoding="utf-8"?>
+<p:sld xmlns:a="http://schemas.openxmlformats.org/drawingml/2006/main" xmlns:r="http://schemas.openxmlformats.org/officeDocument/2006/relationships" xmlns:p="http://schemas.openxmlformats.org/presentationml/2006/main">
+  <p:cSld>
+    <p:spTree>
+      <p:nvGrpSpPr>
+        <p:cNvPr id="1" name=""/>
+        <p:cNvGrpSpPr/>
+        <p:nvPr/>
+      </p:nvGrpSpPr>
+      <p:grpSpPr>
+        <a:xfrm>
+          <a:off x="0" y="0"/>
+          <a:ext cx="0" cy="0"/>
+          <a:chOff x="0" y="0"/>
+          <a:chExt cx="0" cy="0"/>
+        </a:xfrm>
+      </p:grpSpPr>
+      <p:pic>
+        <p:nvPicPr>
+          <p:cNvPr id="4" name="Imagem 3"/>
+          <p:cNvPicPr>
+            <a:picLocks noChangeAspect="1"/>
+          </p:cNvPicPr>
+          <p:nvPr/>
+        </p:nvPicPr>
+        <p:blipFill>
+          <a:blip r:embed="rId2"/>
+          <a:stretch>
+            <a:fillRect/>
+          </a:stretch>
+        </p:blipFill>
+        <p:spPr>
+          <a:xfrm>
+            <a:off x="1758462" y="1572320"/>
+            <a:ext cx="5790223" cy="3644510"/>
+          </a:xfrm>
+          <a:prstGeom prst="rect">
+            <a:avLst/>
+          </a:prstGeom>
+        </p:spPr>
+      </p:pic>
+      <p:sp>
+        <p:nvSpPr>
+          <p:cNvPr id="7" name="CaixaDeTexto 6"/>
+          <p:cNvSpPr txBox="1"/>
+          <p:nvPr/>
+        </p:nvSpPr>
+        <p:spPr>
+          <a:xfrm>
+            <a:off x="3813273" y="884979"/>
+            <a:ext cx="2525004" cy="261610"/>
+          </a:xfrm>
+          <a:prstGeom prst="rect">
+            <a:avLst/>
+          </a:prstGeom>
+          <a:noFill/>
+        </p:spPr>
+        <p:txBody>
+          <a:bodyPr wrap="square" rtlCol="0">
+            <a:spAutoFit/>
+          </a:bodyPr>
+          <a:lstStyle/>
+          <a:p>
+            <a:pPr algn="ctr"/>
+            <a:r>
+              <a:rPr lang="pt-BR" sz="1100" b="1" dirty="0" smtClean="0"/>
+              <a:t>B2: computes </a:t>
+            </a:r>
+            <a:r>
+              <a:rPr lang="pt-BR" sz="1100" b="1" dirty="0" err="1" smtClean="0"/>
+              <a:t>and</a:t>
+            </a:r>
+            <a:r>
+              <a:rPr lang="pt-BR" sz="1100" b="1" dirty="0" smtClean="0"/>
+              <a:t> displays Gabor </a:t>
+            </a:r>
+            <a:r>
+              <a:rPr lang="pt-BR" sz="1100" b="1" dirty="0" err="1" smtClean="0"/>
+              <a:t>space</a:t>
+            </a:r>
+            <a:endParaRPr lang="pt-BR" sz="1100" b="1" dirty="0"/>
+          </a:p>
+        </p:txBody>
+      </p:sp>
+      <p:cxnSp>
+        <p:nvCxnSpPr>
+          <p:cNvPr id="9" name="Conector angulado 8"/>
+          <p:cNvCxnSpPr>
+            <a:stCxn id="7" idx="1"/>
+            <a:endCxn id="10" idx="0"/>
+          </p:cNvCxnSpPr>
+          <p:nvPr/>
+        </p:nvCxnSpPr>
+        <p:spPr>
+          <a:xfrm rot="10800000" flipV="1">
+            <a:off x="3614299" y="1015783"/>
+            <a:ext cx="198975" cy="812593"/>
+          </a:xfrm>
+          <a:prstGeom prst="bentConnector2">
+            <a:avLst/>
+          </a:prstGeom>
+          <a:ln>
+            <a:solidFill>
+              <a:srgbClr val="FF0000"/>
+            </a:solidFill>
+            <a:tailEnd type="triangle"/>
+          </a:ln>
+        </p:spPr>
+        <p:style>
+          <a:lnRef idx="1">
+            <a:schemeClr val="accent1"/>
+          </a:lnRef>
+          <a:fillRef idx="0">
+            <a:schemeClr val="accent1"/>
+          </a:fillRef>
+          <a:effectRef idx="0">
+            <a:schemeClr val="accent1"/>
+          </a:effectRef>
+          <a:fontRef idx="minor">
+            <a:schemeClr val="tx1"/>
+          </a:fontRef>
+        </p:style>
+      </p:cxnSp>
+      <p:sp>
+        <p:nvSpPr>
+          <p:cNvPr id="10" name="Retângulo 9"/>
+          <p:cNvSpPr/>
+          <p:nvPr/>
+        </p:nvSpPr>
+        <p:spPr>
+          <a:xfrm>
+            <a:off x="3516288" y="1828377"/>
+            <a:ext cx="196020" cy="140677"/>
+          </a:xfrm>
+          <a:prstGeom prst="rect">
+            <a:avLst/>
+          </a:prstGeom>
+          <a:noFill/>
+          <a:ln>
+            <a:noFill/>
+          </a:ln>
+        </p:spPr>
+        <p:style>
+          <a:lnRef idx="2">
+            <a:schemeClr val="accent1">
+              <a:shade val="50000"/>
+            </a:schemeClr>
+          </a:lnRef>
+          <a:fillRef idx="1">
+            <a:schemeClr val="accent1"/>
+          </a:fillRef>
+          <a:effectRef idx="0">
+            <a:schemeClr val="accent1"/>
+          </a:effectRef>
+          <a:fontRef idx="minor">
+            <a:schemeClr val="lt1"/>
+          </a:fontRef>
+        </p:style>
+        <p:txBody>
+          <a:bodyPr rtlCol="0" anchor="ctr"/>
+          <a:lstStyle/>
+          <a:p>
+            <a:pPr algn="ctr"/>
+            <a:endParaRPr lang="pt-BR"/>
+          </a:p>
+        </p:txBody>
+      </p:sp>
+      <p:cxnSp>
+        <p:nvCxnSpPr>
+          <p:cNvPr id="15" name="Conector angulado 14"/>
+          <p:cNvCxnSpPr>
+            <a:stCxn id="27" idx="1"/>
+            <a:endCxn id="16" idx="0"/>
+          </p:cNvCxnSpPr>
+          <p:nvPr/>
+        </p:nvCxnSpPr>
+        <p:spPr>
+          <a:xfrm rot="10800000" flipH="1" flipV="1">
+            <a:off x="3040185" y="691085"/>
+            <a:ext cx="216398" cy="1143976"/>
+          </a:xfrm>
+          <a:prstGeom prst="bentConnector4">
+            <a:avLst>
+              <a:gd name="adj1" fmla="val -105639"/>
+              <a:gd name="adj2" fmla="val 55717"/>
+            </a:avLst>
+          </a:prstGeom>
+          <a:ln>
+            <a:solidFill>
+              <a:srgbClr val="FF0000"/>
+            </a:solidFill>
+            <a:tailEnd type="triangle"/>
+          </a:ln>
+        </p:spPr>
+        <p:style>
+          <a:lnRef idx="1">
+            <a:schemeClr val="accent1"/>
+          </a:lnRef>
+          <a:fillRef idx="0">
+            <a:schemeClr val="accent1"/>
+          </a:fillRef>
+          <a:effectRef idx="0">
+            <a:schemeClr val="accent1"/>
+          </a:effectRef>
+          <a:fontRef idx="minor">
+            <a:schemeClr val="tx1"/>
+          </a:fontRef>
+        </p:style>
+      </p:cxnSp>
+      <p:sp>
+        <p:nvSpPr>
+          <p:cNvPr id="16" name="Retângulo 15"/>
+          <p:cNvSpPr/>
+          <p:nvPr/>
+        </p:nvSpPr>
+        <p:spPr>
+          <a:xfrm>
+            <a:off x="3158573" y="1835061"/>
+            <a:ext cx="196020" cy="140677"/>
+          </a:xfrm>
+          <a:prstGeom prst="rect">
+            <a:avLst/>
+          </a:prstGeom>
+          <a:noFill/>
+          <a:ln>
+            <a:noFill/>
+          </a:ln>
+        </p:spPr>
+        <p:style>
+          <a:lnRef idx="2">
+            <a:schemeClr val="accent1">
+              <a:shade val="50000"/>
+            </a:schemeClr>
+          </a:lnRef>
+          <a:fillRef idx="1">
+            <a:schemeClr val="accent1"/>
+          </a:fillRef>
+          <a:effectRef idx="0">
+            <a:schemeClr val="accent1"/>
+          </a:effectRef>
+          <a:fontRef idx="minor">
+            <a:schemeClr val="lt1"/>
+          </a:fontRef>
+        </p:style>
+        <p:txBody>
+          <a:bodyPr rtlCol="0" anchor="ctr"/>
+          <a:lstStyle/>
+          <a:p>
+            <a:pPr algn="ctr"/>
+            <a:endParaRPr lang="pt-BR"/>
+          </a:p>
+        </p:txBody>
+      </p:sp>
+      <p:sp>
+        <p:nvSpPr>
+          <p:cNvPr id="20" name="CaixaDeTexto 19"/>
+          <p:cNvSpPr txBox="1"/>
+          <p:nvPr/>
+        </p:nvSpPr>
+        <p:spPr>
+          <a:xfrm>
+            <a:off x="4817549" y="1163247"/>
+            <a:ext cx="1692666" cy="261610"/>
+          </a:xfrm>
+          <a:prstGeom prst="rect">
+            <a:avLst/>
+          </a:prstGeom>
+          <a:noFill/>
+        </p:spPr>
+        <p:txBody>
+          <a:bodyPr wrap="square" rtlCol="0">
+            <a:spAutoFit/>
+          </a:bodyPr>
+          <a:lstStyle/>
+          <a:p>
+            <a:pPr algn="ctr"/>
+            <a:r>
+              <a:rPr lang="pt-BR" sz="1100" b="1" dirty="0" smtClean="0"/>
+              <a:t>D2: Gabor </a:t>
+            </a:r>
+            <a:r>
+              <a:rPr lang="pt-BR" sz="1100" b="1" dirty="0" err="1" smtClean="0"/>
+              <a:t>space</a:t>
+            </a:r>
+            <a:r>
+              <a:rPr lang="pt-BR" sz="1100" b="1" dirty="0" smtClean="0"/>
+              <a:t> display</a:t>
+            </a:r>
+            <a:endParaRPr lang="pt-BR" sz="1100" b="1" dirty="0"/>
+          </a:p>
+        </p:txBody>
+      </p:sp>
+      <p:cxnSp>
+        <p:nvCxnSpPr>
+          <p:cNvPr id="21" name="Conector angulado 20"/>
+          <p:cNvCxnSpPr>
+            <a:stCxn id="20" idx="2"/>
+            <a:endCxn id="22" idx="0"/>
+          </p:cNvCxnSpPr>
+          <p:nvPr/>
+        </p:nvCxnSpPr>
+        <p:spPr>
+          <a:xfrm rot="5400000">
+            <a:off x="5490224" y="1598515"/>
+            <a:ext cx="347317" cy="12700"/>
+          </a:xfrm>
+          <a:prstGeom prst="bentConnector3">
+            <a:avLst>
+              <a:gd name="adj1" fmla="val 50000"/>
+            </a:avLst>
+          </a:prstGeom>
+          <a:ln>
+            <a:solidFill>
+              <a:srgbClr val="FF0000"/>
+            </a:solidFill>
+            <a:tailEnd type="triangle"/>
+          </a:ln>
+        </p:spPr>
+        <p:style>
+          <a:lnRef idx="1">
+            <a:schemeClr val="accent1"/>
+          </a:lnRef>
+          <a:fillRef idx="0">
+            <a:schemeClr val="accent1"/>
+          </a:fillRef>
+          <a:effectRef idx="0">
+            <a:schemeClr val="accent1"/>
+          </a:effectRef>
+          <a:fontRef idx="minor">
+            <a:schemeClr val="tx1"/>
+          </a:fontRef>
+        </p:style>
+      </p:cxnSp>
+      <p:sp>
+        <p:nvSpPr>
+          <p:cNvPr id="22" name="Retângulo 21"/>
+          <p:cNvSpPr/>
+          <p:nvPr/>
+        </p:nvSpPr>
+        <p:spPr>
+          <a:xfrm>
+            <a:off x="5565872" y="1772174"/>
+            <a:ext cx="196020" cy="140677"/>
+          </a:xfrm>
+          <a:prstGeom prst="rect">
+            <a:avLst/>
+          </a:prstGeom>
+          <a:noFill/>
+          <a:ln>
+            <a:noFill/>
+          </a:ln>
+        </p:spPr>
+        <p:style>
+          <a:lnRef idx="2">
+            <a:schemeClr val="accent1">
+              <a:shade val="50000"/>
+            </a:schemeClr>
+          </a:lnRef>
+          <a:fillRef idx="1">
+            <a:schemeClr val="accent1"/>
+          </a:fillRef>
+          <a:effectRef idx="0">
+            <a:schemeClr val="accent1"/>
+          </a:effectRef>
+          <a:fontRef idx="minor">
+            <a:schemeClr val="lt1"/>
+          </a:fontRef>
+        </p:style>
+        <p:txBody>
+          <a:bodyPr rtlCol="0" anchor="ctr"/>
+          <a:lstStyle/>
+          <a:p>
+            <a:pPr algn="ctr"/>
+            <a:endParaRPr lang="pt-BR"/>
+          </a:p>
+        </p:txBody>
+      </p:sp>
+      <p:sp>
+        <p:nvSpPr>
+          <p:cNvPr id="27" name="CaixaDeTexto 26"/>
+          <p:cNvSpPr txBox="1"/>
+          <p:nvPr/>
+        </p:nvSpPr>
+        <p:spPr>
+          <a:xfrm>
+            <a:off x="3040185" y="560280"/>
+            <a:ext cx="1914769" cy="261610"/>
+          </a:xfrm>
+          <a:prstGeom prst="rect">
+            <a:avLst/>
+          </a:prstGeom>
+          <a:noFill/>
+        </p:spPr>
+        <p:txBody>
+          <a:bodyPr wrap="square" rtlCol="0">
+            <a:spAutoFit/>
+          </a:bodyPr>
+          <a:lstStyle/>
+          <a:p>
+            <a:pPr algn="ctr"/>
+            <a:r>
+              <a:rPr lang="pt-BR" sz="1100" b="1" dirty="0" smtClean="0"/>
+              <a:t>B1: opens </a:t>
+            </a:r>
+            <a:r>
+              <a:rPr lang="pt-BR" sz="1100" b="1" dirty="0" err="1" smtClean="0"/>
+              <a:t>the</a:t>
+            </a:r>
+            <a:r>
+              <a:rPr lang="pt-BR" sz="1100" b="1" dirty="0" smtClean="0"/>
+              <a:t> scanner </a:t>
+            </a:r>
+            <a:r>
+              <a:rPr lang="pt-BR" sz="1100" b="1" dirty="0" err="1" smtClean="0"/>
+              <a:t>dialog</a:t>
+            </a:r>
+            <a:endParaRPr lang="pt-BR" sz="1100" b="1" dirty="0"/>
+          </a:p>
+        </p:txBody>
+      </p:sp>
+      <p:sp>
+        <p:nvSpPr>
+          <p:cNvPr id="31" name="CaixaDeTexto 30"/>
+          <p:cNvSpPr txBox="1"/>
+          <p:nvPr/>
+        </p:nvSpPr>
+        <p:spPr>
+          <a:xfrm>
+            <a:off x="250094" y="2897443"/>
+            <a:ext cx="1086338" cy="430887"/>
+          </a:xfrm>
+          <a:prstGeom prst="rect">
+            <a:avLst/>
+          </a:prstGeom>
+          <a:noFill/>
+        </p:spPr>
+        <p:txBody>
+          <a:bodyPr wrap="square" rtlCol="0">
+            <a:spAutoFit/>
+          </a:bodyPr>
+          <a:lstStyle/>
+          <a:p>
+            <a:pPr algn="ctr"/>
+            <a:r>
+              <a:rPr lang="pt-BR" sz="1100" b="1" dirty="0" smtClean="0"/>
+              <a:t>B3: </a:t>
+            </a:r>
+            <a:r>
+              <a:rPr lang="pt-BR" sz="1100" b="1" dirty="0" err="1" smtClean="0"/>
+              <a:t>refresh</a:t>
+            </a:r>
+            <a:r>
+              <a:rPr lang="pt-BR" sz="1100" b="1" dirty="0" smtClean="0"/>
+              <a:t> </a:t>
+            </a:r>
+          </a:p>
+          <a:p>
+            <a:pPr algn="ctr"/>
+            <a:r>
+              <a:rPr lang="pt-BR" sz="1100" b="1" dirty="0" err="1" smtClean="0"/>
+              <a:t>kernel</a:t>
+            </a:r>
+            <a:r>
+              <a:rPr lang="pt-BR" sz="1100" b="1" dirty="0" smtClean="0"/>
+              <a:t> displays</a:t>
+            </a:r>
+            <a:endParaRPr lang="pt-BR" sz="1100" b="1" dirty="0"/>
+          </a:p>
+        </p:txBody>
+      </p:sp>
+      <p:cxnSp>
+        <p:nvCxnSpPr>
+          <p:cNvPr id="32" name="Conector angulado 31"/>
+          <p:cNvCxnSpPr>
+            <a:stCxn id="58" idx="1"/>
+            <a:endCxn id="33" idx="2"/>
+          </p:cNvCxnSpPr>
+          <p:nvPr/>
+        </p:nvCxnSpPr>
+        <p:spPr>
+          <a:xfrm rot="10800000">
+            <a:off x="3605415" y="4682226"/>
+            <a:ext cx="333244" cy="812873"/>
+          </a:xfrm>
+          <a:prstGeom prst="bentConnector2">
+            <a:avLst/>
+          </a:prstGeom>
+          <a:ln>
+            <a:solidFill>
+              <a:srgbClr val="FF0000"/>
+            </a:solidFill>
+            <a:tailEnd type="triangle"/>
+          </a:ln>
+        </p:spPr>
+        <p:style>
+          <a:lnRef idx="1">
+            <a:schemeClr val="accent1"/>
+          </a:lnRef>
+          <a:fillRef idx="0">
+            <a:schemeClr val="accent1"/>
+          </a:fillRef>
+          <a:effectRef idx="0">
+            <a:schemeClr val="accent1"/>
+          </a:effectRef>
+          <a:fontRef idx="minor">
+            <a:schemeClr val="tx1"/>
+          </a:fontRef>
+        </p:style>
+      </p:cxnSp>
+      <p:sp>
+        <p:nvSpPr>
+          <p:cNvPr id="33" name="Retângulo 32"/>
+          <p:cNvSpPr/>
+          <p:nvPr/>
+        </p:nvSpPr>
+        <p:spPr>
+          <a:xfrm>
+            <a:off x="3507405" y="4541548"/>
+            <a:ext cx="196020" cy="140677"/>
+          </a:xfrm>
+          <a:prstGeom prst="rect">
+            <a:avLst/>
+          </a:prstGeom>
+          <a:noFill/>
+          <a:ln>
+            <a:noFill/>
+          </a:ln>
+        </p:spPr>
+        <p:style>
+          <a:lnRef idx="2">
+            <a:schemeClr val="accent1">
+              <a:shade val="50000"/>
+            </a:schemeClr>
+          </a:lnRef>
+          <a:fillRef idx="1">
+            <a:schemeClr val="accent1"/>
+          </a:fillRef>
+          <a:effectRef idx="0">
+            <a:schemeClr val="accent1"/>
+          </a:effectRef>
+          <a:fontRef idx="minor">
+            <a:schemeClr val="lt1"/>
+          </a:fontRef>
+        </p:style>
+        <p:txBody>
+          <a:bodyPr rtlCol="0" anchor="ctr"/>
+          <a:lstStyle/>
+          <a:p>
+            <a:pPr algn="ctr"/>
+            <a:endParaRPr lang="pt-BR"/>
+          </a:p>
+        </p:txBody>
+      </p:sp>
+      <p:cxnSp>
+        <p:nvCxnSpPr>
+          <p:cNvPr id="34" name="Conector angulado 33"/>
+          <p:cNvCxnSpPr>
+            <a:stCxn id="31" idx="3"/>
+            <a:endCxn id="35" idx="1"/>
+          </p:cNvCxnSpPr>
+          <p:nvPr/>
+        </p:nvCxnSpPr>
+        <p:spPr>
+          <a:xfrm flipV="1">
+            <a:off x="1336432" y="2876336"/>
+            <a:ext cx="2179856" cy="236551"/>
+          </a:xfrm>
+          <a:prstGeom prst="bentConnector3">
+            <a:avLst>
+              <a:gd name="adj1" fmla="val 50000"/>
+            </a:avLst>
+          </a:prstGeom>
+          <a:ln>
+            <a:solidFill>
+              <a:srgbClr val="FF0000"/>
+            </a:solidFill>
+            <a:tailEnd type="triangle"/>
+          </a:ln>
+        </p:spPr>
+        <p:style>
+          <a:lnRef idx="1">
+            <a:schemeClr val="accent1"/>
+          </a:lnRef>
+          <a:fillRef idx="0">
+            <a:schemeClr val="accent1"/>
+          </a:fillRef>
+          <a:effectRef idx="0">
+            <a:schemeClr val="accent1"/>
+          </a:effectRef>
+          <a:fontRef idx="minor">
+            <a:schemeClr val="tx1"/>
+          </a:fontRef>
+        </p:style>
+      </p:cxnSp>
+      <p:sp>
+        <p:nvSpPr>
+          <p:cNvPr id="35" name="Retângulo 34"/>
+          <p:cNvSpPr/>
+          <p:nvPr/>
+        </p:nvSpPr>
+        <p:spPr>
+          <a:xfrm>
+            <a:off x="3516288" y="2773634"/>
+            <a:ext cx="196020" cy="205403"/>
+          </a:xfrm>
+          <a:prstGeom prst="rect">
+            <a:avLst/>
+          </a:prstGeom>
+          <a:noFill/>
+          <a:ln>
+            <a:noFill/>
+          </a:ln>
+        </p:spPr>
+        <p:style>
+          <a:lnRef idx="2">
+            <a:schemeClr val="accent1">
+              <a:shade val="50000"/>
+            </a:schemeClr>
+          </a:lnRef>
+          <a:fillRef idx="1">
+            <a:schemeClr val="accent1"/>
+          </a:fillRef>
+          <a:effectRef idx="0">
+            <a:schemeClr val="accent1"/>
+          </a:effectRef>
+          <a:fontRef idx="minor">
+            <a:schemeClr val="lt1"/>
+          </a:fontRef>
+        </p:style>
+        <p:txBody>
+          <a:bodyPr rtlCol="0" anchor="ctr"/>
+          <a:lstStyle/>
+          <a:p>
+            <a:pPr algn="ctr"/>
+            <a:endParaRPr lang="pt-BR"/>
+          </a:p>
+        </p:txBody>
+      </p:sp>
+      <p:sp>
+        <p:nvSpPr>
+          <p:cNvPr id="42" name="Retângulo 41"/>
+          <p:cNvSpPr/>
+          <p:nvPr/>
+        </p:nvSpPr>
+        <p:spPr>
+          <a:xfrm>
+            <a:off x="1844431" y="3390850"/>
+            <a:ext cx="1867877" cy="884165"/>
+          </a:xfrm>
+          <a:prstGeom prst="rect">
+            <a:avLst/>
+          </a:prstGeom>
+          <a:noFill/>
+          <a:ln>
+            <a:solidFill>
+              <a:srgbClr val="FF0000"/>
+            </a:solidFill>
+          </a:ln>
+        </p:spPr>
+        <p:style>
+          <a:lnRef idx="2">
+            <a:schemeClr val="accent1">
+              <a:shade val="50000"/>
+            </a:schemeClr>
+          </a:lnRef>
+          <a:fillRef idx="1">
+            <a:schemeClr val="accent1"/>
+          </a:fillRef>
+          <a:effectRef idx="0">
+            <a:schemeClr val="accent1"/>
+          </a:effectRef>
+          <a:fontRef idx="minor">
+            <a:schemeClr val="lt1"/>
+          </a:fontRef>
+        </p:style>
+        <p:txBody>
+          <a:bodyPr rtlCol="0" anchor="ctr"/>
+          <a:lstStyle/>
+          <a:p>
+            <a:pPr algn="ctr"/>
+            <a:endParaRPr lang="pt-BR"/>
+          </a:p>
+        </p:txBody>
+      </p:sp>
+      <p:cxnSp>
+        <p:nvCxnSpPr>
+          <p:cNvPr id="43" name="Conector angulado 42"/>
+          <p:cNvCxnSpPr>
+            <a:stCxn id="46" idx="3"/>
+            <a:endCxn id="42" idx="1"/>
+          </p:cNvCxnSpPr>
+          <p:nvPr/>
+        </p:nvCxnSpPr>
+        <p:spPr>
+          <a:xfrm>
+            <a:off x="1367692" y="3831606"/>
+            <a:ext cx="476739" cy="1327"/>
+          </a:xfrm>
+          <a:prstGeom prst="bentConnector3">
+            <a:avLst>
+              <a:gd name="adj1" fmla="val 50000"/>
+            </a:avLst>
+          </a:prstGeom>
+          <a:ln>
+            <a:solidFill>
+              <a:srgbClr val="FF0000"/>
+            </a:solidFill>
+            <a:tailEnd type="triangle"/>
+          </a:ln>
+        </p:spPr>
+        <p:style>
+          <a:lnRef idx="1">
+            <a:schemeClr val="accent1"/>
+          </a:lnRef>
+          <a:fillRef idx="0">
+            <a:schemeClr val="accent1"/>
+          </a:fillRef>
+          <a:effectRef idx="0">
+            <a:schemeClr val="accent1"/>
+          </a:effectRef>
+          <a:fontRef idx="minor">
+            <a:schemeClr val="tx1"/>
+          </a:fontRef>
+        </p:style>
+      </p:cxnSp>
+      <p:sp>
+        <p:nvSpPr>
+          <p:cNvPr id="46" name="CaixaDeTexto 45"/>
+          <p:cNvSpPr txBox="1"/>
+          <p:nvPr/>
+        </p:nvSpPr>
+        <p:spPr>
+          <a:xfrm>
+            <a:off x="281354" y="3446885"/>
+            <a:ext cx="1086338" cy="769441"/>
+          </a:xfrm>
+          <a:prstGeom prst="rect">
+            <a:avLst/>
+          </a:prstGeom>
+          <a:noFill/>
+        </p:spPr>
+        <p:txBody>
+          <a:bodyPr wrap="square" rtlCol="0">
+            <a:spAutoFit/>
+          </a:bodyPr>
+          <a:lstStyle/>
+          <a:p>
+            <a:pPr algn="ctr"/>
+            <a:r>
+              <a:rPr lang="pt-BR" sz="1100" b="1" dirty="0" smtClean="0"/>
+              <a:t>D3: </a:t>
+            </a:r>
+            <a:r>
+              <a:rPr lang="pt-BR" sz="1100" b="1" dirty="0" err="1" smtClean="0"/>
+              <a:t>kernel</a:t>
+            </a:r>
+            <a:r>
+              <a:rPr lang="pt-BR" sz="1100" b="1" dirty="0" smtClean="0"/>
+              <a:t> displays (min. </a:t>
+            </a:r>
+            <a:r>
+              <a:rPr lang="pt-BR" sz="1100" b="1" dirty="0" err="1" smtClean="0"/>
+              <a:t>and</a:t>
+            </a:r>
+            <a:r>
+              <a:rPr lang="pt-BR" sz="1100" b="1" dirty="0" smtClean="0"/>
+              <a:t> </a:t>
+            </a:r>
+            <a:r>
+              <a:rPr lang="pt-BR" sz="1100" b="1" dirty="0" err="1" smtClean="0"/>
+              <a:t>max</a:t>
+            </a:r>
+            <a:r>
+              <a:rPr lang="pt-BR" sz="1100" b="1" dirty="0" smtClean="0"/>
+              <a:t>. </a:t>
+            </a:r>
+            <a:r>
+              <a:rPr lang="pt-BR" sz="1100" b="1" dirty="0" err="1" smtClean="0"/>
+              <a:t>frequencies</a:t>
+            </a:r>
+            <a:r>
+              <a:rPr lang="pt-BR" sz="1100" b="1" dirty="0" smtClean="0"/>
+              <a:t>)</a:t>
+            </a:r>
+            <a:endParaRPr lang="pt-BR" sz="1100" b="1" dirty="0"/>
+          </a:p>
+        </p:txBody>
+      </p:sp>
+      <p:sp>
+        <p:nvSpPr>
+          <p:cNvPr id="49" name="Retângulo 48"/>
+          <p:cNvSpPr/>
+          <p:nvPr/>
+        </p:nvSpPr>
+        <p:spPr>
+          <a:xfrm>
+            <a:off x="1844433" y="2135144"/>
+            <a:ext cx="1867876" cy="574468"/>
+          </a:xfrm>
+          <a:prstGeom prst="rect">
+            <a:avLst/>
+          </a:prstGeom>
+          <a:noFill/>
+          <a:ln>
+            <a:solidFill>
+              <a:srgbClr val="FF0000"/>
+            </a:solidFill>
+          </a:ln>
+        </p:spPr>
+        <p:style>
+          <a:lnRef idx="2">
+            <a:schemeClr val="accent1">
+              <a:shade val="50000"/>
+            </a:schemeClr>
+          </a:lnRef>
+          <a:fillRef idx="1">
+            <a:schemeClr val="accent1"/>
+          </a:fillRef>
+          <a:effectRef idx="0">
+            <a:schemeClr val="accent1"/>
+          </a:effectRef>
+          <a:fontRef idx="minor">
+            <a:schemeClr val="lt1"/>
+          </a:fontRef>
+        </p:style>
+        <p:txBody>
+          <a:bodyPr rtlCol="0" anchor="ctr"/>
+          <a:lstStyle/>
+          <a:p>
+            <a:pPr algn="ctr"/>
+            <a:endParaRPr lang="pt-BR"/>
+          </a:p>
+        </p:txBody>
+      </p:sp>
+      <p:cxnSp>
+        <p:nvCxnSpPr>
+          <p:cNvPr id="51" name="Conector angulado 50"/>
+          <p:cNvCxnSpPr>
+            <a:stCxn id="54" idx="2"/>
+            <a:endCxn id="49" idx="1"/>
+          </p:cNvCxnSpPr>
+          <p:nvPr/>
+        </p:nvCxnSpPr>
+        <p:spPr>
+          <a:xfrm rot="16200000" flipH="1">
+            <a:off x="1016203" y="1594148"/>
+            <a:ext cx="1300406" cy="356053"/>
+          </a:xfrm>
+          <a:prstGeom prst="bentConnector2">
+            <a:avLst/>
+          </a:prstGeom>
+          <a:ln>
+            <a:solidFill>
+              <a:srgbClr val="FF0000"/>
+            </a:solidFill>
+            <a:tailEnd type="triangle"/>
+          </a:ln>
+        </p:spPr>
+        <p:style>
+          <a:lnRef idx="1">
+            <a:schemeClr val="accent1"/>
+          </a:lnRef>
+          <a:fillRef idx="0">
+            <a:schemeClr val="accent1"/>
+          </a:fillRef>
+          <a:effectRef idx="0">
+            <a:schemeClr val="accent1"/>
+          </a:effectRef>
+          <a:fontRef idx="minor">
+            <a:schemeClr val="tx1"/>
+          </a:fontRef>
+        </p:style>
+      </p:cxnSp>
+      <p:sp>
+        <p:nvSpPr>
+          <p:cNvPr id="54" name="CaixaDeTexto 53"/>
+          <p:cNvSpPr txBox="1"/>
+          <p:nvPr/>
+        </p:nvSpPr>
+        <p:spPr>
+          <a:xfrm>
+            <a:off x="493265" y="691085"/>
+            <a:ext cx="1990229" cy="430887"/>
+          </a:xfrm>
+          <a:prstGeom prst="rect">
+            <a:avLst/>
+          </a:prstGeom>
+          <a:noFill/>
+        </p:spPr>
+        <p:txBody>
+          <a:bodyPr wrap="square" rtlCol="0">
+            <a:spAutoFit/>
+          </a:bodyPr>
+          <a:lstStyle/>
+          <a:p>
+            <a:pPr algn="ctr"/>
+            <a:r>
+              <a:rPr lang="pt-BR" sz="1100" b="1" dirty="0" smtClean="0"/>
+              <a:t>D1: </a:t>
+            </a:r>
+            <a:r>
+              <a:rPr lang="pt-BR" sz="1100" b="1" dirty="0" err="1" smtClean="0"/>
+              <a:t>kernel</a:t>
+            </a:r>
+            <a:r>
+              <a:rPr lang="pt-BR" sz="1100" b="1" dirty="0" smtClean="0"/>
+              <a:t> </a:t>
+            </a:r>
+            <a:r>
+              <a:rPr lang="pt-BR" sz="1100" b="1" dirty="0" err="1" smtClean="0"/>
+              <a:t>frequency</a:t>
+            </a:r>
+            <a:r>
+              <a:rPr lang="pt-BR" sz="1100" b="1" dirty="0" smtClean="0"/>
+              <a:t> </a:t>
+            </a:r>
+            <a:r>
+              <a:rPr lang="pt-BR" sz="1100" b="1" dirty="0" err="1" smtClean="0"/>
+              <a:t>to</a:t>
+            </a:r>
+            <a:r>
+              <a:rPr lang="pt-BR" sz="1100" b="1" dirty="0" smtClean="0"/>
+              <a:t> </a:t>
+            </a:r>
+            <a:r>
+              <a:rPr lang="pt-BR" sz="1100" b="1" dirty="0" err="1" smtClean="0"/>
+              <a:t>spatial</a:t>
+            </a:r>
+            <a:r>
+              <a:rPr lang="pt-BR" sz="1100" b="1" dirty="0" smtClean="0"/>
+              <a:t> </a:t>
+            </a:r>
+            <a:r>
+              <a:rPr lang="pt-BR" sz="1100" b="1" dirty="0" err="1" smtClean="0"/>
+              <a:t>size</a:t>
+            </a:r>
+            <a:r>
+              <a:rPr lang="pt-BR" sz="1100" b="1" dirty="0" smtClean="0"/>
+              <a:t> </a:t>
+            </a:r>
+            <a:r>
+              <a:rPr lang="pt-BR" sz="1100" b="1" dirty="0" err="1" smtClean="0"/>
+              <a:t>conversion</a:t>
+            </a:r>
+            <a:r>
+              <a:rPr lang="pt-BR" sz="1100" b="1" dirty="0" smtClean="0"/>
+              <a:t> display</a:t>
+            </a:r>
+            <a:endParaRPr lang="pt-BR" sz="1100" b="1" dirty="0"/>
+          </a:p>
+        </p:txBody>
+      </p:sp>
+      <p:sp>
+        <p:nvSpPr>
+          <p:cNvPr id="58" name="CaixaDeTexto 57"/>
+          <p:cNvSpPr txBox="1"/>
+          <p:nvPr/>
+        </p:nvSpPr>
+        <p:spPr>
+          <a:xfrm>
+            <a:off x="3938659" y="5364293"/>
+            <a:ext cx="2071371" cy="261610"/>
+          </a:xfrm>
+          <a:prstGeom prst="rect">
+            <a:avLst/>
+          </a:prstGeom>
+          <a:noFill/>
+        </p:spPr>
+        <p:txBody>
+          <a:bodyPr wrap="square" rtlCol="0">
+            <a:spAutoFit/>
+          </a:bodyPr>
+          <a:lstStyle/>
+          <a:p>
+            <a:pPr algn="ctr"/>
+            <a:r>
+              <a:rPr lang="pt-BR" sz="1100" b="1" dirty="0" smtClean="0"/>
+              <a:t>B4: </a:t>
+            </a:r>
+            <a:r>
+              <a:rPr lang="pt-BR" sz="1100" b="1" dirty="0" err="1" smtClean="0"/>
+              <a:t>updates</a:t>
+            </a:r>
+            <a:r>
+              <a:rPr lang="pt-BR" sz="1100" b="1" dirty="0" smtClean="0"/>
+              <a:t> Gabor </a:t>
+            </a:r>
+            <a:r>
+              <a:rPr lang="pt-BR" sz="1100" b="1" dirty="0" err="1" smtClean="0"/>
+              <a:t>space</a:t>
+            </a:r>
+            <a:r>
+              <a:rPr lang="pt-BR" sz="1100" b="1" dirty="0" smtClean="0"/>
+              <a:t> display</a:t>
+            </a:r>
+            <a:endParaRPr lang="pt-BR" sz="1100" b="1" dirty="0"/>
+          </a:p>
+        </p:txBody>
+      </p:sp>
+      <p:cxnSp>
+        <p:nvCxnSpPr>
+          <p:cNvPr id="62" name="Conector angulado 61"/>
+          <p:cNvCxnSpPr>
+            <a:stCxn id="64" idx="1"/>
+            <a:endCxn id="63" idx="2"/>
+          </p:cNvCxnSpPr>
+          <p:nvPr/>
+        </p:nvCxnSpPr>
+        <p:spPr>
+          <a:xfrm rot="10800000">
+            <a:off x="2454296" y="5065235"/>
+            <a:ext cx="333245" cy="633120"/>
+          </a:xfrm>
+          <a:prstGeom prst="bentConnector2">
+            <a:avLst/>
+          </a:prstGeom>
+          <a:ln>
+            <a:solidFill>
+              <a:srgbClr val="FF0000"/>
+            </a:solidFill>
+            <a:tailEnd type="triangle"/>
+          </a:ln>
+        </p:spPr>
+        <p:style>
+          <a:lnRef idx="1">
+            <a:schemeClr val="accent1"/>
+          </a:lnRef>
+          <a:fillRef idx="0">
+            <a:schemeClr val="accent1"/>
+          </a:fillRef>
+          <a:effectRef idx="0">
+            <a:schemeClr val="accent1"/>
+          </a:effectRef>
+          <a:fontRef idx="minor">
+            <a:schemeClr val="tx1"/>
+          </a:fontRef>
+        </p:style>
+      </p:cxnSp>
+      <p:sp>
+        <p:nvSpPr>
+          <p:cNvPr id="63" name="Retângulo 62"/>
+          <p:cNvSpPr/>
+          <p:nvPr/>
+        </p:nvSpPr>
+        <p:spPr>
+          <a:xfrm>
+            <a:off x="2356285" y="4924558"/>
+            <a:ext cx="196020" cy="140677"/>
+          </a:xfrm>
+          <a:prstGeom prst="rect">
+            <a:avLst/>
+          </a:prstGeom>
+          <a:noFill/>
+          <a:ln>
+            <a:noFill/>
+          </a:ln>
+        </p:spPr>
+        <p:style>
+          <a:lnRef idx="2">
+            <a:schemeClr val="accent1">
+              <a:shade val="50000"/>
+            </a:schemeClr>
+          </a:lnRef>
+          <a:fillRef idx="1">
+            <a:schemeClr val="accent1"/>
+          </a:fillRef>
+          <a:effectRef idx="0">
+            <a:schemeClr val="accent1"/>
+          </a:effectRef>
+          <a:fontRef idx="minor">
+            <a:schemeClr val="lt1"/>
+          </a:fontRef>
+        </p:style>
+        <p:txBody>
+          <a:bodyPr rtlCol="0" anchor="ctr"/>
+          <a:lstStyle/>
+          <a:p>
+            <a:pPr algn="ctr"/>
+            <a:endParaRPr lang="pt-BR"/>
+          </a:p>
+        </p:txBody>
+      </p:sp>
+      <p:sp>
+        <p:nvSpPr>
+          <p:cNvPr id="64" name="CaixaDeTexto 63"/>
+          <p:cNvSpPr txBox="1"/>
+          <p:nvPr/>
+        </p:nvSpPr>
+        <p:spPr>
+          <a:xfrm>
+            <a:off x="2787540" y="5567550"/>
+            <a:ext cx="1948584" cy="261610"/>
+          </a:xfrm>
+          <a:prstGeom prst="rect">
+            <a:avLst/>
+          </a:prstGeom>
+          <a:noFill/>
+        </p:spPr>
+        <p:txBody>
+          <a:bodyPr wrap="square" rtlCol="0">
+            <a:spAutoFit/>
+          </a:bodyPr>
+          <a:lstStyle/>
+          <a:p>
+            <a:pPr algn="ctr"/>
+            <a:r>
+              <a:rPr lang="pt-BR" sz="1100" b="1" dirty="0" smtClean="0"/>
+              <a:t>B6: </a:t>
+            </a:r>
+            <a:r>
+              <a:rPr lang="pt-BR" sz="1100" b="1" dirty="0" err="1" smtClean="0"/>
+              <a:t>saves</a:t>
+            </a:r>
+            <a:r>
+              <a:rPr lang="pt-BR" sz="1100" b="1" dirty="0" smtClean="0"/>
+              <a:t> </a:t>
+            </a:r>
+            <a:r>
+              <a:rPr lang="pt-BR" sz="1100" b="1" dirty="0" err="1" smtClean="0"/>
+              <a:t>filtered</a:t>
+            </a:r>
+            <a:r>
+              <a:rPr lang="pt-BR" sz="1100" b="1" dirty="0" smtClean="0"/>
+              <a:t> </a:t>
+            </a:r>
+            <a:r>
+              <a:rPr lang="pt-BR" sz="1100" b="1" dirty="0" err="1" smtClean="0"/>
+              <a:t>result</a:t>
+            </a:r>
+            <a:r>
+              <a:rPr lang="pt-BR" sz="1100" b="1" dirty="0" smtClean="0"/>
+              <a:t> </a:t>
+            </a:r>
+            <a:r>
+              <a:rPr lang="pt-BR" sz="1100" b="1" dirty="0" err="1" smtClean="0"/>
+              <a:t>to</a:t>
+            </a:r>
+            <a:r>
+              <a:rPr lang="pt-BR" sz="1100" b="1" dirty="0" smtClean="0"/>
+              <a:t> file</a:t>
+            </a:r>
+            <a:endParaRPr lang="pt-BR" sz="1100" b="1" dirty="0"/>
+          </a:p>
+        </p:txBody>
+      </p:sp>
+      <p:cxnSp>
+        <p:nvCxnSpPr>
+          <p:cNvPr id="66" name="Conector angulado 65"/>
+          <p:cNvCxnSpPr>
+            <a:stCxn id="68" idx="1"/>
+            <a:endCxn id="67" idx="2"/>
+          </p:cNvCxnSpPr>
+          <p:nvPr/>
+        </p:nvCxnSpPr>
+        <p:spPr>
+          <a:xfrm rot="10800000">
+            <a:off x="2242506" y="5055202"/>
+            <a:ext cx="333244" cy="851948"/>
+          </a:xfrm>
+          <a:prstGeom prst="bentConnector2">
+            <a:avLst/>
+          </a:prstGeom>
+          <a:ln>
+            <a:solidFill>
+              <a:srgbClr val="FF0000"/>
+            </a:solidFill>
+            <a:tailEnd type="triangle"/>
+          </a:ln>
+        </p:spPr>
+        <p:style>
+          <a:lnRef idx="1">
+            <a:schemeClr val="accent1"/>
+          </a:lnRef>
+          <a:fillRef idx="0">
+            <a:schemeClr val="accent1"/>
+          </a:fillRef>
+          <a:effectRef idx="0">
+            <a:schemeClr val="accent1"/>
+          </a:effectRef>
+          <a:fontRef idx="minor">
+            <a:schemeClr val="tx1"/>
+          </a:fontRef>
+        </p:style>
+      </p:cxnSp>
+      <p:sp>
+        <p:nvSpPr>
+          <p:cNvPr id="67" name="Retângulo 66"/>
+          <p:cNvSpPr/>
+          <p:nvPr/>
+        </p:nvSpPr>
+        <p:spPr>
+          <a:xfrm>
+            <a:off x="2144496" y="4914525"/>
+            <a:ext cx="196020" cy="140677"/>
+          </a:xfrm>
+          <a:prstGeom prst="rect">
+            <a:avLst/>
+          </a:prstGeom>
+          <a:noFill/>
+          <a:ln>
+            <a:noFill/>
+          </a:ln>
+        </p:spPr>
+        <p:style>
+          <a:lnRef idx="2">
+            <a:schemeClr val="accent1">
+              <a:shade val="50000"/>
+            </a:schemeClr>
+          </a:lnRef>
+          <a:fillRef idx="1">
+            <a:schemeClr val="accent1"/>
+          </a:fillRef>
+          <a:effectRef idx="0">
+            <a:schemeClr val="accent1"/>
+          </a:effectRef>
+          <a:fontRef idx="minor">
+            <a:schemeClr val="lt1"/>
+          </a:fontRef>
+        </p:style>
+        <p:txBody>
+          <a:bodyPr rtlCol="0" anchor="ctr"/>
+          <a:lstStyle/>
+          <a:p>
+            <a:pPr algn="ctr"/>
+            <a:endParaRPr lang="pt-BR"/>
+          </a:p>
+        </p:txBody>
+      </p:sp>
+      <p:sp>
+        <p:nvSpPr>
+          <p:cNvPr id="68" name="CaixaDeTexto 67"/>
+          <p:cNvSpPr txBox="1"/>
+          <p:nvPr/>
+        </p:nvSpPr>
+        <p:spPr>
+          <a:xfrm>
+            <a:off x="2575750" y="5776345"/>
+            <a:ext cx="2832496" cy="261610"/>
+          </a:xfrm>
+          <a:prstGeom prst="rect">
+            <a:avLst/>
+          </a:prstGeom>
+          <a:noFill/>
+        </p:spPr>
+        <p:txBody>
+          <a:bodyPr wrap="square" rtlCol="0">
+            <a:spAutoFit/>
+          </a:bodyPr>
+          <a:lstStyle/>
+          <a:p>
+            <a:pPr algn="ctr"/>
+            <a:r>
+              <a:rPr lang="pt-BR" sz="1100" b="1" dirty="0" smtClean="0"/>
+              <a:t>B5: computes </a:t>
+            </a:r>
+            <a:r>
+              <a:rPr lang="pt-BR" sz="1100" b="1" dirty="0" err="1" smtClean="0"/>
+              <a:t>and</a:t>
+            </a:r>
+            <a:r>
+              <a:rPr lang="pt-BR" sz="1100" b="1" dirty="0" smtClean="0"/>
+              <a:t> displays </a:t>
+            </a:r>
+            <a:r>
+              <a:rPr lang="pt-BR" sz="1100" b="1" dirty="0" err="1" smtClean="0"/>
+              <a:t>the</a:t>
+            </a:r>
+            <a:r>
+              <a:rPr lang="pt-BR" sz="1100" b="1" dirty="0" smtClean="0"/>
+              <a:t> </a:t>
+            </a:r>
+            <a:r>
+              <a:rPr lang="pt-BR" sz="1100" b="1" dirty="0" err="1" smtClean="0"/>
+              <a:t>filtered</a:t>
+            </a:r>
+            <a:r>
+              <a:rPr lang="pt-BR" sz="1100" b="1" dirty="0" smtClean="0"/>
+              <a:t> </a:t>
+            </a:r>
+            <a:r>
+              <a:rPr lang="pt-BR" sz="1100" b="1" dirty="0" err="1" smtClean="0"/>
+              <a:t>result</a:t>
+            </a:r>
+            <a:endParaRPr lang="pt-BR" sz="1100" b="1" dirty="0"/>
+          </a:p>
+        </p:txBody>
+      </p:sp>
+    </p:spTree>
+    <p:extLst>
+      <p:ext uri="{BB962C8B-B14F-4D97-AF65-F5344CB8AC3E}">
+        <p14:creationId xmlns:p14="http://schemas.microsoft.com/office/powerpoint/2010/main" val="2190953065"/>
+      </p:ext>
+    </p:extLst>
+  </p:cSld>
+  <p:clrMapOvr>
+    <a:masterClrMapping/>
+  </p:clrMapOvr>
+  <p:timing>
+    <p:tnLst>
+      <p:par>
+        <p:cTn id="1" dur="indefinite" restart="never" nodeType="tmRoot"/>
+      </p:par>
+    </p:tnLst>
+  </p:timing>
+</p:sld>
+</file>
+
+<file path=ppt/slides/slide17.xml><?xml version="1.0" encoding="utf-8"?>
+<p:sld xmlns:a="http://schemas.openxmlformats.org/drawingml/2006/main" xmlns:r="http://schemas.openxmlformats.org/officeDocument/2006/relationships" xmlns:p="http://schemas.openxmlformats.org/presentationml/2006/main">
+  <p:cSld>
+    <p:spTree>
+      <p:nvGrpSpPr>
+        <p:cNvPr id="1" name=""/>
+        <p:cNvGrpSpPr/>
+        <p:nvPr/>
+      </p:nvGrpSpPr>
+      <p:grpSpPr>
+        <a:xfrm>
+          <a:off x="0" y="0"/>
+          <a:ext cx="0" cy="0"/>
+          <a:chOff x="0" y="0"/>
+          <a:chExt cx="0" cy="0"/>
+        </a:xfrm>
+      </p:grpSpPr>
+      <p:pic>
+        <p:nvPicPr>
+          <p:cNvPr id="4" name="Imagem 3"/>
+          <p:cNvPicPr>
+            <a:picLocks noChangeAspect="1"/>
+          </p:cNvPicPr>
+          <p:nvPr/>
+        </p:nvPicPr>
+        <p:blipFill>
+          <a:blip r:embed="rId2"/>
+          <a:stretch>
+            <a:fillRect/>
+          </a:stretch>
+        </p:blipFill>
+        <p:spPr>
+          <a:xfrm>
+            <a:off x="1199418" y="875594"/>
+            <a:ext cx="4945810" cy="3678360"/>
+          </a:xfrm>
+          <a:prstGeom prst="rect">
+            <a:avLst/>
+          </a:prstGeom>
+        </p:spPr>
+      </p:pic>
+      <p:cxnSp>
+        <p:nvCxnSpPr>
+          <p:cNvPr id="5" name="Conector angulado 4"/>
+          <p:cNvCxnSpPr>
+            <a:stCxn id="7" idx="1"/>
+            <a:endCxn id="6" idx="3"/>
+          </p:cNvCxnSpPr>
+          <p:nvPr/>
+        </p:nvCxnSpPr>
+        <p:spPr>
+          <a:xfrm rot="10800000" flipV="1">
+            <a:off x="5408247" y="3470895"/>
+            <a:ext cx="857141" cy="1"/>
+          </a:xfrm>
+          <a:prstGeom prst="bentConnector3">
+            <a:avLst>
+              <a:gd name="adj1" fmla="val 50000"/>
+            </a:avLst>
+          </a:prstGeom>
+          <a:ln>
+            <a:solidFill>
+              <a:srgbClr val="FF0000"/>
+            </a:solidFill>
+            <a:tailEnd type="triangle"/>
+          </a:ln>
+        </p:spPr>
+        <p:style>
+          <a:lnRef idx="1">
+            <a:schemeClr val="accent1"/>
+          </a:lnRef>
+          <a:fillRef idx="0">
+            <a:schemeClr val="accent1"/>
+          </a:fillRef>
+          <a:effectRef idx="0">
+            <a:schemeClr val="accent1"/>
+          </a:effectRef>
+          <a:fontRef idx="minor">
+            <a:schemeClr val="tx1"/>
+          </a:fontRef>
+        </p:style>
+      </p:cxnSp>
+      <p:sp>
+        <p:nvSpPr>
+          <p:cNvPr id="6" name="Retângulo 5"/>
+          <p:cNvSpPr/>
+          <p:nvPr/>
+        </p:nvSpPr>
+        <p:spPr>
+          <a:xfrm>
+            <a:off x="5212226" y="3400558"/>
+            <a:ext cx="196020" cy="140677"/>
+          </a:xfrm>
+          <a:prstGeom prst="rect">
+            <a:avLst/>
+          </a:prstGeom>
+          <a:noFill/>
+          <a:ln>
+            <a:noFill/>
+          </a:ln>
+        </p:spPr>
+        <p:style>
+          <a:lnRef idx="2">
+            <a:schemeClr val="accent1">
+              <a:shade val="50000"/>
+            </a:schemeClr>
+          </a:lnRef>
+          <a:fillRef idx="1">
+            <a:schemeClr val="accent1"/>
+          </a:fillRef>
+          <a:effectRef idx="0">
+            <a:schemeClr val="accent1"/>
+          </a:effectRef>
+          <a:fontRef idx="minor">
+            <a:schemeClr val="lt1"/>
+          </a:fontRef>
+        </p:style>
+        <p:txBody>
+          <a:bodyPr rtlCol="0" anchor="ctr"/>
+          <a:lstStyle/>
+          <a:p>
+            <a:pPr algn="ctr"/>
+            <a:endParaRPr lang="pt-BR"/>
+          </a:p>
+        </p:txBody>
+      </p:sp>
+      <p:sp>
+        <p:nvSpPr>
+          <p:cNvPr id="7" name="CaixaDeTexto 6"/>
+          <p:cNvSpPr txBox="1"/>
+          <p:nvPr/>
+        </p:nvSpPr>
+        <p:spPr>
+          <a:xfrm>
+            <a:off x="6265387" y="3340091"/>
+            <a:ext cx="1198306" cy="261610"/>
+          </a:xfrm>
+          <a:prstGeom prst="rect">
+            <a:avLst/>
+          </a:prstGeom>
+          <a:noFill/>
+        </p:spPr>
+        <p:txBody>
+          <a:bodyPr wrap="square" rtlCol="0">
+            <a:spAutoFit/>
+          </a:bodyPr>
+          <a:lstStyle/>
+          <a:p>
+            <a:pPr algn="ctr"/>
+            <a:r>
+              <a:rPr lang="pt-BR" sz="1100" b="1" dirty="0" err="1" smtClean="0"/>
+              <a:t>frequency</a:t>
+            </a:r>
+            <a:r>
+              <a:rPr lang="pt-BR" sz="1100" b="1" dirty="0" smtClean="0"/>
+              <a:t> </a:t>
+            </a:r>
+            <a:r>
+              <a:rPr lang="pt-BR" sz="1100" b="1" dirty="0" err="1" smtClean="0"/>
+              <a:t>scale</a:t>
+            </a:r>
+            <a:endParaRPr lang="pt-BR" sz="1100" b="1" dirty="0"/>
+          </a:p>
+        </p:txBody>
+      </p:sp>
+      <p:cxnSp>
+        <p:nvCxnSpPr>
+          <p:cNvPr id="8" name="Conector angulado 7"/>
+          <p:cNvCxnSpPr>
+            <a:stCxn id="10" idx="2"/>
+            <a:endCxn id="9" idx="0"/>
+          </p:cNvCxnSpPr>
+          <p:nvPr/>
+        </p:nvCxnSpPr>
+        <p:spPr>
+          <a:xfrm rot="16200000" flipH="1">
+            <a:off x="3037911" y="1091036"/>
+            <a:ext cx="792883" cy="7815"/>
+          </a:xfrm>
+          <a:prstGeom prst="bentConnector3">
+            <a:avLst>
+              <a:gd name="adj1" fmla="val 50000"/>
+            </a:avLst>
+          </a:prstGeom>
+          <a:ln>
+            <a:solidFill>
+              <a:srgbClr val="FF0000"/>
+            </a:solidFill>
+            <a:tailEnd type="triangle"/>
+          </a:ln>
+        </p:spPr>
+        <p:style>
+          <a:lnRef idx="1">
+            <a:schemeClr val="accent1"/>
+          </a:lnRef>
+          <a:fillRef idx="0">
+            <a:schemeClr val="accent1"/>
+          </a:fillRef>
+          <a:effectRef idx="0">
+            <a:schemeClr val="accent1"/>
+          </a:effectRef>
+          <a:fontRef idx="minor">
+            <a:schemeClr val="tx1"/>
+          </a:fontRef>
+        </p:style>
+      </p:cxnSp>
+      <p:sp>
+        <p:nvSpPr>
+          <p:cNvPr id="9" name="Retângulo 8"/>
+          <p:cNvSpPr/>
+          <p:nvPr/>
+        </p:nvSpPr>
+        <p:spPr>
+          <a:xfrm>
+            <a:off x="3340250" y="1491386"/>
+            <a:ext cx="196020" cy="140677"/>
+          </a:xfrm>
+          <a:prstGeom prst="rect">
+            <a:avLst/>
+          </a:prstGeom>
+          <a:noFill/>
+          <a:ln>
+            <a:noFill/>
+          </a:ln>
+        </p:spPr>
+        <p:style>
+          <a:lnRef idx="2">
+            <a:schemeClr val="accent1">
+              <a:shade val="50000"/>
+            </a:schemeClr>
+          </a:lnRef>
+          <a:fillRef idx="1">
+            <a:schemeClr val="accent1"/>
+          </a:fillRef>
+          <a:effectRef idx="0">
+            <a:schemeClr val="accent1"/>
+          </a:effectRef>
+          <a:fontRef idx="minor">
+            <a:schemeClr val="lt1"/>
+          </a:fontRef>
+        </p:style>
+        <p:txBody>
+          <a:bodyPr rtlCol="0" anchor="ctr"/>
+          <a:lstStyle/>
+          <a:p>
+            <a:pPr algn="ctr"/>
+            <a:endParaRPr lang="pt-BR"/>
+          </a:p>
+        </p:txBody>
+      </p:sp>
+      <p:sp>
+        <p:nvSpPr>
+          <p:cNvPr id="10" name="CaixaDeTexto 9"/>
+          <p:cNvSpPr txBox="1"/>
+          <p:nvPr/>
+        </p:nvSpPr>
+        <p:spPr>
+          <a:xfrm>
+            <a:off x="2764474" y="436893"/>
+            <a:ext cx="1331942" cy="261610"/>
+          </a:xfrm>
+          <a:prstGeom prst="rect">
+            <a:avLst/>
+          </a:prstGeom>
+          <a:noFill/>
+        </p:spPr>
+        <p:txBody>
+          <a:bodyPr wrap="square" rtlCol="0">
+            <a:spAutoFit/>
+          </a:bodyPr>
+          <a:lstStyle/>
+          <a:p>
+            <a:pPr algn="ctr"/>
+            <a:r>
+              <a:rPr lang="pt-BR" sz="1100" b="1" dirty="0" err="1" smtClean="0"/>
+              <a:t>azimuth</a:t>
+            </a:r>
+            <a:r>
+              <a:rPr lang="pt-BR" sz="1100" b="1" dirty="0" smtClean="0"/>
+              <a:t> </a:t>
+            </a:r>
+            <a:r>
+              <a:rPr lang="pt-BR" sz="1100" b="1" dirty="0" err="1" smtClean="0"/>
+              <a:t>scale</a:t>
+            </a:r>
+            <a:endParaRPr lang="pt-BR" sz="1100" b="1" dirty="0"/>
+          </a:p>
+        </p:txBody>
+      </p:sp>
+      <p:cxnSp>
+        <p:nvCxnSpPr>
+          <p:cNvPr id="24" name="Conector angulado 23"/>
+          <p:cNvCxnSpPr>
+            <a:stCxn id="26" idx="1"/>
+            <a:endCxn id="25" idx="0"/>
+          </p:cNvCxnSpPr>
+          <p:nvPr/>
+        </p:nvCxnSpPr>
+        <p:spPr>
+          <a:xfrm rot="10800000" flipV="1">
+            <a:off x="5669287" y="1135264"/>
+            <a:ext cx="589408" cy="215443"/>
+          </a:xfrm>
+          <a:prstGeom prst="bentConnector2">
+            <a:avLst/>
+          </a:prstGeom>
+          <a:ln>
+            <a:solidFill>
+              <a:srgbClr val="FF0000"/>
+            </a:solidFill>
+            <a:tailEnd type="triangle"/>
+          </a:ln>
+        </p:spPr>
+        <p:style>
+          <a:lnRef idx="1">
+            <a:schemeClr val="accent1"/>
+          </a:lnRef>
+          <a:fillRef idx="0">
+            <a:schemeClr val="accent1"/>
+          </a:fillRef>
+          <a:effectRef idx="0">
+            <a:schemeClr val="accent1"/>
+          </a:effectRef>
+          <a:fontRef idx="minor">
+            <a:schemeClr val="tx1"/>
+          </a:fontRef>
+        </p:style>
+      </p:cxnSp>
+      <p:sp>
+        <p:nvSpPr>
+          <p:cNvPr id="25" name="Retângulo 24"/>
+          <p:cNvSpPr/>
+          <p:nvPr/>
+        </p:nvSpPr>
+        <p:spPr>
+          <a:xfrm>
+            <a:off x="5571277" y="1350708"/>
+            <a:ext cx="196020" cy="140677"/>
+          </a:xfrm>
+          <a:prstGeom prst="rect">
+            <a:avLst/>
+          </a:prstGeom>
+          <a:noFill/>
+          <a:ln>
+            <a:noFill/>
+          </a:ln>
+        </p:spPr>
+        <p:style>
+          <a:lnRef idx="2">
+            <a:schemeClr val="accent1">
+              <a:shade val="50000"/>
+            </a:schemeClr>
+          </a:lnRef>
+          <a:fillRef idx="1">
+            <a:schemeClr val="accent1"/>
+          </a:fillRef>
+          <a:effectRef idx="0">
+            <a:schemeClr val="accent1"/>
+          </a:effectRef>
+          <a:fontRef idx="minor">
+            <a:schemeClr val="lt1"/>
+          </a:fontRef>
+        </p:style>
+        <p:txBody>
+          <a:bodyPr rtlCol="0" anchor="ctr"/>
+          <a:lstStyle/>
+          <a:p>
+            <a:pPr algn="ctr"/>
+            <a:endParaRPr lang="pt-BR"/>
+          </a:p>
+        </p:txBody>
+      </p:sp>
+      <p:sp>
+        <p:nvSpPr>
+          <p:cNvPr id="26" name="CaixaDeTexto 25"/>
+          <p:cNvSpPr txBox="1"/>
+          <p:nvPr/>
+        </p:nvSpPr>
+        <p:spPr>
+          <a:xfrm>
+            <a:off x="6258695" y="919821"/>
+            <a:ext cx="1198306" cy="430887"/>
+          </a:xfrm>
+          <a:prstGeom prst="rect">
+            <a:avLst/>
+          </a:prstGeom>
+          <a:noFill/>
+        </p:spPr>
+        <p:txBody>
+          <a:bodyPr wrap="square" rtlCol="0">
+            <a:spAutoFit/>
+          </a:bodyPr>
+          <a:lstStyle/>
+          <a:p>
+            <a:pPr algn="ctr"/>
+            <a:r>
+              <a:rPr lang="pt-BR" sz="1100" b="1" dirty="0" err="1" smtClean="0"/>
+              <a:t>mean</a:t>
+            </a:r>
+            <a:r>
+              <a:rPr lang="pt-BR" sz="1100" b="1" dirty="0" smtClean="0"/>
+              <a:t> response amplitude</a:t>
+            </a:r>
+            <a:endParaRPr lang="pt-BR" sz="1100" b="1" dirty="0"/>
+          </a:p>
+        </p:txBody>
+      </p:sp>
+    </p:spTree>
+    <p:extLst>
+      <p:ext uri="{BB962C8B-B14F-4D97-AF65-F5344CB8AC3E}">
+        <p14:creationId xmlns:p14="http://schemas.microsoft.com/office/powerpoint/2010/main" val="1995761876"/>
+      </p:ext>
+    </p:extLst>
+  </p:cSld>
+  <p:clrMapOvr>
+    <a:masterClrMapping/>
+  </p:clrMapOvr>
+  <p:timing>
+    <p:tnLst>
+      <p:par>
+        <p:cTn id="1" dur="indefinite" restart="never" nodeType="tmRoot"/>
+      </p:par>
+    </p:tnLst>
+  </p:timing>
+</p:sld>
+</file>
+
+<file path=ppt/slides/slide18.xml><?xml version="1.0" encoding="utf-8"?>
+<p:sld xmlns:a="http://schemas.openxmlformats.org/drawingml/2006/main" xmlns:r="http://schemas.openxmlformats.org/officeDocument/2006/relationships" xmlns:p="http://schemas.openxmlformats.org/presentationml/2006/main">
+  <p:cSld>
+    <p:spTree>
+      <p:nvGrpSpPr>
+        <p:cNvPr id="1" name=""/>
+        <p:cNvGrpSpPr/>
+        <p:nvPr/>
+      </p:nvGrpSpPr>
+      <p:grpSpPr>
+        <a:xfrm>
+          <a:off x="0" y="0"/>
+          <a:ext cx="0" cy="0"/>
+          <a:chOff x="0" y="0"/>
+          <a:chExt cx="0" cy="0"/>
+        </a:xfrm>
+      </p:grpSpPr>
+      <p:pic>
+        <p:nvPicPr>
+          <p:cNvPr id="16" name="Imagem 15"/>
+          <p:cNvPicPr>
+            <a:picLocks noChangeAspect="1"/>
+          </p:cNvPicPr>
+          <p:nvPr/>
+        </p:nvPicPr>
+        <p:blipFill>
+          <a:blip r:embed="rId2"/>
+          <a:stretch>
+            <a:fillRect/>
+          </a:stretch>
+        </p:blipFill>
+        <p:spPr>
+          <a:xfrm>
+            <a:off x="360040" y="249593"/>
+            <a:ext cx="8244408" cy="4331535"/>
+          </a:xfrm>
+          <a:prstGeom prst="rect">
+            <a:avLst/>
+          </a:prstGeom>
+          <a:ln>
+            <a:solidFill>
+              <a:schemeClr val="tx1"/>
+            </a:solidFill>
+          </a:ln>
+        </p:spPr>
+      </p:pic>
+      <p:sp>
+        <p:nvSpPr>
+          <p:cNvPr id="17" name="CaixaDeTexto 16"/>
+          <p:cNvSpPr txBox="1"/>
+          <p:nvPr/>
+        </p:nvSpPr>
+        <p:spPr>
+          <a:xfrm>
+            <a:off x="3835971" y="4242574"/>
+            <a:ext cx="1043171" cy="338554"/>
+          </a:xfrm>
+          <a:prstGeom prst="rect">
+            <a:avLst/>
+          </a:prstGeom>
+          <a:noFill/>
+        </p:spPr>
+        <p:txBody>
+          <a:bodyPr wrap="none" rtlCol="0">
+            <a:spAutoFit/>
+          </a:bodyPr>
+          <a:lstStyle/>
+          <a:p>
+            <a:r>
+              <a:rPr lang="pt-BR" sz="1600" b="1" dirty="0" err="1" smtClean="0"/>
+              <a:t>frequency</a:t>
+            </a:r>
+            <a:endParaRPr lang="pt-BR" sz="1600" b="1" dirty="0"/>
+          </a:p>
+        </p:txBody>
+      </p:sp>
+      <p:sp>
+        <p:nvSpPr>
+          <p:cNvPr id="18" name="CaixaDeTexto 17"/>
+          <p:cNvSpPr txBox="1"/>
+          <p:nvPr/>
+        </p:nvSpPr>
+        <p:spPr>
+          <a:xfrm rot="16200000">
+            <a:off x="91537" y="1963104"/>
+            <a:ext cx="875561" cy="338554"/>
+          </a:xfrm>
+          <a:prstGeom prst="rect">
+            <a:avLst/>
+          </a:prstGeom>
+          <a:noFill/>
+        </p:spPr>
+        <p:txBody>
+          <a:bodyPr wrap="none" rtlCol="0">
+            <a:spAutoFit/>
+          </a:bodyPr>
+          <a:lstStyle/>
+          <a:p>
+            <a:r>
+              <a:rPr lang="pt-BR" sz="1600" b="1" dirty="0" err="1" smtClean="0"/>
+              <a:t>azimuth</a:t>
+            </a:r>
+            <a:endParaRPr lang="pt-BR" sz="1600" b="1" dirty="0"/>
+          </a:p>
+        </p:txBody>
+      </p:sp>
+      <p:sp>
+        <p:nvSpPr>
+          <p:cNvPr id="19" name="CaixaDeTexto 18"/>
+          <p:cNvSpPr txBox="1"/>
+          <p:nvPr/>
+        </p:nvSpPr>
+        <p:spPr>
+          <a:xfrm rot="5400000">
+            <a:off x="7421287" y="1808983"/>
+            <a:ext cx="1875129" cy="338554"/>
+          </a:xfrm>
+          <a:prstGeom prst="rect">
+            <a:avLst/>
+          </a:prstGeom>
+          <a:noFill/>
+        </p:spPr>
+        <p:txBody>
+          <a:bodyPr wrap="none" rtlCol="0">
+            <a:spAutoFit/>
+          </a:bodyPr>
+          <a:lstStyle/>
+          <a:p>
+            <a:r>
+              <a:rPr lang="pt-BR" sz="1600" b="1" dirty="0" smtClean="0"/>
+              <a:t>response amplitude</a:t>
+            </a:r>
+            <a:endParaRPr lang="pt-BR" sz="1600" b="1" dirty="0"/>
+          </a:p>
+        </p:txBody>
+      </p:sp>
+      <p:sp>
+        <p:nvSpPr>
+          <p:cNvPr id="20" name="Retângulo 19"/>
+          <p:cNvSpPr/>
+          <p:nvPr/>
+        </p:nvSpPr>
+        <p:spPr>
+          <a:xfrm>
+            <a:off x="890650" y="392790"/>
+            <a:ext cx="329132" cy="3600400"/>
+          </a:xfrm>
+          <a:prstGeom prst="rect">
+            <a:avLst/>
+          </a:prstGeom>
+          <a:noFill/>
+          <a:ln>
+            <a:solidFill>
+              <a:srgbClr val="FFFF00"/>
+            </a:solidFill>
+            <a:prstDash val="sysDot"/>
+          </a:ln>
+        </p:spPr>
+        <p:style>
+          <a:lnRef idx="2">
+            <a:schemeClr val="accent1">
+              <a:shade val="50000"/>
+            </a:schemeClr>
+          </a:lnRef>
+          <a:fillRef idx="1">
+            <a:schemeClr val="accent1"/>
+          </a:fillRef>
+          <a:effectRef idx="0">
+            <a:schemeClr val="accent1"/>
+          </a:effectRef>
+          <a:fontRef idx="minor">
+            <a:schemeClr val="lt1"/>
+          </a:fontRef>
+        </p:style>
+        <p:txBody>
+          <a:bodyPr rtlCol="0" anchor="ctr"/>
+          <a:lstStyle/>
+          <a:p>
+            <a:pPr algn="ctr"/>
+            <a:endParaRPr lang="pt-BR"/>
+          </a:p>
+        </p:txBody>
+      </p:sp>
+      <p:sp>
+        <p:nvSpPr>
+          <p:cNvPr id="21" name="Retângulo 20"/>
+          <p:cNvSpPr/>
+          <p:nvPr/>
+        </p:nvSpPr>
+        <p:spPr>
+          <a:xfrm>
+            <a:off x="1296105" y="392789"/>
+            <a:ext cx="306047" cy="3600400"/>
+          </a:xfrm>
+          <a:prstGeom prst="rect">
+            <a:avLst/>
+          </a:prstGeom>
+          <a:noFill/>
+          <a:ln>
+            <a:solidFill>
+              <a:srgbClr val="FFFF00"/>
+            </a:solidFill>
+            <a:prstDash val="sysDot"/>
+          </a:ln>
+        </p:spPr>
+        <p:style>
+          <a:lnRef idx="2">
+            <a:schemeClr val="accent1">
+              <a:shade val="50000"/>
+            </a:schemeClr>
+          </a:lnRef>
+          <a:fillRef idx="1">
+            <a:schemeClr val="accent1"/>
+          </a:fillRef>
+          <a:effectRef idx="0">
+            <a:schemeClr val="accent1"/>
+          </a:effectRef>
+          <a:fontRef idx="minor">
+            <a:schemeClr val="lt1"/>
+          </a:fontRef>
+        </p:style>
+        <p:txBody>
+          <a:bodyPr rtlCol="0" anchor="ctr"/>
+          <a:lstStyle/>
+          <a:p>
+            <a:pPr algn="ctr"/>
+            <a:endParaRPr lang="pt-BR"/>
+          </a:p>
+        </p:txBody>
+      </p:sp>
+      <p:sp>
+        <p:nvSpPr>
+          <p:cNvPr id="22" name="Retângulo 21"/>
+          <p:cNvSpPr/>
+          <p:nvPr/>
+        </p:nvSpPr>
+        <p:spPr>
+          <a:xfrm>
+            <a:off x="1496163" y="1149347"/>
+            <a:ext cx="4299973" cy="335437"/>
+          </a:xfrm>
+          <a:prstGeom prst="rect">
+            <a:avLst/>
+          </a:prstGeom>
+          <a:noFill/>
+          <a:ln>
+            <a:solidFill>
+              <a:srgbClr val="FFFF00"/>
+            </a:solidFill>
+            <a:prstDash val="sysDot"/>
+          </a:ln>
+        </p:spPr>
+        <p:style>
+          <a:lnRef idx="2">
+            <a:schemeClr val="accent1">
+              <a:shade val="50000"/>
+            </a:schemeClr>
+          </a:lnRef>
+          <a:fillRef idx="1">
+            <a:schemeClr val="accent1"/>
+          </a:fillRef>
+          <a:effectRef idx="0">
+            <a:schemeClr val="accent1"/>
+          </a:effectRef>
+          <a:fontRef idx="minor">
+            <a:schemeClr val="lt1"/>
+          </a:fontRef>
+        </p:style>
+        <p:txBody>
+          <a:bodyPr rtlCol="0" anchor="ctr"/>
+          <a:lstStyle/>
+          <a:p>
+            <a:pPr algn="ctr"/>
+            <a:endParaRPr lang="pt-BR"/>
+          </a:p>
+        </p:txBody>
+      </p:sp>
+      <p:sp>
+        <p:nvSpPr>
+          <p:cNvPr id="23" name="Retângulo 22"/>
+          <p:cNvSpPr/>
+          <p:nvPr/>
+        </p:nvSpPr>
+        <p:spPr>
+          <a:xfrm>
+            <a:off x="1602152" y="2996951"/>
+            <a:ext cx="6138200" cy="120267"/>
+          </a:xfrm>
+          <a:prstGeom prst="rect">
+            <a:avLst/>
+          </a:prstGeom>
+          <a:noFill/>
+          <a:ln>
+            <a:solidFill>
+              <a:srgbClr val="FFFF00"/>
+            </a:solidFill>
+            <a:prstDash val="sysDot"/>
+          </a:ln>
+        </p:spPr>
+        <p:style>
+          <a:lnRef idx="2">
+            <a:schemeClr val="accent1">
+              <a:shade val="50000"/>
+            </a:schemeClr>
+          </a:lnRef>
+          <a:fillRef idx="1">
+            <a:schemeClr val="accent1"/>
+          </a:fillRef>
+          <a:effectRef idx="0">
+            <a:schemeClr val="accent1"/>
+          </a:effectRef>
+          <a:fontRef idx="minor">
+            <a:schemeClr val="lt1"/>
+          </a:fontRef>
+        </p:style>
+        <p:txBody>
+          <a:bodyPr rtlCol="0" anchor="ctr"/>
+          <a:lstStyle/>
+          <a:p>
+            <a:pPr algn="ctr"/>
+            <a:endParaRPr lang="pt-BR"/>
+          </a:p>
+        </p:txBody>
+      </p:sp>
+      <p:pic>
+        <p:nvPicPr>
+          <p:cNvPr id="24" name="Imagem 23"/>
+          <p:cNvPicPr>
+            <a:picLocks noChangeAspect="1"/>
+          </p:cNvPicPr>
+          <p:nvPr/>
+        </p:nvPicPr>
+        <p:blipFill>
+          <a:blip r:embed="rId3"/>
+          <a:stretch>
+            <a:fillRect/>
+          </a:stretch>
+        </p:blipFill>
+        <p:spPr>
+          <a:xfrm>
+            <a:off x="386574" y="4932665"/>
+            <a:ext cx="2037577" cy="1664687"/>
+          </a:xfrm>
+          <a:prstGeom prst="rect">
+            <a:avLst/>
+          </a:prstGeom>
+          <a:ln>
+            <a:solidFill>
+              <a:schemeClr val="tx1"/>
+            </a:solidFill>
+          </a:ln>
+        </p:spPr>
+      </p:pic>
+      <p:pic>
+        <p:nvPicPr>
+          <p:cNvPr id="25" name="Imagem 24"/>
+          <p:cNvPicPr>
+            <a:picLocks noChangeAspect="1"/>
+          </p:cNvPicPr>
+          <p:nvPr/>
+        </p:nvPicPr>
+        <p:blipFill>
+          <a:blip r:embed="rId4"/>
+          <a:stretch>
+            <a:fillRect/>
+          </a:stretch>
+        </p:blipFill>
+        <p:spPr>
+          <a:xfrm>
+            <a:off x="2426548" y="4931854"/>
+            <a:ext cx="2060478" cy="1665498"/>
+          </a:xfrm>
+          <a:prstGeom prst="rect">
+            <a:avLst/>
+          </a:prstGeom>
+          <a:ln>
+            <a:solidFill>
+              <a:schemeClr val="tx1"/>
+            </a:solidFill>
+          </a:ln>
+        </p:spPr>
+      </p:pic>
+      <p:pic>
+        <p:nvPicPr>
+          <p:cNvPr id="26" name="Imagem 25"/>
+          <p:cNvPicPr>
+            <a:picLocks noChangeAspect="1"/>
+          </p:cNvPicPr>
+          <p:nvPr/>
+        </p:nvPicPr>
+        <p:blipFill>
+          <a:blip r:embed="rId5"/>
+          <a:stretch>
+            <a:fillRect/>
+          </a:stretch>
+        </p:blipFill>
+        <p:spPr>
+          <a:xfrm>
+            <a:off x="4491030" y="4932666"/>
+            <a:ext cx="2057672" cy="1663230"/>
+          </a:xfrm>
+          <a:prstGeom prst="rect">
+            <a:avLst/>
+          </a:prstGeom>
+          <a:ln>
+            <a:solidFill>
+              <a:schemeClr val="tx1"/>
+            </a:solidFill>
+          </a:ln>
+        </p:spPr>
+      </p:pic>
+      <p:pic>
+        <p:nvPicPr>
+          <p:cNvPr id="27" name="Imagem 26"/>
+          <p:cNvPicPr>
+            <a:picLocks noChangeAspect="1"/>
+          </p:cNvPicPr>
+          <p:nvPr/>
+        </p:nvPicPr>
+        <p:blipFill>
+          <a:blip r:embed="rId6"/>
+          <a:stretch>
+            <a:fillRect/>
+          </a:stretch>
+        </p:blipFill>
+        <p:spPr>
+          <a:xfrm>
+            <a:off x="6542879" y="4932665"/>
+            <a:ext cx="2014069" cy="1663231"/>
+          </a:xfrm>
+          <a:prstGeom prst="rect">
+            <a:avLst/>
+          </a:prstGeom>
+          <a:ln>
+            <a:solidFill>
+              <a:schemeClr val="tx1"/>
+            </a:solidFill>
+          </a:ln>
+        </p:spPr>
+      </p:pic>
+      <p:sp>
+        <p:nvSpPr>
+          <p:cNvPr id="28" name="CaixaDeTexto 27"/>
+          <p:cNvSpPr txBox="1"/>
+          <p:nvPr/>
+        </p:nvSpPr>
+        <p:spPr>
+          <a:xfrm>
+            <a:off x="755576" y="3971661"/>
+            <a:ext cx="471604" cy="400110"/>
+          </a:xfrm>
+          <a:prstGeom prst="rect">
+            <a:avLst/>
+          </a:prstGeom>
+          <a:noFill/>
+        </p:spPr>
+        <p:txBody>
+          <a:bodyPr wrap="none" rtlCol="0">
+            <a:spAutoFit/>
+          </a:bodyPr>
+          <a:lstStyle/>
+          <a:p>
+            <a:r>
+              <a:rPr lang="pt-BR" sz="2000" b="1" dirty="0" smtClean="0">
+                <a:solidFill>
+                  <a:srgbClr val="FF0000"/>
+                </a:solidFill>
+              </a:rPr>
+              <a:t>(a)</a:t>
+            </a:r>
+            <a:endParaRPr lang="pt-BR" sz="2000" b="1" dirty="0">
+              <a:solidFill>
+                <a:srgbClr val="FF0000"/>
+              </a:solidFill>
+            </a:endParaRPr>
+          </a:p>
+        </p:txBody>
+      </p:sp>
+      <p:sp>
+        <p:nvSpPr>
+          <p:cNvPr id="29" name="CaixaDeTexto 28"/>
+          <p:cNvSpPr txBox="1"/>
+          <p:nvPr/>
+        </p:nvSpPr>
+        <p:spPr>
+          <a:xfrm>
+            <a:off x="1220076" y="3964994"/>
+            <a:ext cx="482824" cy="400110"/>
+          </a:xfrm>
+          <a:prstGeom prst="rect">
+            <a:avLst/>
+          </a:prstGeom>
+          <a:noFill/>
+        </p:spPr>
+        <p:txBody>
+          <a:bodyPr wrap="none" rtlCol="0">
+            <a:spAutoFit/>
+          </a:bodyPr>
+          <a:lstStyle/>
+          <a:p>
+            <a:r>
+              <a:rPr lang="pt-BR" sz="2000" b="1" dirty="0" smtClean="0">
+                <a:solidFill>
+                  <a:srgbClr val="FF0000"/>
+                </a:solidFill>
+              </a:rPr>
+              <a:t>(b)</a:t>
+            </a:r>
+            <a:endParaRPr lang="pt-BR" sz="2000" b="1" dirty="0">
+              <a:solidFill>
+                <a:srgbClr val="FF0000"/>
+              </a:solidFill>
+            </a:endParaRPr>
+          </a:p>
+        </p:txBody>
+      </p:sp>
+      <p:sp>
+        <p:nvSpPr>
+          <p:cNvPr id="30" name="CaixaDeTexto 29"/>
+          <p:cNvSpPr txBox="1"/>
+          <p:nvPr/>
+        </p:nvSpPr>
+        <p:spPr>
+          <a:xfrm>
+            <a:off x="3050108" y="1423217"/>
+            <a:ext cx="452368" cy="400110"/>
+          </a:xfrm>
+          <a:prstGeom prst="rect">
+            <a:avLst/>
+          </a:prstGeom>
+          <a:noFill/>
+        </p:spPr>
+        <p:txBody>
+          <a:bodyPr wrap="none" rtlCol="0">
+            <a:spAutoFit/>
+          </a:bodyPr>
+          <a:lstStyle/>
+          <a:p>
+            <a:r>
+              <a:rPr lang="pt-BR" sz="2000" b="1" dirty="0" smtClean="0">
+                <a:solidFill>
+                  <a:srgbClr val="FFFF00"/>
+                </a:solidFill>
+              </a:rPr>
+              <a:t>(c)</a:t>
+            </a:r>
+            <a:endParaRPr lang="pt-BR" sz="2000" b="1" dirty="0">
+              <a:solidFill>
+                <a:srgbClr val="FFFF00"/>
+              </a:solidFill>
+            </a:endParaRPr>
+          </a:p>
+        </p:txBody>
+      </p:sp>
+      <p:sp>
+        <p:nvSpPr>
+          <p:cNvPr id="31" name="CaixaDeTexto 30"/>
+          <p:cNvSpPr txBox="1"/>
+          <p:nvPr/>
+        </p:nvSpPr>
+        <p:spPr>
+          <a:xfrm>
+            <a:off x="5440284" y="3027657"/>
+            <a:ext cx="482824" cy="400110"/>
+          </a:xfrm>
+          <a:prstGeom prst="rect">
+            <a:avLst/>
+          </a:prstGeom>
+          <a:noFill/>
+        </p:spPr>
+        <p:txBody>
+          <a:bodyPr wrap="none" rtlCol="0">
+            <a:spAutoFit/>
+          </a:bodyPr>
+          <a:lstStyle/>
+          <a:p>
+            <a:r>
+              <a:rPr lang="pt-BR" sz="2000" b="1" dirty="0" smtClean="0">
+                <a:solidFill>
+                  <a:srgbClr val="FFFF00"/>
+                </a:solidFill>
+              </a:rPr>
+              <a:t>(d)</a:t>
+            </a:r>
+            <a:endParaRPr lang="pt-BR" sz="2000" b="1" dirty="0">
+              <a:solidFill>
+                <a:srgbClr val="FFFF00"/>
+              </a:solidFill>
+            </a:endParaRPr>
+          </a:p>
+        </p:txBody>
+      </p:sp>
+      <p:sp>
+        <p:nvSpPr>
+          <p:cNvPr id="32" name="CaixaDeTexto 31"/>
+          <p:cNvSpPr txBox="1"/>
+          <p:nvPr/>
+        </p:nvSpPr>
+        <p:spPr>
+          <a:xfrm>
+            <a:off x="1130404" y="4581128"/>
+            <a:ext cx="471604" cy="400110"/>
+          </a:xfrm>
+          <a:prstGeom prst="rect">
+            <a:avLst/>
+          </a:prstGeom>
+          <a:noFill/>
+        </p:spPr>
+        <p:txBody>
+          <a:bodyPr wrap="none" rtlCol="0">
+            <a:spAutoFit/>
+          </a:bodyPr>
+          <a:lstStyle/>
+          <a:p>
+            <a:r>
+              <a:rPr lang="pt-BR" sz="2000" b="1" dirty="0" smtClean="0">
+                <a:solidFill>
+                  <a:srgbClr val="FF0000"/>
+                </a:solidFill>
+              </a:rPr>
+              <a:t>(a)</a:t>
+            </a:r>
+            <a:endParaRPr lang="pt-BR" sz="2000" b="1" dirty="0">
+              <a:solidFill>
+                <a:srgbClr val="FF0000"/>
+              </a:solidFill>
+            </a:endParaRPr>
+          </a:p>
+        </p:txBody>
+      </p:sp>
+      <p:sp>
+        <p:nvSpPr>
+          <p:cNvPr id="33" name="CaixaDeTexto 32"/>
+          <p:cNvSpPr txBox="1"/>
+          <p:nvPr/>
+        </p:nvSpPr>
+        <p:spPr>
+          <a:xfrm>
+            <a:off x="3218636" y="4581128"/>
+            <a:ext cx="482824" cy="400110"/>
+          </a:xfrm>
+          <a:prstGeom prst="rect">
+            <a:avLst/>
+          </a:prstGeom>
+          <a:noFill/>
+        </p:spPr>
+        <p:txBody>
+          <a:bodyPr wrap="none" rtlCol="0">
+            <a:spAutoFit/>
+          </a:bodyPr>
+          <a:lstStyle/>
+          <a:p>
+            <a:r>
+              <a:rPr lang="pt-BR" sz="2000" b="1" dirty="0" smtClean="0">
+                <a:solidFill>
+                  <a:srgbClr val="FF0000"/>
+                </a:solidFill>
+              </a:rPr>
+              <a:t>(b)</a:t>
+            </a:r>
+            <a:endParaRPr lang="pt-BR" sz="2000" b="1" dirty="0">
+              <a:solidFill>
+                <a:srgbClr val="FF0000"/>
+              </a:solidFill>
+            </a:endParaRPr>
+          </a:p>
+        </p:txBody>
+      </p:sp>
+      <p:sp>
+        <p:nvSpPr>
+          <p:cNvPr id="34" name="CaixaDeTexto 33"/>
+          <p:cNvSpPr txBox="1"/>
+          <p:nvPr/>
+        </p:nvSpPr>
+        <p:spPr>
+          <a:xfrm>
+            <a:off x="5328100" y="4613066"/>
+            <a:ext cx="452368" cy="400110"/>
+          </a:xfrm>
+          <a:prstGeom prst="rect">
+            <a:avLst/>
+          </a:prstGeom>
+          <a:noFill/>
+        </p:spPr>
+        <p:txBody>
+          <a:bodyPr wrap="none" rtlCol="0">
+            <a:spAutoFit/>
+          </a:bodyPr>
+          <a:lstStyle/>
+          <a:p>
+            <a:r>
+              <a:rPr lang="pt-BR" sz="2000" b="1" dirty="0" smtClean="0">
+                <a:solidFill>
+                  <a:srgbClr val="FF0000"/>
+                </a:solidFill>
+              </a:rPr>
+              <a:t>(c)</a:t>
+            </a:r>
+            <a:endParaRPr lang="pt-BR" sz="2000" b="1" dirty="0">
+              <a:solidFill>
+                <a:srgbClr val="FF0000"/>
+              </a:solidFill>
+            </a:endParaRPr>
+          </a:p>
+        </p:txBody>
+      </p:sp>
+      <p:sp>
+        <p:nvSpPr>
+          <p:cNvPr id="35" name="CaixaDeTexto 34"/>
+          <p:cNvSpPr txBox="1"/>
+          <p:nvPr/>
+        </p:nvSpPr>
+        <p:spPr>
+          <a:xfrm>
+            <a:off x="7413526" y="4581128"/>
+            <a:ext cx="482824" cy="400110"/>
+          </a:xfrm>
+          <a:prstGeom prst="rect">
+            <a:avLst/>
+          </a:prstGeom>
+          <a:noFill/>
+        </p:spPr>
+        <p:txBody>
+          <a:bodyPr wrap="none" rtlCol="0">
+            <a:spAutoFit/>
+          </a:bodyPr>
+          <a:lstStyle/>
+          <a:p>
+            <a:r>
+              <a:rPr lang="pt-BR" sz="2000" b="1" dirty="0" smtClean="0">
+                <a:solidFill>
+                  <a:srgbClr val="FF0000"/>
+                </a:solidFill>
+              </a:rPr>
+              <a:t>(d)</a:t>
+            </a:r>
+            <a:endParaRPr lang="pt-BR" sz="2000" b="1" dirty="0">
+              <a:solidFill>
+                <a:srgbClr val="FF0000"/>
+              </a:solidFill>
+            </a:endParaRPr>
+          </a:p>
+        </p:txBody>
+      </p:sp>
+      <p:pic>
+        <p:nvPicPr>
+          <p:cNvPr id="36" name="Picture 2"/>
+          <p:cNvPicPr>
+            <a:picLocks noChangeAspect="1" noChangeArrowheads="1"/>
+          </p:cNvPicPr>
+          <p:nvPr/>
+        </p:nvPicPr>
+        <p:blipFill rotWithShape="1">
+          <a:blip r:embed="rId7" cstate="print">
+            <a:extLst>
+              <a:ext uri="{28A0092B-C50C-407E-A947-70E740481C1C}">
+                <a14:useLocalDpi xmlns:a14="http://schemas.microsoft.com/office/drawing/2010/main" val="0"/>
+              </a:ext>
+            </a:extLst>
+          </a:blip>
+          <a:srcRect l="7187" t="4956" r="24310" b="5136"/>
+          <a:stretch/>
+        </p:blipFill>
+        <p:spPr bwMode="auto">
+          <a:xfrm>
+            <a:off x="7172876" y="3167667"/>
+            <a:ext cx="1337975" cy="1331752"/>
+          </a:xfrm>
+          <a:prstGeom prst="rect">
+            <a:avLst/>
+          </a:prstGeom>
+          <a:ln w="38100" cap="sq">
+            <a:solidFill>
+              <a:srgbClr val="000000"/>
+            </a:solidFill>
+            <a:prstDash val="solid"/>
+            <a:miter lim="800000"/>
+          </a:ln>
+          <a:effectLst>
+            <a:outerShdw blurRad="50800" dist="38100" dir="2700000" algn="tl" rotWithShape="0">
+              <a:srgbClr val="000000">
+                <a:alpha val="43000"/>
+              </a:srgbClr>
+            </a:outerShdw>
+          </a:effectLst>
+          <a:extLst>
+            <a:ext uri="{909E8E84-426E-40DD-AFC4-6F175D3DCCD1}">
+              <a14:hiddenFill xmlns:a14="http://schemas.microsoft.com/office/drawing/2010/main">
+                <a:solidFill>
+                  <a:schemeClr val="accent1"/>
+                </a:solidFill>
+              </a14:hiddenFill>
+            </a:ext>
+            <a:ext uri="{91240B29-F687-4F45-9708-019B960494DF}">
+              <a14:hiddenLine xmlns:a14="http://schemas.microsoft.com/office/drawing/2010/main" w="9525">
+                <a:solidFill>
+                  <a:schemeClr val="tx1"/>
+                </a:solidFill>
+                <a:miter lim="800000"/>
+                <a:headEnd/>
+                <a:tailEnd/>
+              </a14:hiddenLine>
+            </a:ext>
+          </a:extLst>
+        </p:spPr>
+      </p:pic>
+    </p:spTree>
+    <p:extLst>
+      <p:ext uri="{BB962C8B-B14F-4D97-AF65-F5344CB8AC3E}">
+        <p14:creationId xmlns:p14="http://schemas.microsoft.com/office/powerpoint/2010/main" val="3727609275"/>
+      </p:ext>
+    </p:extLst>
+  </p:cSld>
+  <p:clrMapOvr>
+    <a:masterClrMapping/>
+  </p:clrMapOvr>
+  <p:timing>
+    <p:tnLst>
+      <p:par>
+        <p:cTn id="1" dur="indefinite" restart="never" nodeType="tmRoot"/>
+      </p:par>
+    </p:tnLst>
+  </p:timing>
+</p:sld>
+</file>
+
+<file path=ppt/slides/slide19.xml><?xml version="1.0" encoding="utf-8"?>
+<p:sld xmlns:a="http://schemas.openxmlformats.org/drawingml/2006/main" xmlns:r="http://schemas.openxmlformats.org/officeDocument/2006/relationships" xmlns:p="http://schemas.openxmlformats.org/presentationml/2006/main">
+  <p:cSld>
+    <p:spTree>
+      <p:nvGrpSpPr>
+        <p:cNvPr id="1" name=""/>
+        <p:cNvGrpSpPr/>
+        <p:nvPr/>
+      </p:nvGrpSpPr>
+      <p:grpSpPr>
+        <a:xfrm>
+          <a:off x="0" y="0"/>
+          <a:ext cx="0" cy="0"/>
+          <a:chOff x="0" y="0"/>
+          <a:chExt cx="0" cy="0"/>
+        </a:xfrm>
+      </p:grpSpPr>
+      <p:pic>
+        <p:nvPicPr>
+          <p:cNvPr id="4" name="Imagem 3"/>
+          <p:cNvPicPr>
+            <a:picLocks noChangeAspect="1"/>
+          </p:cNvPicPr>
+          <p:nvPr/>
+        </p:nvPicPr>
+        <p:blipFill>
+          <a:blip r:embed="rId2"/>
+          <a:stretch>
+            <a:fillRect/>
+          </a:stretch>
+        </p:blipFill>
+        <p:spPr>
+          <a:xfrm>
+            <a:off x="4681537" y="2324100"/>
+            <a:ext cx="2828925" cy="2209800"/>
+          </a:xfrm>
+          <a:prstGeom prst="rect">
+            <a:avLst/>
+          </a:prstGeom>
+        </p:spPr>
+      </p:pic>
+      <p:sp>
+        <p:nvSpPr>
+          <p:cNvPr id="5" name="Retângulo 4"/>
+          <p:cNvSpPr/>
+          <p:nvPr/>
+        </p:nvSpPr>
+        <p:spPr>
+          <a:xfrm>
+            <a:off x="4720492" y="2368062"/>
+            <a:ext cx="1094154" cy="234461"/>
+          </a:xfrm>
+          <a:prstGeom prst="rect">
+            <a:avLst/>
+          </a:prstGeom>
+          <a:noFill/>
+          <a:ln>
+            <a:solidFill>
+              <a:srgbClr val="FF0000"/>
+            </a:solidFill>
+          </a:ln>
+        </p:spPr>
+        <p:style>
+          <a:lnRef idx="2">
+            <a:schemeClr val="accent1">
+              <a:shade val="50000"/>
+            </a:schemeClr>
+          </a:lnRef>
+          <a:fillRef idx="1">
+            <a:schemeClr val="accent1"/>
+          </a:fillRef>
+          <a:effectRef idx="0">
+            <a:schemeClr val="accent1"/>
+          </a:effectRef>
+          <a:fontRef idx="minor">
+            <a:schemeClr val="lt1"/>
+          </a:fontRef>
+        </p:style>
+        <p:txBody>
+          <a:bodyPr rtlCol="0" anchor="ctr"/>
+          <a:lstStyle/>
+          <a:p>
+            <a:pPr algn="ctr"/>
+            <a:endParaRPr lang="pt-BR"/>
+          </a:p>
+        </p:txBody>
+      </p:sp>
+      <p:sp>
+        <p:nvSpPr>
+          <p:cNvPr id="6" name="Retângulo 5"/>
+          <p:cNvSpPr/>
+          <p:nvPr/>
+        </p:nvSpPr>
+        <p:spPr>
+          <a:xfrm>
+            <a:off x="6119443" y="3288324"/>
+            <a:ext cx="1305171" cy="1174261"/>
+          </a:xfrm>
+          <a:prstGeom prst="rect">
+            <a:avLst/>
+          </a:prstGeom>
+          <a:noFill/>
+          <a:ln>
+            <a:solidFill>
+              <a:srgbClr val="FF0000"/>
+            </a:solidFill>
+          </a:ln>
+        </p:spPr>
+        <p:style>
+          <a:lnRef idx="2">
+            <a:schemeClr val="accent1">
+              <a:shade val="50000"/>
+            </a:schemeClr>
+          </a:lnRef>
+          <a:fillRef idx="1">
+            <a:schemeClr val="accent1"/>
+          </a:fillRef>
+          <a:effectRef idx="0">
+            <a:schemeClr val="accent1"/>
+          </a:effectRef>
+          <a:fontRef idx="minor">
+            <a:schemeClr val="lt1"/>
+          </a:fontRef>
+        </p:style>
+        <p:txBody>
+          <a:bodyPr rtlCol="0" anchor="ctr"/>
+          <a:lstStyle/>
+          <a:p>
+            <a:pPr algn="ctr"/>
+            <a:endParaRPr lang="pt-BR"/>
+          </a:p>
+        </p:txBody>
+      </p:sp>
+    </p:spTree>
+    <p:extLst>
+      <p:ext uri="{BB962C8B-B14F-4D97-AF65-F5344CB8AC3E}">
+        <p14:creationId xmlns:p14="http://schemas.microsoft.com/office/powerpoint/2010/main" val="3250476931"/>
       </p:ext>
     </p:extLst>
   </p:cSld>

</xml_diff>

<commit_message>
MCRFSim for Bayesian approach: added documentation to the program's manual introducing and describing the new feature.
</commit_message>
<xml_diff>
--- a/docs/figures.pptx
+++ b/docs/figures.pptx
@@ -34,8 +34,9 @@
     <p:sldId id="279" r:id="rId28"/>
     <p:sldId id="280" r:id="rId29"/>
     <p:sldId id="282" r:id="rId30"/>
-    <p:sldId id="284" r:id="rId31"/>
-    <p:sldId id="285" r:id="rId32"/>
+    <p:sldId id="290" r:id="rId31"/>
+    <p:sldId id="284" r:id="rId32"/>
+    <p:sldId id="285" r:id="rId33"/>
   </p:sldIdLst>
   <p:sldSz cx="12192000" cy="6858000"/>
   <p:notesSz cx="6858000" cy="9144000"/>
@@ -288,7 +289,7 @@
           <a:p>
             <a:fld id="{5827CF75-21ED-4285-9C22-184A8788EFA2}" type="datetimeFigureOut">
               <a:rPr lang="pt-BR" smtClean="0"/>
-              <a:t>03/04/2022</a:t>
+              <a:t>17/04/2023</a:t>
             </a:fld>
             <a:endParaRPr lang="pt-BR"/>
           </a:p>
@@ -456,7 +457,7 @@
           <a:p>
             <a:fld id="{5827CF75-21ED-4285-9C22-184A8788EFA2}" type="datetimeFigureOut">
               <a:rPr lang="pt-BR" smtClean="0"/>
-              <a:t>03/04/2022</a:t>
+              <a:t>17/04/2023</a:t>
             </a:fld>
             <a:endParaRPr lang="pt-BR"/>
           </a:p>
@@ -634,7 +635,7 @@
           <a:p>
             <a:fld id="{5827CF75-21ED-4285-9C22-184A8788EFA2}" type="datetimeFigureOut">
               <a:rPr lang="pt-BR" smtClean="0"/>
-              <a:t>03/04/2022</a:t>
+              <a:t>17/04/2023</a:t>
             </a:fld>
             <a:endParaRPr lang="pt-BR"/>
           </a:p>
@@ -802,7 +803,7 @@
           <a:p>
             <a:fld id="{5827CF75-21ED-4285-9C22-184A8788EFA2}" type="datetimeFigureOut">
               <a:rPr lang="pt-BR" smtClean="0"/>
-              <a:t>03/04/2022</a:t>
+              <a:t>17/04/2023</a:t>
             </a:fld>
             <a:endParaRPr lang="pt-BR"/>
           </a:p>
@@ -1047,7 +1048,7 @@
           <a:p>
             <a:fld id="{5827CF75-21ED-4285-9C22-184A8788EFA2}" type="datetimeFigureOut">
               <a:rPr lang="pt-BR" smtClean="0"/>
-              <a:t>03/04/2022</a:t>
+              <a:t>17/04/2023</a:t>
             </a:fld>
             <a:endParaRPr lang="pt-BR"/>
           </a:p>
@@ -1276,7 +1277,7 @@
           <a:p>
             <a:fld id="{5827CF75-21ED-4285-9C22-184A8788EFA2}" type="datetimeFigureOut">
               <a:rPr lang="pt-BR" smtClean="0"/>
-              <a:t>03/04/2022</a:t>
+              <a:t>17/04/2023</a:t>
             </a:fld>
             <a:endParaRPr lang="pt-BR"/>
           </a:p>
@@ -1640,7 +1641,7 @@
           <a:p>
             <a:fld id="{5827CF75-21ED-4285-9C22-184A8788EFA2}" type="datetimeFigureOut">
               <a:rPr lang="pt-BR" smtClean="0"/>
-              <a:t>03/04/2022</a:t>
+              <a:t>17/04/2023</a:t>
             </a:fld>
             <a:endParaRPr lang="pt-BR"/>
           </a:p>
@@ -1757,7 +1758,7 @@
           <a:p>
             <a:fld id="{5827CF75-21ED-4285-9C22-184A8788EFA2}" type="datetimeFigureOut">
               <a:rPr lang="pt-BR" smtClean="0"/>
-              <a:t>03/04/2022</a:t>
+              <a:t>17/04/2023</a:t>
             </a:fld>
             <a:endParaRPr lang="pt-BR"/>
           </a:p>
@@ -1852,7 +1853,7 @@
           <a:p>
             <a:fld id="{5827CF75-21ED-4285-9C22-184A8788EFA2}" type="datetimeFigureOut">
               <a:rPr lang="pt-BR" smtClean="0"/>
-              <a:t>03/04/2022</a:t>
+              <a:t>17/04/2023</a:t>
             </a:fld>
             <a:endParaRPr lang="pt-BR"/>
           </a:p>
@@ -2127,7 +2128,7 @@
           <a:p>
             <a:fld id="{5827CF75-21ED-4285-9C22-184A8788EFA2}" type="datetimeFigureOut">
               <a:rPr lang="pt-BR" smtClean="0"/>
-              <a:t>03/04/2022</a:t>
+              <a:t>17/04/2023</a:t>
             </a:fld>
             <a:endParaRPr lang="pt-BR"/>
           </a:p>
@@ -2379,7 +2380,7 @@
           <a:p>
             <a:fld id="{5827CF75-21ED-4285-9C22-184A8788EFA2}" type="datetimeFigureOut">
               <a:rPr lang="pt-BR" smtClean="0"/>
-              <a:t>03/04/2022</a:t>
+              <a:t>17/04/2023</a:t>
             </a:fld>
             <a:endParaRPr lang="pt-BR"/>
           </a:p>
@@ -2590,7 +2591,7 @@
           <a:p>
             <a:fld id="{5827CF75-21ED-4285-9C22-184A8788EFA2}" type="datetimeFigureOut">
               <a:rPr lang="pt-BR" smtClean="0"/>
-              <a:t>03/04/2022</a:t>
+              <a:t>17/04/2023</a:t>
             </a:fld>
             <a:endParaRPr lang="pt-BR"/>
           </a:p>
@@ -29337,6 +29338,4015 @@
           <a:chExt cx="0" cy="0"/>
         </a:xfrm>
       </p:grpSpPr>
+      <p:grpSp>
+        <p:nvGrpSpPr>
+          <p:cNvPr id="3" name="Agrupar 2">
+            <a:extLst>
+              <a:ext uri="{FF2B5EF4-FFF2-40B4-BE49-F238E27FC236}">
+                <a16:creationId xmlns:a16="http://schemas.microsoft.com/office/drawing/2014/main" id="{FF66252C-5C68-900A-9D50-1B238F952A27}"/>
+              </a:ext>
+            </a:extLst>
+          </p:cNvPr>
+          <p:cNvGrpSpPr/>
+          <p:nvPr/>
+        </p:nvGrpSpPr>
+        <p:grpSpPr>
+          <a:xfrm>
+            <a:off x="1633671" y="1891056"/>
+            <a:ext cx="3446912" cy="3184849"/>
+            <a:chOff x="1244631" y="981545"/>
+            <a:chExt cx="2064298" cy="1108190"/>
+          </a:xfrm>
+        </p:grpSpPr>
+        <p:sp>
+          <p:nvSpPr>
+            <p:cNvPr id="97" name="CaixaDeTexto 96"/>
+            <p:cNvSpPr txBox="1"/>
+            <p:nvPr/>
+          </p:nvSpPr>
+          <p:spPr>
+            <a:xfrm>
+              <a:off x="1777222" y="1982642"/>
+              <a:ext cx="1146369" cy="107093"/>
+            </a:xfrm>
+            <a:prstGeom prst="rect">
+              <a:avLst/>
+            </a:prstGeom>
+            <a:noFill/>
+          </p:spPr>
+          <p:txBody>
+            <a:bodyPr wrap="none" rtlCol="0">
+              <a:spAutoFit/>
+            </a:bodyPr>
+            <a:lstStyle/>
+            <a:p>
+              <a:r>
+                <a:rPr lang="pt-BR" sz="1400" dirty="0"/>
+                <a:t>model </a:t>
+              </a:r>
+              <a:r>
+                <a:rPr lang="pt-BR" sz="1400" dirty="0" err="1"/>
+                <a:t>parameter</a:t>
+              </a:r>
+              <a:r>
+                <a:rPr lang="pt-BR" sz="1400" dirty="0"/>
+                <a:t> </a:t>
+              </a:r>
+              <a:r>
+                <a:rPr lang="pt-BR" sz="1400" dirty="0" err="1"/>
+                <a:t>space</a:t>
+              </a:r>
+              <a:endParaRPr lang="pt-BR" sz="1400" dirty="0"/>
+            </a:p>
+          </p:txBody>
+        </p:sp>
+        <p:cxnSp>
+          <p:nvCxnSpPr>
+            <p:cNvPr id="98" name="Conector de seta reta 97"/>
+            <p:cNvCxnSpPr/>
+            <p:nvPr/>
+          </p:nvCxnSpPr>
+          <p:spPr>
+            <a:xfrm flipV="1">
+              <a:off x="1481362" y="981545"/>
+              <a:ext cx="0" cy="995218"/>
+            </a:xfrm>
+            <a:prstGeom prst="straightConnector1">
+              <a:avLst/>
+            </a:prstGeom>
+            <a:ln>
+              <a:solidFill>
+                <a:schemeClr val="tx1"/>
+              </a:solidFill>
+              <a:tailEnd type="triangle" w="med" len="lg"/>
+            </a:ln>
+          </p:spPr>
+          <p:style>
+            <a:lnRef idx="1">
+              <a:schemeClr val="accent1"/>
+            </a:lnRef>
+            <a:fillRef idx="0">
+              <a:schemeClr val="accent1"/>
+            </a:fillRef>
+            <a:effectRef idx="0">
+              <a:schemeClr val="accent1"/>
+            </a:effectRef>
+            <a:fontRef idx="minor">
+              <a:schemeClr val="tx1"/>
+            </a:fontRef>
+          </p:style>
+        </p:cxnSp>
+        <p:cxnSp>
+          <p:nvCxnSpPr>
+            <p:cNvPr id="100" name="Conector de seta reta 99"/>
+            <p:cNvCxnSpPr/>
+            <p:nvPr/>
+          </p:nvCxnSpPr>
+          <p:spPr>
+            <a:xfrm flipV="1">
+              <a:off x="1481362" y="1976763"/>
+              <a:ext cx="1819270" cy="1"/>
+            </a:xfrm>
+            <a:prstGeom prst="straightConnector1">
+              <a:avLst/>
+            </a:prstGeom>
+            <a:ln>
+              <a:solidFill>
+                <a:schemeClr val="tx1"/>
+              </a:solidFill>
+              <a:tailEnd type="triangle" w="med" len="lg"/>
+            </a:ln>
+          </p:spPr>
+          <p:style>
+            <a:lnRef idx="1">
+              <a:schemeClr val="accent1"/>
+            </a:lnRef>
+            <a:fillRef idx="0">
+              <a:schemeClr val="accent1"/>
+            </a:fillRef>
+            <a:effectRef idx="0">
+              <a:schemeClr val="accent1"/>
+            </a:effectRef>
+            <a:fontRef idx="minor">
+              <a:schemeClr val="tx1"/>
+            </a:fontRef>
+          </p:style>
+        </p:cxnSp>
+        <p:cxnSp>
+          <p:nvCxnSpPr>
+            <p:cNvPr id="108" name="Conector de seta reta 107"/>
+            <p:cNvCxnSpPr/>
+            <p:nvPr/>
+          </p:nvCxnSpPr>
+          <p:spPr>
+            <a:xfrm flipV="1">
+              <a:off x="1489659" y="996824"/>
+              <a:ext cx="1819270" cy="1"/>
+            </a:xfrm>
+            <a:prstGeom prst="straightConnector1">
+              <a:avLst/>
+            </a:prstGeom>
+            <a:ln>
+              <a:solidFill>
+                <a:schemeClr val="tx1"/>
+              </a:solidFill>
+              <a:prstDash val="lgDash"/>
+              <a:tailEnd type="none" w="med" len="lg"/>
+            </a:ln>
+          </p:spPr>
+          <p:style>
+            <a:lnRef idx="1">
+              <a:schemeClr val="accent1"/>
+            </a:lnRef>
+            <a:fillRef idx="0">
+              <a:schemeClr val="accent1"/>
+            </a:fillRef>
+            <a:effectRef idx="0">
+              <a:schemeClr val="accent1"/>
+            </a:effectRef>
+            <a:fontRef idx="minor">
+              <a:schemeClr val="tx1"/>
+            </a:fontRef>
+          </p:style>
+        </p:cxnSp>
+        <p:cxnSp>
+          <p:nvCxnSpPr>
+            <p:cNvPr id="109" name="Conector de seta reta 108"/>
+            <p:cNvCxnSpPr/>
+            <p:nvPr/>
+          </p:nvCxnSpPr>
+          <p:spPr>
+            <a:xfrm flipV="1">
+              <a:off x="3282160" y="987424"/>
+              <a:ext cx="0" cy="995218"/>
+            </a:xfrm>
+            <a:prstGeom prst="straightConnector1">
+              <a:avLst/>
+            </a:prstGeom>
+            <a:ln>
+              <a:solidFill>
+                <a:schemeClr val="tx1"/>
+              </a:solidFill>
+              <a:prstDash val="lgDash"/>
+              <a:tailEnd type="none" w="med" len="lg"/>
+            </a:ln>
+          </p:spPr>
+          <p:style>
+            <a:lnRef idx="1">
+              <a:schemeClr val="accent1"/>
+            </a:lnRef>
+            <a:fillRef idx="0">
+              <a:schemeClr val="accent1"/>
+            </a:fillRef>
+            <a:effectRef idx="0">
+              <a:schemeClr val="accent1"/>
+            </a:effectRef>
+            <a:fontRef idx="minor">
+              <a:schemeClr val="tx1"/>
+            </a:fontRef>
+          </p:style>
+        </p:cxnSp>
+        <p:sp>
+          <p:nvSpPr>
+            <p:cNvPr id="111" name="CaixaDeTexto 110"/>
+            <p:cNvSpPr txBox="1"/>
+            <p:nvPr/>
+          </p:nvSpPr>
+          <p:spPr>
+            <a:xfrm rot="16200000">
+              <a:off x="930452" y="1392872"/>
+              <a:ext cx="812680" cy="184322"/>
+            </a:xfrm>
+            <a:prstGeom prst="rect">
+              <a:avLst/>
+            </a:prstGeom>
+            <a:noFill/>
+          </p:spPr>
+          <p:txBody>
+            <a:bodyPr wrap="none" rtlCol="0">
+              <a:spAutoFit/>
+            </a:bodyPr>
+            <a:lstStyle/>
+            <a:p>
+              <a:r>
+                <a:rPr lang="pt-BR" sz="1400" dirty="0"/>
+                <a:t>time/</a:t>
+              </a:r>
+              <a:r>
+                <a:rPr lang="pt-BR" sz="1400" dirty="0" err="1"/>
+                <a:t>number</a:t>
+              </a:r>
+              <a:r>
+                <a:rPr lang="pt-BR" sz="1400" dirty="0"/>
+                <a:t> of </a:t>
+              </a:r>
+              <a:r>
+                <a:rPr lang="pt-BR" sz="1400" dirty="0" err="1"/>
+                <a:t>observations</a:t>
+              </a:r>
+              <a:endParaRPr lang="pt-BR" sz="1400" dirty="0"/>
+            </a:p>
+          </p:txBody>
+        </p:sp>
+      </p:grpSp>
+      <p:grpSp>
+        <p:nvGrpSpPr>
+          <p:cNvPr id="72" name="Agrupar 71">
+            <a:extLst>
+              <a:ext uri="{FF2B5EF4-FFF2-40B4-BE49-F238E27FC236}">
+                <a16:creationId xmlns:a16="http://schemas.microsoft.com/office/drawing/2014/main" id="{F9D8327A-AA78-FF63-6111-1D979668DA80}"/>
+              </a:ext>
+            </a:extLst>
+          </p:cNvPr>
+          <p:cNvGrpSpPr/>
+          <p:nvPr/>
+        </p:nvGrpSpPr>
+        <p:grpSpPr>
+          <a:xfrm rot="10800000">
+            <a:off x="2327561" y="1852954"/>
+            <a:ext cx="2263994" cy="2985542"/>
+            <a:chOff x="2508485" y="1852954"/>
+            <a:chExt cx="2263994" cy="2985542"/>
+          </a:xfrm>
+        </p:grpSpPr>
+        <p:sp>
+          <p:nvSpPr>
+            <p:cNvPr id="4" name="Forma Livre: Forma 3">
+              <a:extLst>
+                <a:ext uri="{FF2B5EF4-FFF2-40B4-BE49-F238E27FC236}">
+                  <a16:creationId xmlns:a16="http://schemas.microsoft.com/office/drawing/2014/main" id="{D67CEEE2-335A-3060-1F94-624D79B00B7D}"/>
+                </a:ext>
+              </a:extLst>
+            </p:cNvPr>
+            <p:cNvSpPr/>
+            <p:nvPr/>
+          </p:nvSpPr>
+          <p:spPr>
+            <a:xfrm>
+              <a:off x="2508485" y="1941268"/>
+              <a:ext cx="1462062" cy="2801878"/>
+            </a:xfrm>
+            <a:custGeom>
+              <a:avLst/>
+              <a:gdLst>
+                <a:gd name="connsiteX0" fmla="*/ 772595 w 1462062"/>
+                <a:gd name="connsiteY0" fmla="*/ 2801878 h 2801878"/>
+                <a:gd name="connsiteX1" fmla="*/ 977968 w 1462062"/>
+                <a:gd name="connsiteY1" fmla="*/ 2493818 h 2801878"/>
+                <a:gd name="connsiteX2" fmla="*/ 493874 w 1462062"/>
+                <a:gd name="connsiteY2" fmla="*/ 2195538 h 2801878"/>
+                <a:gd name="connsiteX3" fmla="*/ 709027 w 1462062"/>
+                <a:gd name="connsiteY3" fmla="*/ 1877699 h 2801878"/>
+                <a:gd name="connsiteX4" fmla="*/ 205373 w 1462062"/>
+                <a:gd name="connsiteY4" fmla="*/ 1574528 h 2801878"/>
+                <a:gd name="connsiteX5" fmla="*/ 0 w 1462062"/>
+                <a:gd name="connsiteY5" fmla="*/ 1134443 h 2801878"/>
+                <a:gd name="connsiteX6" fmla="*/ 264051 w 1462062"/>
+                <a:gd name="connsiteY6" fmla="*/ 630789 h 2801878"/>
+                <a:gd name="connsiteX7" fmla="*/ 738366 w 1462062"/>
+                <a:gd name="connsiteY7" fmla="*/ 396077 h 2801878"/>
+                <a:gd name="connsiteX8" fmla="*/ 1462062 w 1462062"/>
+                <a:gd name="connsiteY8" fmla="*/ 264051 h 2801878"/>
+                <a:gd name="connsiteX9" fmla="*/ 1109994 w 1462062"/>
+                <a:gd name="connsiteY9" fmla="*/ 0 h 2801878"/>
+              </a:gdLst>
+              <a:ahLst/>
+              <a:cxnLst>
+                <a:cxn ang="0">
+                  <a:pos x="connsiteX0" y="connsiteY0"/>
+                </a:cxn>
+                <a:cxn ang="0">
+                  <a:pos x="connsiteX1" y="connsiteY1"/>
+                </a:cxn>
+                <a:cxn ang="0">
+                  <a:pos x="connsiteX2" y="connsiteY2"/>
+                </a:cxn>
+                <a:cxn ang="0">
+                  <a:pos x="connsiteX3" y="connsiteY3"/>
+                </a:cxn>
+                <a:cxn ang="0">
+                  <a:pos x="connsiteX4" y="connsiteY4"/>
+                </a:cxn>
+                <a:cxn ang="0">
+                  <a:pos x="connsiteX5" y="connsiteY5"/>
+                </a:cxn>
+                <a:cxn ang="0">
+                  <a:pos x="connsiteX6" y="connsiteY6"/>
+                </a:cxn>
+                <a:cxn ang="0">
+                  <a:pos x="connsiteX7" y="connsiteY7"/>
+                </a:cxn>
+                <a:cxn ang="0">
+                  <a:pos x="connsiteX8" y="connsiteY8"/>
+                </a:cxn>
+                <a:cxn ang="0">
+                  <a:pos x="connsiteX9" y="connsiteY9"/>
+                </a:cxn>
+              </a:cxnLst>
+              <a:rect l="l" t="t" r="r" b="b"/>
+              <a:pathLst>
+                <a:path w="1462062" h="2801878">
+                  <a:moveTo>
+                    <a:pt x="772595" y="2801878"/>
+                  </a:moveTo>
+                  <a:lnTo>
+                    <a:pt x="977968" y="2493818"/>
+                  </a:lnTo>
+                  <a:lnTo>
+                    <a:pt x="493874" y="2195538"/>
+                  </a:lnTo>
+                  <a:lnTo>
+                    <a:pt x="709027" y="1877699"/>
+                  </a:lnTo>
+                  <a:lnTo>
+                    <a:pt x="205373" y="1574528"/>
+                  </a:lnTo>
+                  <a:lnTo>
+                    <a:pt x="0" y="1134443"/>
+                  </a:lnTo>
+                  <a:lnTo>
+                    <a:pt x="264051" y="630789"/>
+                  </a:lnTo>
+                  <a:lnTo>
+                    <a:pt x="738366" y="396077"/>
+                  </a:lnTo>
+                  <a:lnTo>
+                    <a:pt x="1462062" y="264051"/>
+                  </a:lnTo>
+                  <a:lnTo>
+                    <a:pt x="1109994" y="0"/>
+                  </a:lnTo>
+                </a:path>
+              </a:pathLst>
+            </a:custGeom>
+            <a:noFill/>
+          </p:spPr>
+          <p:style>
+            <a:lnRef idx="2">
+              <a:schemeClr val="accent1">
+                <a:shade val="50000"/>
+              </a:schemeClr>
+            </a:lnRef>
+            <a:fillRef idx="1">
+              <a:schemeClr val="accent1"/>
+            </a:fillRef>
+            <a:effectRef idx="0">
+              <a:schemeClr val="accent1"/>
+            </a:effectRef>
+            <a:fontRef idx="minor">
+              <a:schemeClr val="lt1"/>
+            </a:fontRef>
+          </p:style>
+          <p:txBody>
+            <a:bodyPr rtlCol="0" anchor="ctr"/>
+            <a:lstStyle/>
+            <a:p>
+              <a:pPr algn="ctr"/>
+              <a:endParaRPr lang="pt-BR"/>
+            </a:p>
+          </p:txBody>
+        </p:sp>
+        <p:sp>
+          <p:nvSpPr>
+            <p:cNvPr id="5" name="Forma Livre: Forma 4">
+              <a:extLst>
+                <a:ext uri="{FF2B5EF4-FFF2-40B4-BE49-F238E27FC236}">
+                  <a16:creationId xmlns:a16="http://schemas.microsoft.com/office/drawing/2014/main" id="{914644D2-82CB-F452-B3DB-7D079D79C68D}"/>
+                </a:ext>
+              </a:extLst>
+            </p:cNvPr>
+            <p:cNvSpPr/>
+            <p:nvPr/>
+          </p:nvSpPr>
+          <p:spPr>
+            <a:xfrm>
+              <a:off x="2758682" y="1961639"/>
+              <a:ext cx="2013797" cy="2801878"/>
+            </a:xfrm>
+            <a:custGeom>
+              <a:avLst/>
+              <a:gdLst>
+                <a:gd name="connsiteX0" fmla="*/ 772595 w 1462062"/>
+                <a:gd name="connsiteY0" fmla="*/ 2801878 h 2801878"/>
+                <a:gd name="connsiteX1" fmla="*/ 977968 w 1462062"/>
+                <a:gd name="connsiteY1" fmla="*/ 2493818 h 2801878"/>
+                <a:gd name="connsiteX2" fmla="*/ 493874 w 1462062"/>
+                <a:gd name="connsiteY2" fmla="*/ 2195538 h 2801878"/>
+                <a:gd name="connsiteX3" fmla="*/ 709027 w 1462062"/>
+                <a:gd name="connsiteY3" fmla="*/ 1877699 h 2801878"/>
+                <a:gd name="connsiteX4" fmla="*/ 205373 w 1462062"/>
+                <a:gd name="connsiteY4" fmla="*/ 1574528 h 2801878"/>
+                <a:gd name="connsiteX5" fmla="*/ 0 w 1462062"/>
+                <a:gd name="connsiteY5" fmla="*/ 1134443 h 2801878"/>
+                <a:gd name="connsiteX6" fmla="*/ 264051 w 1462062"/>
+                <a:gd name="connsiteY6" fmla="*/ 630789 h 2801878"/>
+                <a:gd name="connsiteX7" fmla="*/ 738366 w 1462062"/>
+                <a:gd name="connsiteY7" fmla="*/ 396077 h 2801878"/>
+                <a:gd name="connsiteX8" fmla="*/ 1462062 w 1462062"/>
+                <a:gd name="connsiteY8" fmla="*/ 264051 h 2801878"/>
+                <a:gd name="connsiteX9" fmla="*/ 1109994 w 1462062"/>
+                <a:gd name="connsiteY9" fmla="*/ 0 h 2801878"/>
+              </a:gdLst>
+              <a:ahLst/>
+              <a:cxnLst>
+                <a:cxn ang="0">
+                  <a:pos x="connsiteX0" y="connsiteY0"/>
+                </a:cxn>
+                <a:cxn ang="0">
+                  <a:pos x="connsiteX1" y="connsiteY1"/>
+                </a:cxn>
+                <a:cxn ang="0">
+                  <a:pos x="connsiteX2" y="connsiteY2"/>
+                </a:cxn>
+                <a:cxn ang="0">
+                  <a:pos x="connsiteX3" y="connsiteY3"/>
+                </a:cxn>
+                <a:cxn ang="0">
+                  <a:pos x="connsiteX4" y="connsiteY4"/>
+                </a:cxn>
+                <a:cxn ang="0">
+                  <a:pos x="connsiteX5" y="connsiteY5"/>
+                </a:cxn>
+                <a:cxn ang="0">
+                  <a:pos x="connsiteX6" y="connsiteY6"/>
+                </a:cxn>
+                <a:cxn ang="0">
+                  <a:pos x="connsiteX7" y="connsiteY7"/>
+                </a:cxn>
+                <a:cxn ang="0">
+                  <a:pos x="connsiteX8" y="connsiteY8"/>
+                </a:cxn>
+                <a:cxn ang="0">
+                  <a:pos x="connsiteX9" y="connsiteY9"/>
+                </a:cxn>
+              </a:cxnLst>
+              <a:rect l="l" t="t" r="r" b="b"/>
+              <a:pathLst>
+                <a:path w="1462062" h="2801878">
+                  <a:moveTo>
+                    <a:pt x="772595" y="2801878"/>
+                  </a:moveTo>
+                  <a:lnTo>
+                    <a:pt x="977968" y="2493818"/>
+                  </a:lnTo>
+                  <a:lnTo>
+                    <a:pt x="493874" y="2195538"/>
+                  </a:lnTo>
+                  <a:lnTo>
+                    <a:pt x="709027" y="1877699"/>
+                  </a:lnTo>
+                  <a:lnTo>
+                    <a:pt x="205373" y="1574528"/>
+                  </a:lnTo>
+                  <a:lnTo>
+                    <a:pt x="0" y="1134443"/>
+                  </a:lnTo>
+                  <a:lnTo>
+                    <a:pt x="264051" y="630789"/>
+                  </a:lnTo>
+                  <a:lnTo>
+                    <a:pt x="738366" y="396077"/>
+                  </a:lnTo>
+                  <a:lnTo>
+                    <a:pt x="1462062" y="264051"/>
+                  </a:lnTo>
+                  <a:lnTo>
+                    <a:pt x="1109994" y="0"/>
+                  </a:lnTo>
+                </a:path>
+              </a:pathLst>
+            </a:custGeom>
+            <a:noFill/>
+          </p:spPr>
+          <p:style>
+            <a:lnRef idx="2">
+              <a:schemeClr val="accent1">
+                <a:shade val="50000"/>
+              </a:schemeClr>
+            </a:lnRef>
+            <a:fillRef idx="1">
+              <a:schemeClr val="accent1"/>
+            </a:fillRef>
+            <a:effectRef idx="0">
+              <a:schemeClr val="accent1"/>
+            </a:effectRef>
+            <a:fontRef idx="minor">
+              <a:schemeClr val="lt1"/>
+            </a:fontRef>
+          </p:style>
+          <p:txBody>
+            <a:bodyPr rtlCol="0" anchor="ctr"/>
+            <a:lstStyle/>
+            <a:p>
+              <a:pPr algn="ctr"/>
+              <a:endParaRPr lang="pt-BR"/>
+            </a:p>
+          </p:txBody>
+        </p:sp>
+        <p:sp>
+          <p:nvSpPr>
+            <p:cNvPr id="6" name="Elipse 5">
+              <a:extLst>
+                <a:ext uri="{FF2B5EF4-FFF2-40B4-BE49-F238E27FC236}">
+                  <a16:creationId xmlns:a16="http://schemas.microsoft.com/office/drawing/2014/main" id="{E95E2682-282A-807F-A39A-156B21B604BB}"/>
+                </a:ext>
+              </a:extLst>
+            </p:cNvPr>
+            <p:cNvSpPr/>
+            <p:nvPr/>
+          </p:nvSpPr>
+          <p:spPr>
+            <a:xfrm>
+              <a:off x="3466346" y="4647795"/>
+              <a:ext cx="190701" cy="190701"/>
+            </a:xfrm>
+            <a:prstGeom prst="ellipse">
+              <a:avLst/>
+            </a:prstGeom>
+          </p:spPr>
+          <p:style>
+            <a:lnRef idx="2">
+              <a:schemeClr val="accent1">
+                <a:shade val="50000"/>
+              </a:schemeClr>
+            </a:lnRef>
+            <a:fillRef idx="1">
+              <a:schemeClr val="accent1"/>
+            </a:fillRef>
+            <a:effectRef idx="0">
+              <a:schemeClr val="accent1"/>
+            </a:effectRef>
+            <a:fontRef idx="minor">
+              <a:schemeClr val="lt1"/>
+            </a:fontRef>
+          </p:style>
+          <p:txBody>
+            <a:bodyPr rtlCol="0" anchor="ctr"/>
+            <a:lstStyle/>
+            <a:p>
+              <a:pPr algn="ctr"/>
+              <a:endParaRPr lang="pt-BR"/>
+            </a:p>
+          </p:txBody>
+        </p:sp>
+        <p:sp>
+          <p:nvSpPr>
+            <p:cNvPr id="55" name="Elipse 54">
+              <a:extLst>
+                <a:ext uri="{FF2B5EF4-FFF2-40B4-BE49-F238E27FC236}">
+                  <a16:creationId xmlns:a16="http://schemas.microsoft.com/office/drawing/2014/main" id="{1D5D4044-CE70-FE9C-26EA-3F2AB78F1881}"/>
+                </a:ext>
+              </a:extLst>
+            </p:cNvPr>
+            <p:cNvSpPr/>
+            <p:nvPr/>
+          </p:nvSpPr>
+          <p:spPr>
+            <a:xfrm>
+              <a:off x="3657047" y="4365425"/>
+              <a:ext cx="190701" cy="190701"/>
+            </a:xfrm>
+            <a:prstGeom prst="ellipse">
+              <a:avLst/>
+            </a:prstGeom>
+          </p:spPr>
+          <p:style>
+            <a:lnRef idx="2">
+              <a:schemeClr val="accent1">
+                <a:shade val="50000"/>
+              </a:schemeClr>
+            </a:lnRef>
+            <a:fillRef idx="1">
+              <a:schemeClr val="accent1"/>
+            </a:fillRef>
+            <a:effectRef idx="0">
+              <a:schemeClr val="accent1"/>
+            </a:effectRef>
+            <a:fontRef idx="minor">
+              <a:schemeClr val="lt1"/>
+            </a:fontRef>
+          </p:style>
+          <p:txBody>
+            <a:bodyPr rtlCol="0" anchor="ctr"/>
+            <a:lstStyle/>
+            <a:p>
+              <a:pPr algn="ctr"/>
+              <a:endParaRPr lang="pt-BR"/>
+            </a:p>
+          </p:txBody>
+        </p:sp>
+        <p:sp>
+          <p:nvSpPr>
+            <p:cNvPr id="56" name="Elipse 55">
+              <a:extLst>
+                <a:ext uri="{FF2B5EF4-FFF2-40B4-BE49-F238E27FC236}">
+                  <a16:creationId xmlns:a16="http://schemas.microsoft.com/office/drawing/2014/main" id="{2227930E-E1D3-AB6C-3109-91060267B9B9}"/>
+                </a:ext>
+              </a:extLst>
+            </p:cNvPr>
+            <p:cNvSpPr/>
+            <p:nvPr/>
+          </p:nvSpPr>
+          <p:spPr>
+            <a:xfrm>
+              <a:off x="3144165" y="4047160"/>
+              <a:ext cx="190701" cy="190701"/>
+            </a:xfrm>
+            <a:prstGeom prst="ellipse">
+              <a:avLst/>
+            </a:prstGeom>
+          </p:spPr>
+          <p:style>
+            <a:lnRef idx="2">
+              <a:schemeClr val="accent1">
+                <a:shade val="50000"/>
+              </a:schemeClr>
+            </a:lnRef>
+            <a:fillRef idx="1">
+              <a:schemeClr val="accent1"/>
+            </a:fillRef>
+            <a:effectRef idx="0">
+              <a:schemeClr val="accent1"/>
+            </a:effectRef>
+            <a:fontRef idx="minor">
+              <a:schemeClr val="lt1"/>
+            </a:fontRef>
+          </p:style>
+          <p:txBody>
+            <a:bodyPr rtlCol="0" anchor="ctr"/>
+            <a:lstStyle/>
+            <a:p>
+              <a:pPr algn="ctr"/>
+              <a:endParaRPr lang="pt-BR"/>
+            </a:p>
+          </p:txBody>
+        </p:sp>
+        <p:sp>
+          <p:nvSpPr>
+            <p:cNvPr id="57" name="Elipse 56">
+              <a:extLst>
+                <a:ext uri="{FF2B5EF4-FFF2-40B4-BE49-F238E27FC236}">
+                  <a16:creationId xmlns:a16="http://schemas.microsoft.com/office/drawing/2014/main" id="{D4ECE6FA-ABED-FF0C-1011-A0574DB49486}"/>
+                </a:ext>
+              </a:extLst>
+            </p:cNvPr>
+            <p:cNvSpPr/>
+            <p:nvPr/>
+          </p:nvSpPr>
+          <p:spPr>
+            <a:xfrm>
+              <a:off x="3320286" y="3747774"/>
+              <a:ext cx="190701" cy="190701"/>
+            </a:xfrm>
+            <a:prstGeom prst="ellipse">
+              <a:avLst/>
+            </a:prstGeom>
+          </p:spPr>
+          <p:style>
+            <a:lnRef idx="2">
+              <a:schemeClr val="accent1">
+                <a:shade val="50000"/>
+              </a:schemeClr>
+            </a:lnRef>
+            <a:fillRef idx="1">
+              <a:schemeClr val="accent1"/>
+            </a:fillRef>
+            <a:effectRef idx="0">
+              <a:schemeClr val="accent1"/>
+            </a:effectRef>
+            <a:fontRef idx="minor">
+              <a:schemeClr val="lt1"/>
+            </a:fontRef>
+          </p:style>
+          <p:txBody>
+            <a:bodyPr rtlCol="0" anchor="ctr"/>
+            <a:lstStyle/>
+            <a:p>
+              <a:pPr algn="ctr"/>
+              <a:endParaRPr lang="pt-BR"/>
+            </a:p>
+          </p:txBody>
+        </p:sp>
+        <p:sp>
+          <p:nvSpPr>
+            <p:cNvPr id="58" name="Elipse 57">
+              <a:extLst>
+                <a:ext uri="{FF2B5EF4-FFF2-40B4-BE49-F238E27FC236}">
+                  <a16:creationId xmlns:a16="http://schemas.microsoft.com/office/drawing/2014/main" id="{F2046DF5-11DD-28DA-F563-377AE333CC7C}"/>
+                </a:ext>
+              </a:extLst>
+            </p:cNvPr>
+            <p:cNvSpPr/>
+            <p:nvPr/>
+          </p:nvSpPr>
+          <p:spPr>
+            <a:xfrm>
+              <a:off x="2816085" y="3455489"/>
+              <a:ext cx="190701" cy="190701"/>
+            </a:xfrm>
+            <a:prstGeom prst="ellipse">
+              <a:avLst/>
+            </a:prstGeom>
+          </p:spPr>
+          <p:style>
+            <a:lnRef idx="2">
+              <a:schemeClr val="accent1">
+                <a:shade val="50000"/>
+              </a:schemeClr>
+            </a:lnRef>
+            <a:fillRef idx="1">
+              <a:schemeClr val="accent1"/>
+            </a:fillRef>
+            <a:effectRef idx="0">
+              <a:schemeClr val="accent1"/>
+            </a:effectRef>
+            <a:fontRef idx="minor">
+              <a:schemeClr val="lt1"/>
+            </a:fontRef>
+          </p:style>
+          <p:txBody>
+            <a:bodyPr rtlCol="0" anchor="ctr"/>
+            <a:lstStyle/>
+            <a:p>
+              <a:pPr algn="ctr"/>
+              <a:endParaRPr lang="pt-BR"/>
+            </a:p>
+          </p:txBody>
+        </p:sp>
+        <p:sp>
+          <p:nvSpPr>
+            <p:cNvPr id="59" name="Elipse 58">
+              <a:extLst>
+                <a:ext uri="{FF2B5EF4-FFF2-40B4-BE49-F238E27FC236}">
+                  <a16:creationId xmlns:a16="http://schemas.microsoft.com/office/drawing/2014/main" id="{DBF74410-2B92-80E6-8361-EBD306C669A6}"/>
+                </a:ext>
+              </a:extLst>
+            </p:cNvPr>
+            <p:cNvSpPr/>
+            <p:nvPr/>
+          </p:nvSpPr>
+          <p:spPr>
+            <a:xfrm>
+              <a:off x="2570149" y="3056623"/>
+              <a:ext cx="190701" cy="190701"/>
+            </a:xfrm>
+            <a:prstGeom prst="ellipse">
+              <a:avLst/>
+            </a:prstGeom>
+          </p:spPr>
+          <p:style>
+            <a:lnRef idx="2">
+              <a:schemeClr val="accent1">
+                <a:shade val="50000"/>
+              </a:schemeClr>
+            </a:lnRef>
+            <a:fillRef idx="1">
+              <a:schemeClr val="accent1"/>
+            </a:fillRef>
+            <a:effectRef idx="0">
+              <a:schemeClr val="accent1"/>
+            </a:effectRef>
+            <a:fontRef idx="minor">
+              <a:schemeClr val="lt1"/>
+            </a:fontRef>
+          </p:style>
+          <p:txBody>
+            <a:bodyPr rtlCol="0" anchor="ctr"/>
+            <a:lstStyle/>
+            <a:p>
+              <a:pPr algn="ctr"/>
+              <a:endParaRPr lang="pt-BR"/>
+            </a:p>
+          </p:txBody>
+        </p:sp>
+        <p:sp>
+          <p:nvSpPr>
+            <p:cNvPr id="60" name="Elipse 59">
+              <a:extLst>
+                <a:ext uri="{FF2B5EF4-FFF2-40B4-BE49-F238E27FC236}">
+                  <a16:creationId xmlns:a16="http://schemas.microsoft.com/office/drawing/2014/main" id="{A1ED8BD0-9A61-F488-9649-E3F35345C7EF}"/>
+                </a:ext>
+              </a:extLst>
+            </p:cNvPr>
+            <p:cNvSpPr/>
+            <p:nvPr/>
+          </p:nvSpPr>
+          <p:spPr>
+            <a:xfrm>
+              <a:off x="2837812" y="2517863"/>
+              <a:ext cx="190701" cy="190701"/>
+            </a:xfrm>
+            <a:prstGeom prst="ellipse">
+              <a:avLst/>
+            </a:prstGeom>
+          </p:spPr>
+          <p:style>
+            <a:lnRef idx="2">
+              <a:schemeClr val="accent1">
+                <a:shade val="50000"/>
+              </a:schemeClr>
+            </a:lnRef>
+            <a:fillRef idx="1">
+              <a:schemeClr val="accent1"/>
+            </a:fillRef>
+            <a:effectRef idx="0">
+              <a:schemeClr val="accent1"/>
+            </a:effectRef>
+            <a:fontRef idx="minor">
+              <a:schemeClr val="lt1"/>
+            </a:fontRef>
+          </p:style>
+          <p:txBody>
+            <a:bodyPr rtlCol="0" anchor="ctr"/>
+            <a:lstStyle/>
+            <a:p>
+              <a:pPr algn="ctr"/>
+              <a:endParaRPr lang="pt-BR"/>
+            </a:p>
+          </p:txBody>
+        </p:sp>
+        <p:sp>
+          <p:nvSpPr>
+            <p:cNvPr id="61" name="Elipse 60">
+              <a:extLst>
+                <a:ext uri="{FF2B5EF4-FFF2-40B4-BE49-F238E27FC236}">
+                  <a16:creationId xmlns:a16="http://schemas.microsoft.com/office/drawing/2014/main" id="{59C9F570-6B06-9AAA-EEA2-B863A2C00A72}"/>
+                </a:ext>
+              </a:extLst>
+            </p:cNvPr>
+            <p:cNvSpPr/>
+            <p:nvPr/>
+          </p:nvSpPr>
+          <p:spPr>
+            <a:xfrm>
+              <a:off x="3466346" y="2259830"/>
+              <a:ext cx="190701" cy="190701"/>
+            </a:xfrm>
+            <a:prstGeom prst="ellipse">
+              <a:avLst/>
+            </a:prstGeom>
+          </p:spPr>
+          <p:style>
+            <a:lnRef idx="2">
+              <a:schemeClr val="accent1">
+                <a:shade val="50000"/>
+              </a:schemeClr>
+            </a:lnRef>
+            <a:fillRef idx="1">
+              <a:schemeClr val="accent1"/>
+            </a:fillRef>
+            <a:effectRef idx="0">
+              <a:schemeClr val="accent1"/>
+            </a:effectRef>
+            <a:fontRef idx="minor">
+              <a:schemeClr val="lt1"/>
+            </a:fontRef>
+          </p:style>
+          <p:txBody>
+            <a:bodyPr rtlCol="0" anchor="ctr"/>
+            <a:lstStyle/>
+            <a:p>
+              <a:pPr algn="ctr"/>
+              <a:endParaRPr lang="pt-BR"/>
+            </a:p>
+          </p:txBody>
+        </p:sp>
+        <p:sp>
+          <p:nvSpPr>
+            <p:cNvPr id="62" name="Elipse 61">
+              <a:extLst>
+                <a:ext uri="{FF2B5EF4-FFF2-40B4-BE49-F238E27FC236}">
+                  <a16:creationId xmlns:a16="http://schemas.microsoft.com/office/drawing/2014/main" id="{3489DCEA-E7C3-CABE-5252-2E0E4F9A5D2A}"/>
+                </a:ext>
+              </a:extLst>
+            </p:cNvPr>
+            <p:cNvSpPr/>
+            <p:nvPr/>
+          </p:nvSpPr>
+          <p:spPr>
+            <a:xfrm>
+              <a:off x="4206251" y="2074900"/>
+              <a:ext cx="190701" cy="190701"/>
+            </a:xfrm>
+            <a:prstGeom prst="ellipse">
+              <a:avLst/>
+            </a:prstGeom>
+          </p:spPr>
+          <p:style>
+            <a:lnRef idx="2">
+              <a:schemeClr val="accent1">
+                <a:shade val="50000"/>
+              </a:schemeClr>
+            </a:lnRef>
+            <a:fillRef idx="1">
+              <a:schemeClr val="accent1"/>
+            </a:fillRef>
+            <a:effectRef idx="0">
+              <a:schemeClr val="accent1"/>
+            </a:effectRef>
+            <a:fontRef idx="minor">
+              <a:schemeClr val="lt1"/>
+            </a:fontRef>
+          </p:style>
+          <p:txBody>
+            <a:bodyPr rtlCol="0" anchor="ctr"/>
+            <a:lstStyle/>
+            <a:p>
+              <a:pPr algn="ctr"/>
+              <a:endParaRPr lang="pt-BR"/>
+            </a:p>
+          </p:txBody>
+        </p:sp>
+        <p:sp>
+          <p:nvSpPr>
+            <p:cNvPr id="63" name="Elipse 62">
+              <a:extLst>
+                <a:ext uri="{FF2B5EF4-FFF2-40B4-BE49-F238E27FC236}">
+                  <a16:creationId xmlns:a16="http://schemas.microsoft.com/office/drawing/2014/main" id="{E6D63C16-DAF6-E615-072A-9D89EDA71D72}"/>
+                </a:ext>
+              </a:extLst>
+            </p:cNvPr>
+            <p:cNvSpPr/>
+            <p:nvPr/>
+          </p:nvSpPr>
+          <p:spPr>
+            <a:xfrm>
+              <a:off x="3890618" y="1852954"/>
+              <a:ext cx="190701" cy="190701"/>
+            </a:xfrm>
+            <a:prstGeom prst="ellipse">
+              <a:avLst/>
+            </a:prstGeom>
+          </p:spPr>
+          <p:style>
+            <a:lnRef idx="2">
+              <a:schemeClr val="accent1">
+                <a:shade val="50000"/>
+              </a:schemeClr>
+            </a:lnRef>
+            <a:fillRef idx="1">
+              <a:schemeClr val="accent1"/>
+            </a:fillRef>
+            <a:effectRef idx="0">
+              <a:schemeClr val="accent1"/>
+            </a:effectRef>
+            <a:fontRef idx="minor">
+              <a:schemeClr val="lt1"/>
+            </a:fontRef>
+          </p:style>
+          <p:txBody>
+            <a:bodyPr rtlCol="0" anchor="ctr"/>
+            <a:lstStyle/>
+            <a:p>
+              <a:pPr algn="ctr"/>
+              <a:endParaRPr lang="pt-BR"/>
+            </a:p>
+          </p:txBody>
+        </p:sp>
+      </p:grpSp>
+      <p:sp>
+        <p:nvSpPr>
+          <p:cNvPr id="65" name="Elipse 64">
+            <a:extLst>
+              <a:ext uri="{FF2B5EF4-FFF2-40B4-BE49-F238E27FC236}">
+                <a16:creationId xmlns:a16="http://schemas.microsoft.com/office/drawing/2014/main" id="{6BB60630-C90D-191E-AB0A-ED7605F812FF}"/>
+              </a:ext>
+            </a:extLst>
+          </p:cNvPr>
+          <p:cNvSpPr/>
+          <p:nvPr/>
+        </p:nvSpPr>
+        <p:spPr>
+          <a:xfrm>
+            <a:off x="2177505" y="5211937"/>
+            <a:ext cx="190701" cy="190701"/>
+          </a:xfrm>
+          <a:prstGeom prst="ellipse">
+            <a:avLst/>
+          </a:prstGeom>
+        </p:spPr>
+        <p:style>
+          <a:lnRef idx="2">
+            <a:schemeClr val="accent1">
+              <a:shade val="50000"/>
+            </a:schemeClr>
+          </a:lnRef>
+          <a:fillRef idx="1">
+            <a:schemeClr val="accent1"/>
+          </a:fillRef>
+          <a:effectRef idx="0">
+            <a:schemeClr val="accent1"/>
+          </a:effectRef>
+          <a:fontRef idx="minor">
+            <a:schemeClr val="lt1"/>
+          </a:fontRef>
+        </p:style>
+        <p:txBody>
+          <a:bodyPr rtlCol="0" anchor="ctr"/>
+          <a:lstStyle/>
+          <a:p>
+            <a:pPr algn="ctr"/>
+            <a:endParaRPr lang="pt-BR"/>
+          </a:p>
+        </p:txBody>
+      </p:sp>
+      <p:sp>
+        <p:nvSpPr>
+          <p:cNvPr id="66" name="CaixaDeTexto 65">
+            <a:extLst>
+              <a:ext uri="{FF2B5EF4-FFF2-40B4-BE49-F238E27FC236}">
+                <a16:creationId xmlns:a16="http://schemas.microsoft.com/office/drawing/2014/main" id="{2D9251F6-485C-D9E9-A4BA-B85DFDFD5AE0}"/>
+              </a:ext>
+            </a:extLst>
+          </p:cNvPr>
+          <p:cNvSpPr txBox="1"/>
+          <p:nvPr/>
+        </p:nvSpPr>
+        <p:spPr>
+          <a:xfrm>
+            <a:off x="2365975" y="5141436"/>
+            <a:ext cx="2535438" cy="307777"/>
+          </a:xfrm>
+          <a:prstGeom prst="rect">
+            <a:avLst/>
+          </a:prstGeom>
+          <a:noFill/>
+        </p:spPr>
+        <p:txBody>
+          <a:bodyPr wrap="none" rtlCol="0">
+            <a:spAutoFit/>
+          </a:bodyPr>
+          <a:lstStyle/>
+          <a:p>
+            <a:r>
+              <a:rPr lang="pt-BR" sz="1400" dirty="0"/>
+              <a:t>= </a:t>
+            </a:r>
+            <a:r>
+              <a:rPr lang="pt-BR" sz="1400" dirty="0" err="1"/>
+              <a:t>deterministic</a:t>
+            </a:r>
+            <a:r>
+              <a:rPr lang="pt-BR" sz="1400" dirty="0"/>
+              <a:t> model </a:t>
+            </a:r>
+            <a:r>
+              <a:rPr lang="pt-BR" sz="1400" dirty="0" err="1"/>
+              <a:t>fit</a:t>
+            </a:r>
+            <a:r>
+              <a:rPr lang="pt-BR" sz="1400" dirty="0"/>
+              <a:t> </a:t>
+            </a:r>
+            <a:r>
+              <a:rPr lang="pt-BR" sz="1400" dirty="0" err="1"/>
+              <a:t>to</a:t>
+            </a:r>
+            <a:r>
+              <a:rPr lang="pt-BR" sz="1400" dirty="0"/>
+              <a:t> data</a:t>
+            </a:r>
+          </a:p>
+        </p:txBody>
+      </p:sp>
+      <p:sp>
+        <p:nvSpPr>
+          <p:cNvPr id="70" name="Chave Direita 69">
+            <a:extLst>
+              <a:ext uri="{FF2B5EF4-FFF2-40B4-BE49-F238E27FC236}">
+                <a16:creationId xmlns:a16="http://schemas.microsoft.com/office/drawing/2014/main" id="{88AA7E8C-5474-E939-E3A7-2A8195B77A54}"/>
+              </a:ext>
+            </a:extLst>
+          </p:cNvPr>
+          <p:cNvSpPr/>
+          <p:nvPr/>
+        </p:nvSpPr>
+        <p:spPr>
+          <a:xfrm rot="16200000">
+            <a:off x="3420165" y="1399888"/>
+            <a:ext cx="308060" cy="636235"/>
+          </a:xfrm>
+          <a:prstGeom prst="rightBrace">
+            <a:avLst/>
+          </a:prstGeom>
+          <a:ln w="28575"/>
+        </p:spPr>
+        <p:style>
+          <a:lnRef idx="1">
+            <a:schemeClr val="accent1"/>
+          </a:lnRef>
+          <a:fillRef idx="0">
+            <a:schemeClr val="accent1"/>
+          </a:fillRef>
+          <a:effectRef idx="0">
+            <a:schemeClr val="accent1"/>
+          </a:effectRef>
+          <a:fontRef idx="minor">
+            <a:schemeClr val="tx1"/>
+          </a:fontRef>
+        </p:style>
+        <p:txBody>
+          <a:bodyPr rtlCol="0" anchor="ctr"/>
+          <a:lstStyle/>
+          <a:p>
+            <a:pPr algn="ctr"/>
+            <a:endParaRPr lang="pt-BR"/>
+          </a:p>
+        </p:txBody>
+      </p:sp>
+      <p:sp>
+        <p:nvSpPr>
+          <p:cNvPr id="71" name="CaixaDeTexto 70">
+            <a:extLst>
+              <a:ext uri="{FF2B5EF4-FFF2-40B4-BE49-F238E27FC236}">
+                <a16:creationId xmlns:a16="http://schemas.microsoft.com/office/drawing/2014/main" id="{B18431C8-F7E8-A68D-BDA9-5A91AD1DA61D}"/>
+              </a:ext>
+            </a:extLst>
+          </p:cNvPr>
+          <p:cNvSpPr txBox="1"/>
+          <p:nvPr/>
+        </p:nvSpPr>
+        <p:spPr>
+          <a:xfrm>
+            <a:off x="1943715" y="1029334"/>
+            <a:ext cx="3235566" cy="523220"/>
+          </a:xfrm>
+          <a:prstGeom prst="rect">
+            <a:avLst/>
+          </a:prstGeom>
+          <a:noFill/>
+        </p:spPr>
+        <p:txBody>
+          <a:bodyPr wrap="none" rtlCol="0">
+            <a:spAutoFit/>
+          </a:bodyPr>
+          <a:lstStyle/>
+          <a:p>
+            <a:pPr algn="ctr"/>
+            <a:r>
+              <a:rPr lang="pt-BR" sz="1400" dirty="0" err="1"/>
+              <a:t>realizations</a:t>
+            </a:r>
+            <a:r>
+              <a:rPr lang="pt-BR" sz="1400" dirty="0"/>
+              <a:t> define </a:t>
+            </a:r>
+            <a:r>
+              <a:rPr lang="pt-BR" sz="1400" dirty="0" err="1"/>
+              <a:t>small</a:t>
+            </a:r>
+            <a:r>
+              <a:rPr lang="pt-BR" sz="1400" dirty="0"/>
+              <a:t> </a:t>
+            </a:r>
+            <a:r>
+              <a:rPr lang="pt-BR" sz="1400" dirty="0" err="1"/>
+              <a:t>uncertainty</a:t>
+            </a:r>
+            <a:r>
+              <a:rPr lang="pt-BR" sz="1400" dirty="0"/>
+              <a:t> band</a:t>
+            </a:r>
+          </a:p>
+          <a:p>
+            <a:pPr algn="ctr"/>
+            <a:r>
+              <a:rPr lang="pt-BR" sz="1400" dirty="0" err="1"/>
+              <a:t>around</a:t>
+            </a:r>
+            <a:r>
+              <a:rPr lang="pt-BR" sz="1400" dirty="0"/>
+              <a:t> </a:t>
+            </a:r>
+            <a:r>
+              <a:rPr lang="pt-BR" sz="1400" dirty="0" err="1"/>
+              <a:t>the</a:t>
+            </a:r>
+            <a:r>
+              <a:rPr lang="pt-BR" sz="1400" dirty="0"/>
+              <a:t> </a:t>
+            </a:r>
+            <a:r>
+              <a:rPr lang="pt-BR" sz="1400" dirty="0" err="1"/>
+              <a:t>current</a:t>
+            </a:r>
+            <a:r>
+              <a:rPr lang="pt-BR" sz="1400" dirty="0"/>
+              <a:t> model</a:t>
+            </a:r>
+          </a:p>
+        </p:txBody>
+      </p:sp>
+      <p:grpSp>
+        <p:nvGrpSpPr>
+          <p:cNvPr id="73" name="Agrupar 72">
+            <a:extLst>
+              <a:ext uri="{FF2B5EF4-FFF2-40B4-BE49-F238E27FC236}">
+                <a16:creationId xmlns:a16="http://schemas.microsoft.com/office/drawing/2014/main" id="{934FCB1D-8B9B-4AEC-EBAC-9D71A944A16E}"/>
+              </a:ext>
+            </a:extLst>
+          </p:cNvPr>
+          <p:cNvGrpSpPr/>
+          <p:nvPr/>
+        </p:nvGrpSpPr>
+        <p:grpSpPr>
+          <a:xfrm>
+            <a:off x="5309044" y="1891056"/>
+            <a:ext cx="3051625" cy="3184849"/>
+            <a:chOff x="1481362" y="981545"/>
+            <a:chExt cx="1827567" cy="1108190"/>
+          </a:xfrm>
+        </p:grpSpPr>
+        <p:sp>
+          <p:nvSpPr>
+            <p:cNvPr id="74" name="CaixaDeTexto 73">
+              <a:extLst>
+                <a:ext uri="{FF2B5EF4-FFF2-40B4-BE49-F238E27FC236}">
+                  <a16:creationId xmlns:a16="http://schemas.microsoft.com/office/drawing/2014/main" id="{649DA3F5-B9CB-6AEF-DE0C-9A3C8F232A4F}"/>
+                </a:ext>
+              </a:extLst>
+            </p:cNvPr>
+            <p:cNvSpPr txBox="1"/>
+            <p:nvPr/>
+          </p:nvSpPr>
+          <p:spPr>
+            <a:xfrm>
+              <a:off x="1777222" y="1982642"/>
+              <a:ext cx="1146369" cy="107093"/>
+            </a:xfrm>
+            <a:prstGeom prst="rect">
+              <a:avLst/>
+            </a:prstGeom>
+            <a:noFill/>
+          </p:spPr>
+          <p:txBody>
+            <a:bodyPr wrap="none" rtlCol="0">
+              <a:spAutoFit/>
+            </a:bodyPr>
+            <a:lstStyle/>
+            <a:p>
+              <a:r>
+                <a:rPr lang="pt-BR" sz="1400" dirty="0"/>
+                <a:t>model </a:t>
+              </a:r>
+              <a:r>
+                <a:rPr lang="pt-BR" sz="1400" dirty="0" err="1"/>
+                <a:t>parameter</a:t>
+              </a:r>
+              <a:r>
+                <a:rPr lang="pt-BR" sz="1400" dirty="0"/>
+                <a:t> </a:t>
+              </a:r>
+              <a:r>
+                <a:rPr lang="pt-BR" sz="1400" dirty="0" err="1"/>
+                <a:t>space</a:t>
+              </a:r>
+              <a:endParaRPr lang="pt-BR" sz="1400" dirty="0"/>
+            </a:p>
+          </p:txBody>
+        </p:sp>
+        <p:cxnSp>
+          <p:nvCxnSpPr>
+            <p:cNvPr id="75" name="Conector de seta reta 97">
+              <a:extLst>
+                <a:ext uri="{FF2B5EF4-FFF2-40B4-BE49-F238E27FC236}">
+                  <a16:creationId xmlns:a16="http://schemas.microsoft.com/office/drawing/2014/main" id="{1B9932DF-3F21-980F-AC13-22D73300A2BC}"/>
+                </a:ext>
+              </a:extLst>
+            </p:cNvPr>
+            <p:cNvCxnSpPr/>
+            <p:nvPr/>
+          </p:nvCxnSpPr>
+          <p:spPr>
+            <a:xfrm flipV="1">
+              <a:off x="1481362" y="981545"/>
+              <a:ext cx="0" cy="995218"/>
+            </a:xfrm>
+            <a:prstGeom prst="straightConnector1">
+              <a:avLst/>
+            </a:prstGeom>
+            <a:ln>
+              <a:solidFill>
+                <a:schemeClr val="tx1"/>
+              </a:solidFill>
+              <a:tailEnd type="triangle" w="med" len="lg"/>
+            </a:ln>
+          </p:spPr>
+          <p:style>
+            <a:lnRef idx="1">
+              <a:schemeClr val="accent1"/>
+            </a:lnRef>
+            <a:fillRef idx="0">
+              <a:schemeClr val="accent1"/>
+            </a:fillRef>
+            <a:effectRef idx="0">
+              <a:schemeClr val="accent1"/>
+            </a:effectRef>
+            <a:fontRef idx="minor">
+              <a:schemeClr val="tx1"/>
+            </a:fontRef>
+          </p:style>
+        </p:cxnSp>
+        <p:cxnSp>
+          <p:nvCxnSpPr>
+            <p:cNvPr id="76" name="Conector de seta reta 99">
+              <a:extLst>
+                <a:ext uri="{FF2B5EF4-FFF2-40B4-BE49-F238E27FC236}">
+                  <a16:creationId xmlns:a16="http://schemas.microsoft.com/office/drawing/2014/main" id="{A78A3E91-8B7C-8C06-95F0-FE95B0C49B6D}"/>
+                </a:ext>
+              </a:extLst>
+            </p:cNvPr>
+            <p:cNvCxnSpPr/>
+            <p:nvPr/>
+          </p:nvCxnSpPr>
+          <p:spPr>
+            <a:xfrm flipV="1">
+              <a:off x="1481362" y="1976763"/>
+              <a:ext cx="1819270" cy="1"/>
+            </a:xfrm>
+            <a:prstGeom prst="straightConnector1">
+              <a:avLst/>
+            </a:prstGeom>
+            <a:ln>
+              <a:solidFill>
+                <a:schemeClr val="tx1"/>
+              </a:solidFill>
+              <a:tailEnd type="triangle" w="med" len="lg"/>
+            </a:ln>
+          </p:spPr>
+          <p:style>
+            <a:lnRef idx="1">
+              <a:schemeClr val="accent1"/>
+            </a:lnRef>
+            <a:fillRef idx="0">
+              <a:schemeClr val="accent1"/>
+            </a:fillRef>
+            <a:effectRef idx="0">
+              <a:schemeClr val="accent1"/>
+            </a:effectRef>
+            <a:fontRef idx="minor">
+              <a:schemeClr val="tx1"/>
+            </a:fontRef>
+          </p:style>
+        </p:cxnSp>
+        <p:cxnSp>
+          <p:nvCxnSpPr>
+            <p:cNvPr id="77" name="Conector de seta reta 107">
+              <a:extLst>
+                <a:ext uri="{FF2B5EF4-FFF2-40B4-BE49-F238E27FC236}">
+                  <a16:creationId xmlns:a16="http://schemas.microsoft.com/office/drawing/2014/main" id="{80F36FA6-7C94-82B0-D791-9BAC91FEF670}"/>
+                </a:ext>
+              </a:extLst>
+            </p:cNvPr>
+            <p:cNvCxnSpPr/>
+            <p:nvPr/>
+          </p:nvCxnSpPr>
+          <p:spPr>
+            <a:xfrm flipV="1">
+              <a:off x="1489659" y="996824"/>
+              <a:ext cx="1819270" cy="1"/>
+            </a:xfrm>
+            <a:prstGeom prst="straightConnector1">
+              <a:avLst/>
+            </a:prstGeom>
+            <a:ln>
+              <a:solidFill>
+                <a:schemeClr val="tx1"/>
+              </a:solidFill>
+              <a:prstDash val="lgDash"/>
+              <a:tailEnd type="none" w="med" len="lg"/>
+            </a:ln>
+          </p:spPr>
+          <p:style>
+            <a:lnRef idx="1">
+              <a:schemeClr val="accent1"/>
+            </a:lnRef>
+            <a:fillRef idx="0">
+              <a:schemeClr val="accent1"/>
+            </a:fillRef>
+            <a:effectRef idx="0">
+              <a:schemeClr val="accent1"/>
+            </a:effectRef>
+            <a:fontRef idx="minor">
+              <a:schemeClr val="tx1"/>
+            </a:fontRef>
+          </p:style>
+        </p:cxnSp>
+        <p:cxnSp>
+          <p:nvCxnSpPr>
+            <p:cNvPr id="78" name="Conector de seta reta 108">
+              <a:extLst>
+                <a:ext uri="{FF2B5EF4-FFF2-40B4-BE49-F238E27FC236}">
+                  <a16:creationId xmlns:a16="http://schemas.microsoft.com/office/drawing/2014/main" id="{8FE26AEB-7944-C8F6-97B1-199443815923}"/>
+                </a:ext>
+              </a:extLst>
+            </p:cNvPr>
+            <p:cNvCxnSpPr/>
+            <p:nvPr/>
+          </p:nvCxnSpPr>
+          <p:spPr>
+            <a:xfrm flipV="1">
+              <a:off x="3282160" y="987424"/>
+              <a:ext cx="0" cy="995218"/>
+            </a:xfrm>
+            <a:prstGeom prst="straightConnector1">
+              <a:avLst/>
+            </a:prstGeom>
+            <a:ln>
+              <a:solidFill>
+                <a:schemeClr val="tx1"/>
+              </a:solidFill>
+              <a:prstDash val="lgDash"/>
+              <a:tailEnd type="none" w="med" len="lg"/>
+            </a:ln>
+          </p:spPr>
+          <p:style>
+            <a:lnRef idx="1">
+              <a:schemeClr val="accent1"/>
+            </a:lnRef>
+            <a:fillRef idx="0">
+              <a:schemeClr val="accent1"/>
+            </a:fillRef>
+            <a:effectRef idx="0">
+              <a:schemeClr val="accent1"/>
+            </a:effectRef>
+            <a:fontRef idx="minor">
+              <a:schemeClr val="tx1"/>
+            </a:fontRef>
+          </p:style>
+        </p:cxnSp>
+      </p:grpSp>
+      <p:sp>
+        <p:nvSpPr>
+          <p:cNvPr id="84" name="Elipse 83">
+            <a:extLst>
+              <a:ext uri="{FF2B5EF4-FFF2-40B4-BE49-F238E27FC236}">
+                <a16:creationId xmlns:a16="http://schemas.microsoft.com/office/drawing/2014/main" id="{2D20B6D2-236B-910C-9B30-E64F76506ED3}"/>
+              </a:ext>
+            </a:extLst>
+          </p:cNvPr>
+          <p:cNvSpPr/>
+          <p:nvPr/>
+        </p:nvSpPr>
+        <p:spPr>
+          <a:xfrm rot="10800000">
+            <a:off x="6723078" y="1852954"/>
+            <a:ext cx="190701" cy="190701"/>
+          </a:xfrm>
+          <a:prstGeom prst="ellipse">
+            <a:avLst/>
+          </a:prstGeom>
+        </p:spPr>
+        <p:style>
+          <a:lnRef idx="2">
+            <a:schemeClr val="accent1">
+              <a:shade val="50000"/>
+            </a:schemeClr>
+          </a:lnRef>
+          <a:fillRef idx="1">
+            <a:schemeClr val="accent1"/>
+          </a:fillRef>
+          <a:effectRef idx="0">
+            <a:schemeClr val="accent1"/>
+          </a:effectRef>
+          <a:fontRef idx="minor">
+            <a:schemeClr val="lt1"/>
+          </a:fontRef>
+        </p:style>
+        <p:txBody>
+          <a:bodyPr rtlCol="0" anchor="ctr"/>
+          <a:lstStyle/>
+          <a:p>
+            <a:pPr algn="ctr"/>
+            <a:endParaRPr lang="pt-BR"/>
+          </a:p>
+        </p:txBody>
+      </p:sp>
+      <p:sp>
+        <p:nvSpPr>
+          <p:cNvPr id="87" name="Elipse 86">
+            <a:extLst>
+              <a:ext uri="{FF2B5EF4-FFF2-40B4-BE49-F238E27FC236}">
+                <a16:creationId xmlns:a16="http://schemas.microsoft.com/office/drawing/2014/main" id="{65B4EBD4-DDF5-B7E3-5B39-7A5B174F4ED5}"/>
+              </a:ext>
+            </a:extLst>
+          </p:cNvPr>
+          <p:cNvSpPr/>
+          <p:nvPr/>
+        </p:nvSpPr>
+        <p:spPr>
+          <a:xfrm rot="10800000">
+            <a:off x="6532377" y="2135324"/>
+            <a:ext cx="190701" cy="190701"/>
+          </a:xfrm>
+          <a:prstGeom prst="ellipse">
+            <a:avLst/>
+          </a:prstGeom>
+        </p:spPr>
+        <p:style>
+          <a:lnRef idx="2">
+            <a:schemeClr val="accent1">
+              <a:shade val="50000"/>
+            </a:schemeClr>
+          </a:lnRef>
+          <a:fillRef idx="1">
+            <a:schemeClr val="accent1"/>
+          </a:fillRef>
+          <a:effectRef idx="0">
+            <a:schemeClr val="accent1"/>
+          </a:effectRef>
+          <a:fontRef idx="minor">
+            <a:schemeClr val="lt1"/>
+          </a:fontRef>
+        </p:style>
+        <p:txBody>
+          <a:bodyPr rtlCol="0" anchor="ctr"/>
+          <a:lstStyle/>
+          <a:p>
+            <a:pPr algn="ctr"/>
+            <a:endParaRPr lang="pt-BR"/>
+          </a:p>
+        </p:txBody>
+      </p:sp>
+      <p:sp>
+        <p:nvSpPr>
+          <p:cNvPr id="89" name="Elipse 88">
+            <a:extLst>
+              <a:ext uri="{FF2B5EF4-FFF2-40B4-BE49-F238E27FC236}">
+                <a16:creationId xmlns:a16="http://schemas.microsoft.com/office/drawing/2014/main" id="{CB79B08A-6AB8-CF12-CBFD-E1412927DC11}"/>
+              </a:ext>
+            </a:extLst>
+          </p:cNvPr>
+          <p:cNvSpPr/>
+          <p:nvPr/>
+        </p:nvSpPr>
+        <p:spPr>
+          <a:xfrm rot="10800000">
+            <a:off x="7045259" y="2453589"/>
+            <a:ext cx="190701" cy="190701"/>
+          </a:xfrm>
+          <a:prstGeom prst="ellipse">
+            <a:avLst/>
+          </a:prstGeom>
+        </p:spPr>
+        <p:style>
+          <a:lnRef idx="2">
+            <a:schemeClr val="accent1">
+              <a:shade val="50000"/>
+            </a:schemeClr>
+          </a:lnRef>
+          <a:fillRef idx="1">
+            <a:schemeClr val="accent1"/>
+          </a:fillRef>
+          <a:effectRef idx="0">
+            <a:schemeClr val="accent1"/>
+          </a:effectRef>
+          <a:fontRef idx="minor">
+            <a:schemeClr val="lt1"/>
+          </a:fontRef>
+        </p:style>
+        <p:txBody>
+          <a:bodyPr rtlCol="0" anchor="ctr"/>
+          <a:lstStyle/>
+          <a:p>
+            <a:pPr algn="ctr"/>
+            <a:endParaRPr lang="pt-BR"/>
+          </a:p>
+        </p:txBody>
+      </p:sp>
+      <p:sp>
+        <p:nvSpPr>
+          <p:cNvPr id="94" name="Elipse 93">
+            <a:extLst>
+              <a:ext uri="{FF2B5EF4-FFF2-40B4-BE49-F238E27FC236}">
+                <a16:creationId xmlns:a16="http://schemas.microsoft.com/office/drawing/2014/main" id="{7E5A9559-1C56-21F6-1A4D-4A6B13A06DB8}"/>
+              </a:ext>
+            </a:extLst>
+          </p:cNvPr>
+          <p:cNvSpPr/>
+          <p:nvPr/>
+        </p:nvSpPr>
+        <p:spPr>
+          <a:xfrm rot="10800000">
+            <a:off x="6869138" y="2752975"/>
+            <a:ext cx="190701" cy="190701"/>
+          </a:xfrm>
+          <a:prstGeom prst="ellipse">
+            <a:avLst/>
+          </a:prstGeom>
+        </p:spPr>
+        <p:style>
+          <a:lnRef idx="2">
+            <a:schemeClr val="accent1">
+              <a:shade val="50000"/>
+            </a:schemeClr>
+          </a:lnRef>
+          <a:fillRef idx="1">
+            <a:schemeClr val="accent1"/>
+          </a:fillRef>
+          <a:effectRef idx="0">
+            <a:schemeClr val="accent1"/>
+          </a:effectRef>
+          <a:fontRef idx="minor">
+            <a:schemeClr val="lt1"/>
+          </a:fontRef>
+        </p:style>
+        <p:txBody>
+          <a:bodyPr rtlCol="0" anchor="ctr"/>
+          <a:lstStyle/>
+          <a:p>
+            <a:pPr algn="ctr"/>
+            <a:endParaRPr lang="pt-BR"/>
+          </a:p>
+        </p:txBody>
+      </p:sp>
+      <p:sp>
+        <p:nvSpPr>
+          <p:cNvPr id="95" name="Elipse 94">
+            <a:extLst>
+              <a:ext uri="{FF2B5EF4-FFF2-40B4-BE49-F238E27FC236}">
+                <a16:creationId xmlns:a16="http://schemas.microsoft.com/office/drawing/2014/main" id="{539D2F29-2705-36F6-2CFF-48C0131CC5D8}"/>
+              </a:ext>
+            </a:extLst>
+          </p:cNvPr>
+          <p:cNvSpPr/>
+          <p:nvPr/>
+        </p:nvSpPr>
+        <p:spPr>
+          <a:xfrm rot="10800000">
+            <a:off x="7373339" y="3045260"/>
+            <a:ext cx="190701" cy="190701"/>
+          </a:xfrm>
+          <a:prstGeom prst="ellipse">
+            <a:avLst/>
+          </a:prstGeom>
+        </p:spPr>
+        <p:style>
+          <a:lnRef idx="2">
+            <a:schemeClr val="accent1">
+              <a:shade val="50000"/>
+            </a:schemeClr>
+          </a:lnRef>
+          <a:fillRef idx="1">
+            <a:schemeClr val="accent1"/>
+          </a:fillRef>
+          <a:effectRef idx="0">
+            <a:schemeClr val="accent1"/>
+          </a:effectRef>
+          <a:fontRef idx="minor">
+            <a:schemeClr val="lt1"/>
+          </a:fontRef>
+        </p:style>
+        <p:txBody>
+          <a:bodyPr rtlCol="0" anchor="ctr"/>
+          <a:lstStyle/>
+          <a:p>
+            <a:pPr algn="ctr"/>
+            <a:endParaRPr lang="pt-BR"/>
+          </a:p>
+        </p:txBody>
+      </p:sp>
+      <p:sp>
+        <p:nvSpPr>
+          <p:cNvPr id="96" name="Elipse 95">
+            <a:extLst>
+              <a:ext uri="{FF2B5EF4-FFF2-40B4-BE49-F238E27FC236}">
+                <a16:creationId xmlns:a16="http://schemas.microsoft.com/office/drawing/2014/main" id="{47F3EE8E-DAF5-C1B6-A0D7-90F63F5A7C1B}"/>
+              </a:ext>
+            </a:extLst>
+          </p:cNvPr>
+          <p:cNvSpPr/>
+          <p:nvPr/>
+        </p:nvSpPr>
+        <p:spPr>
+          <a:xfrm rot="10800000">
+            <a:off x="7619275" y="3444126"/>
+            <a:ext cx="190701" cy="190701"/>
+          </a:xfrm>
+          <a:prstGeom prst="ellipse">
+            <a:avLst/>
+          </a:prstGeom>
+        </p:spPr>
+        <p:style>
+          <a:lnRef idx="2">
+            <a:schemeClr val="accent1">
+              <a:shade val="50000"/>
+            </a:schemeClr>
+          </a:lnRef>
+          <a:fillRef idx="1">
+            <a:schemeClr val="accent1"/>
+          </a:fillRef>
+          <a:effectRef idx="0">
+            <a:schemeClr val="accent1"/>
+          </a:effectRef>
+          <a:fontRef idx="minor">
+            <a:schemeClr val="lt1"/>
+          </a:fontRef>
+        </p:style>
+        <p:txBody>
+          <a:bodyPr rtlCol="0" anchor="ctr"/>
+          <a:lstStyle/>
+          <a:p>
+            <a:pPr algn="ctr"/>
+            <a:endParaRPr lang="pt-BR"/>
+          </a:p>
+        </p:txBody>
+      </p:sp>
+      <p:sp>
+        <p:nvSpPr>
+          <p:cNvPr id="99" name="Elipse 98">
+            <a:extLst>
+              <a:ext uri="{FF2B5EF4-FFF2-40B4-BE49-F238E27FC236}">
+                <a16:creationId xmlns:a16="http://schemas.microsoft.com/office/drawing/2014/main" id="{EAE91ADB-155B-2775-9ECF-8206E4851A34}"/>
+              </a:ext>
+            </a:extLst>
+          </p:cNvPr>
+          <p:cNvSpPr/>
+          <p:nvPr/>
+        </p:nvSpPr>
+        <p:spPr>
+          <a:xfrm rot="10800000">
+            <a:off x="7351612" y="3982886"/>
+            <a:ext cx="190701" cy="190701"/>
+          </a:xfrm>
+          <a:prstGeom prst="ellipse">
+            <a:avLst/>
+          </a:prstGeom>
+        </p:spPr>
+        <p:style>
+          <a:lnRef idx="2">
+            <a:schemeClr val="accent1">
+              <a:shade val="50000"/>
+            </a:schemeClr>
+          </a:lnRef>
+          <a:fillRef idx="1">
+            <a:schemeClr val="accent1"/>
+          </a:fillRef>
+          <a:effectRef idx="0">
+            <a:schemeClr val="accent1"/>
+          </a:effectRef>
+          <a:fontRef idx="minor">
+            <a:schemeClr val="lt1"/>
+          </a:fontRef>
+        </p:style>
+        <p:txBody>
+          <a:bodyPr rtlCol="0" anchor="ctr"/>
+          <a:lstStyle/>
+          <a:p>
+            <a:pPr algn="ctr"/>
+            <a:endParaRPr lang="pt-BR"/>
+          </a:p>
+        </p:txBody>
+      </p:sp>
+      <p:sp>
+        <p:nvSpPr>
+          <p:cNvPr id="101" name="Elipse 100">
+            <a:extLst>
+              <a:ext uri="{FF2B5EF4-FFF2-40B4-BE49-F238E27FC236}">
+                <a16:creationId xmlns:a16="http://schemas.microsoft.com/office/drawing/2014/main" id="{516DA28B-1C2C-1BF0-4D10-92F9972DDCEB}"/>
+              </a:ext>
+            </a:extLst>
+          </p:cNvPr>
+          <p:cNvSpPr/>
+          <p:nvPr/>
+        </p:nvSpPr>
+        <p:spPr>
+          <a:xfrm rot="10800000">
+            <a:off x="6723078" y="4240919"/>
+            <a:ext cx="190701" cy="190701"/>
+          </a:xfrm>
+          <a:prstGeom prst="ellipse">
+            <a:avLst/>
+          </a:prstGeom>
+        </p:spPr>
+        <p:style>
+          <a:lnRef idx="2">
+            <a:schemeClr val="accent1">
+              <a:shade val="50000"/>
+            </a:schemeClr>
+          </a:lnRef>
+          <a:fillRef idx="1">
+            <a:schemeClr val="accent1"/>
+          </a:fillRef>
+          <a:effectRef idx="0">
+            <a:schemeClr val="accent1"/>
+          </a:effectRef>
+          <a:fontRef idx="minor">
+            <a:schemeClr val="lt1"/>
+          </a:fontRef>
+        </p:style>
+        <p:txBody>
+          <a:bodyPr rtlCol="0" anchor="ctr"/>
+          <a:lstStyle/>
+          <a:p>
+            <a:pPr algn="ctr"/>
+            <a:endParaRPr lang="pt-BR"/>
+          </a:p>
+        </p:txBody>
+      </p:sp>
+      <p:sp>
+        <p:nvSpPr>
+          <p:cNvPr id="102" name="Elipse 101">
+            <a:extLst>
+              <a:ext uri="{FF2B5EF4-FFF2-40B4-BE49-F238E27FC236}">
+                <a16:creationId xmlns:a16="http://schemas.microsoft.com/office/drawing/2014/main" id="{66F25A08-4AEE-8326-6D2F-462554E54F7F}"/>
+              </a:ext>
+            </a:extLst>
+          </p:cNvPr>
+          <p:cNvSpPr/>
+          <p:nvPr/>
+        </p:nvSpPr>
+        <p:spPr>
+          <a:xfrm rot="10800000">
+            <a:off x="5983173" y="4425849"/>
+            <a:ext cx="190701" cy="190701"/>
+          </a:xfrm>
+          <a:prstGeom prst="ellipse">
+            <a:avLst/>
+          </a:prstGeom>
+        </p:spPr>
+        <p:style>
+          <a:lnRef idx="2">
+            <a:schemeClr val="accent1">
+              <a:shade val="50000"/>
+            </a:schemeClr>
+          </a:lnRef>
+          <a:fillRef idx="1">
+            <a:schemeClr val="accent1"/>
+          </a:fillRef>
+          <a:effectRef idx="0">
+            <a:schemeClr val="accent1"/>
+          </a:effectRef>
+          <a:fontRef idx="minor">
+            <a:schemeClr val="lt1"/>
+          </a:fontRef>
+        </p:style>
+        <p:txBody>
+          <a:bodyPr rtlCol="0" anchor="ctr"/>
+          <a:lstStyle/>
+          <a:p>
+            <a:pPr algn="ctr"/>
+            <a:endParaRPr lang="pt-BR"/>
+          </a:p>
+        </p:txBody>
+      </p:sp>
+      <p:sp>
+        <p:nvSpPr>
+          <p:cNvPr id="104" name="Elipse 103">
+            <a:extLst>
+              <a:ext uri="{FF2B5EF4-FFF2-40B4-BE49-F238E27FC236}">
+                <a16:creationId xmlns:a16="http://schemas.microsoft.com/office/drawing/2014/main" id="{9CC2B00F-0019-1B79-8BF7-01677739FA1B}"/>
+              </a:ext>
+            </a:extLst>
+          </p:cNvPr>
+          <p:cNvSpPr/>
+          <p:nvPr/>
+        </p:nvSpPr>
+        <p:spPr>
+          <a:xfrm rot="10800000">
+            <a:off x="6298806" y="4647795"/>
+            <a:ext cx="190701" cy="190701"/>
+          </a:xfrm>
+          <a:prstGeom prst="ellipse">
+            <a:avLst/>
+          </a:prstGeom>
+        </p:spPr>
+        <p:style>
+          <a:lnRef idx="2">
+            <a:schemeClr val="accent1">
+              <a:shade val="50000"/>
+            </a:schemeClr>
+          </a:lnRef>
+          <a:fillRef idx="1">
+            <a:schemeClr val="accent1"/>
+          </a:fillRef>
+          <a:effectRef idx="0">
+            <a:schemeClr val="accent1"/>
+          </a:effectRef>
+          <a:fontRef idx="minor">
+            <a:schemeClr val="lt1"/>
+          </a:fontRef>
+        </p:style>
+        <p:txBody>
+          <a:bodyPr rtlCol="0" anchor="ctr"/>
+          <a:lstStyle/>
+          <a:p>
+            <a:pPr algn="ctr"/>
+            <a:endParaRPr lang="pt-BR"/>
+          </a:p>
+        </p:txBody>
+      </p:sp>
+      <p:sp>
+        <p:nvSpPr>
+          <p:cNvPr id="107" name="Chave Direita 106">
+            <a:extLst>
+              <a:ext uri="{FF2B5EF4-FFF2-40B4-BE49-F238E27FC236}">
+                <a16:creationId xmlns:a16="http://schemas.microsoft.com/office/drawing/2014/main" id="{3E1D02A9-BB5C-9A62-9C52-6C853BF9F65A}"/>
+              </a:ext>
+            </a:extLst>
+          </p:cNvPr>
+          <p:cNvSpPr/>
+          <p:nvPr/>
+        </p:nvSpPr>
+        <p:spPr>
+          <a:xfrm rot="16200000">
+            <a:off x="6573612" y="1458068"/>
+            <a:ext cx="308060" cy="519876"/>
+          </a:xfrm>
+          <a:prstGeom prst="rightBrace">
+            <a:avLst/>
+          </a:prstGeom>
+          <a:ln w="28575"/>
+        </p:spPr>
+        <p:style>
+          <a:lnRef idx="1">
+            <a:schemeClr val="accent1"/>
+          </a:lnRef>
+          <a:fillRef idx="0">
+            <a:schemeClr val="accent1"/>
+          </a:fillRef>
+          <a:effectRef idx="0">
+            <a:schemeClr val="accent1"/>
+          </a:effectRef>
+          <a:fontRef idx="minor">
+            <a:schemeClr val="tx1"/>
+          </a:fontRef>
+        </p:style>
+        <p:txBody>
+          <a:bodyPr rtlCol="0" anchor="ctr"/>
+          <a:lstStyle/>
+          <a:p>
+            <a:pPr algn="ctr"/>
+            <a:endParaRPr lang="pt-BR"/>
+          </a:p>
+        </p:txBody>
+      </p:sp>
+      <p:sp>
+        <p:nvSpPr>
+          <p:cNvPr id="110" name="CaixaDeTexto 109">
+            <a:extLst>
+              <a:ext uri="{FF2B5EF4-FFF2-40B4-BE49-F238E27FC236}">
+                <a16:creationId xmlns:a16="http://schemas.microsoft.com/office/drawing/2014/main" id="{6F74ADED-4DBC-64D7-0E6B-0B655111CE36}"/>
+              </a:ext>
+            </a:extLst>
+          </p:cNvPr>
+          <p:cNvSpPr txBox="1"/>
+          <p:nvPr/>
+        </p:nvSpPr>
+        <p:spPr>
+          <a:xfrm>
+            <a:off x="5225318" y="1019174"/>
+            <a:ext cx="3136243" cy="523220"/>
+          </a:xfrm>
+          <a:prstGeom prst="rect">
+            <a:avLst/>
+          </a:prstGeom>
+          <a:noFill/>
+        </p:spPr>
+        <p:txBody>
+          <a:bodyPr wrap="none" rtlCol="0">
+            <a:spAutoFit/>
+          </a:bodyPr>
+          <a:lstStyle/>
+          <a:p>
+            <a:pPr algn="ctr"/>
+            <a:r>
+              <a:rPr lang="pt-BR" sz="1400" dirty="0" err="1"/>
+              <a:t>realizations</a:t>
+            </a:r>
+            <a:r>
+              <a:rPr lang="pt-BR" sz="1400" dirty="0"/>
+              <a:t> </a:t>
+            </a:r>
+            <a:r>
+              <a:rPr lang="pt-BR" sz="1400" dirty="0" err="1"/>
+              <a:t>reflect</a:t>
+            </a:r>
+            <a:r>
+              <a:rPr lang="pt-BR" sz="1400" dirty="0"/>
+              <a:t> </a:t>
+            </a:r>
+            <a:r>
+              <a:rPr lang="pt-BR" sz="1400" dirty="0" err="1"/>
+              <a:t>uncertainty</a:t>
+            </a:r>
+            <a:r>
+              <a:rPr lang="pt-BR" sz="1400" dirty="0"/>
+              <a:t> of model</a:t>
+            </a:r>
+          </a:p>
+          <a:p>
+            <a:pPr algn="ctr"/>
+            <a:r>
+              <a:rPr lang="pt-BR" sz="1400" dirty="0" err="1"/>
+              <a:t>decreasing</a:t>
+            </a:r>
+            <a:r>
+              <a:rPr lang="pt-BR" sz="1400" dirty="0"/>
+              <a:t> as more data </a:t>
+            </a:r>
+            <a:r>
+              <a:rPr lang="pt-BR" sz="1400" dirty="0" err="1"/>
+              <a:t>arrive</a:t>
+            </a:r>
+            <a:endParaRPr lang="pt-BR" sz="1400" dirty="0"/>
+          </a:p>
+        </p:txBody>
+      </p:sp>
+      <p:sp>
+        <p:nvSpPr>
+          <p:cNvPr id="113" name="Forma Livre: Forma 112">
+            <a:extLst>
+              <a:ext uri="{FF2B5EF4-FFF2-40B4-BE49-F238E27FC236}">
+                <a16:creationId xmlns:a16="http://schemas.microsoft.com/office/drawing/2014/main" id="{66BE3B02-2D73-CA25-F528-0CA703C099E4}"/>
+              </a:ext>
+            </a:extLst>
+          </p:cNvPr>
+          <p:cNvSpPr/>
+          <p:nvPr/>
+        </p:nvSpPr>
+        <p:spPr>
+          <a:xfrm>
+            <a:off x="5569524" y="1921707"/>
+            <a:ext cx="880171" cy="2826327"/>
+          </a:xfrm>
+          <a:custGeom>
+            <a:avLst/>
+            <a:gdLst>
+              <a:gd name="connsiteX0" fmla="*/ 0 w 880171"/>
+              <a:gd name="connsiteY0" fmla="*/ 2826327 h 2826327"/>
+              <a:gd name="connsiteX1" fmla="*/ 136915 w 880171"/>
+              <a:gd name="connsiteY1" fmla="*/ 2660073 h 2826327"/>
+              <a:gd name="connsiteX2" fmla="*/ 327619 w 880171"/>
+              <a:gd name="connsiteY2" fmla="*/ 2347123 h 2826327"/>
+              <a:gd name="connsiteX3" fmla="*/ 508543 w 880171"/>
+              <a:gd name="connsiteY3" fmla="*/ 1907037 h 2826327"/>
+              <a:gd name="connsiteX4" fmla="*/ 674798 w 880171"/>
+              <a:gd name="connsiteY4" fmla="*/ 1437613 h 2826327"/>
+              <a:gd name="connsiteX5" fmla="*/ 777484 w 880171"/>
+              <a:gd name="connsiteY5" fmla="*/ 889951 h 2826327"/>
+              <a:gd name="connsiteX6" fmla="*/ 816603 w 880171"/>
+              <a:gd name="connsiteY6" fmla="*/ 542772 h 2826327"/>
+              <a:gd name="connsiteX7" fmla="*/ 850832 w 880171"/>
+              <a:gd name="connsiteY7" fmla="*/ 288500 h 2826327"/>
+              <a:gd name="connsiteX8" fmla="*/ 880171 w 880171"/>
+              <a:gd name="connsiteY8" fmla="*/ 0 h 2826327"/>
+              <a:gd name="connsiteX9" fmla="*/ 875281 w 880171"/>
+              <a:gd name="connsiteY9" fmla="*/ 9780 h 2826327"/>
+            </a:gdLst>
+            <a:ahLst/>
+            <a:cxnLst>
+              <a:cxn ang="0">
+                <a:pos x="connsiteX0" y="connsiteY0"/>
+              </a:cxn>
+              <a:cxn ang="0">
+                <a:pos x="connsiteX1" y="connsiteY1"/>
+              </a:cxn>
+              <a:cxn ang="0">
+                <a:pos x="connsiteX2" y="connsiteY2"/>
+              </a:cxn>
+              <a:cxn ang="0">
+                <a:pos x="connsiteX3" y="connsiteY3"/>
+              </a:cxn>
+              <a:cxn ang="0">
+                <a:pos x="connsiteX4" y="connsiteY4"/>
+              </a:cxn>
+              <a:cxn ang="0">
+                <a:pos x="connsiteX5" y="connsiteY5"/>
+              </a:cxn>
+              <a:cxn ang="0">
+                <a:pos x="connsiteX6" y="connsiteY6"/>
+              </a:cxn>
+              <a:cxn ang="0">
+                <a:pos x="connsiteX7" y="connsiteY7"/>
+              </a:cxn>
+              <a:cxn ang="0">
+                <a:pos x="connsiteX8" y="connsiteY8"/>
+              </a:cxn>
+              <a:cxn ang="0">
+                <a:pos x="connsiteX9" y="connsiteY9"/>
+              </a:cxn>
+            </a:cxnLst>
+            <a:rect l="l" t="t" r="r" b="b"/>
+            <a:pathLst>
+              <a:path w="880171" h="2826327">
+                <a:moveTo>
+                  <a:pt x="0" y="2826327"/>
+                </a:moveTo>
+                <a:lnTo>
+                  <a:pt x="136915" y="2660073"/>
+                </a:lnTo>
+                <a:lnTo>
+                  <a:pt x="327619" y="2347123"/>
+                </a:lnTo>
+                <a:lnTo>
+                  <a:pt x="508543" y="1907037"/>
+                </a:lnTo>
+                <a:lnTo>
+                  <a:pt x="674798" y="1437613"/>
+                </a:lnTo>
+                <a:lnTo>
+                  <a:pt x="777484" y="889951"/>
+                </a:lnTo>
+                <a:lnTo>
+                  <a:pt x="816603" y="542772"/>
+                </a:lnTo>
+                <a:lnTo>
+                  <a:pt x="850832" y="288500"/>
+                </a:lnTo>
+                <a:lnTo>
+                  <a:pt x="880171" y="0"/>
+                </a:lnTo>
+                <a:lnTo>
+                  <a:pt x="875281" y="9780"/>
+                </a:lnTo>
+              </a:path>
+            </a:pathLst>
+          </a:custGeom>
+          <a:noFill/>
+        </p:spPr>
+        <p:style>
+          <a:lnRef idx="2">
+            <a:schemeClr val="accent1">
+              <a:shade val="50000"/>
+            </a:schemeClr>
+          </a:lnRef>
+          <a:fillRef idx="1">
+            <a:schemeClr val="accent1"/>
+          </a:fillRef>
+          <a:effectRef idx="0">
+            <a:schemeClr val="accent1"/>
+          </a:effectRef>
+          <a:fontRef idx="minor">
+            <a:schemeClr val="lt1"/>
+          </a:fontRef>
+        </p:style>
+        <p:txBody>
+          <a:bodyPr rtlCol="0" anchor="ctr"/>
+          <a:lstStyle/>
+          <a:p>
+            <a:pPr algn="ctr"/>
+            <a:endParaRPr lang="pt-BR"/>
+          </a:p>
+        </p:txBody>
+      </p:sp>
+      <p:sp>
+        <p:nvSpPr>
+          <p:cNvPr id="115" name="Forma Livre: Forma 114">
+            <a:extLst>
+              <a:ext uri="{FF2B5EF4-FFF2-40B4-BE49-F238E27FC236}">
+                <a16:creationId xmlns:a16="http://schemas.microsoft.com/office/drawing/2014/main" id="{98235B3F-97C3-7B66-5C99-9A72429A87FF}"/>
+              </a:ext>
+            </a:extLst>
+          </p:cNvPr>
+          <p:cNvSpPr/>
+          <p:nvPr/>
+        </p:nvSpPr>
+        <p:spPr>
+          <a:xfrm>
+            <a:off x="6987577" y="1911927"/>
+            <a:ext cx="1168672" cy="2840997"/>
+          </a:xfrm>
+          <a:custGeom>
+            <a:avLst/>
+            <a:gdLst>
+              <a:gd name="connsiteX0" fmla="*/ 1168672 w 1168672"/>
+              <a:gd name="connsiteY0" fmla="*/ 2840997 h 2840997"/>
+              <a:gd name="connsiteX1" fmla="*/ 1095324 w 1168672"/>
+              <a:gd name="connsiteY1" fmla="*/ 2327564 h 2840997"/>
+              <a:gd name="connsiteX2" fmla="*/ 992638 w 1168672"/>
+              <a:gd name="connsiteY2" fmla="*/ 1863029 h 2840997"/>
+              <a:gd name="connsiteX3" fmla="*/ 797044 w 1168672"/>
+              <a:gd name="connsiteY3" fmla="*/ 1286028 h 2840997"/>
+              <a:gd name="connsiteX4" fmla="*/ 488984 w 1168672"/>
+              <a:gd name="connsiteY4" fmla="*/ 718807 h 2840997"/>
+              <a:gd name="connsiteX5" fmla="*/ 176034 w 1168672"/>
+              <a:gd name="connsiteY5" fmla="*/ 244492 h 2840997"/>
+              <a:gd name="connsiteX6" fmla="*/ 0 w 1168672"/>
+              <a:gd name="connsiteY6" fmla="*/ 0 h 2840997"/>
+            </a:gdLst>
+            <a:ahLst/>
+            <a:cxnLst>
+              <a:cxn ang="0">
+                <a:pos x="connsiteX0" y="connsiteY0"/>
+              </a:cxn>
+              <a:cxn ang="0">
+                <a:pos x="connsiteX1" y="connsiteY1"/>
+              </a:cxn>
+              <a:cxn ang="0">
+                <a:pos x="connsiteX2" y="connsiteY2"/>
+              </a:cxn>
+              <a:cxn ang="0">
+                <a:pos x="connsiteX3" y="connsiteY3"/>
+              </a:cxn>
+              <a:cxn ang="0">
+                <a:pos x="connsiteX4" y="connsiteY4"/>
+              </a:cxn>
+              <a:cxn ang="0">
+                <a:pos x="connsiteX5" y="connsiteY5"/>
+              </a:cxn>
+              <a:cxn ang="0">
+                <a:pos x="connsiteX6" y="connsiteY6"/>
+              </a:cxn>
+            </a:cxnLst>
+            <a:rect l="l" t="t" r="r" b="b"/>
+            <a:pathLst>
+              <a:path w="1168672" h="2840997">
+                <a:moveTo>
+                  <a:pt x="1168672" y="2840997"/>
+                </a:moveTo>
+                <a:lnTo>
+                  <a:pt x="1095324" y="2327564"/>
+                </a:lnTo>
+                <a:lnTo>
+                  <a:pt x="992638" y="1863029"/>
+                </a:lnTo>
+                <a:lnTo>
+                  <a:pt x="797044" y="1286028"/>
+                </a:lnTo>
+                <a:lnTo>
+                  <a:pt x="488984" y="718807"/>
+                </a:lnTo>
+                <a:lnTo>
+                  <a:pt x="176034" y="244492"/>
+                </a:lnTo>
+                <a:lnTo>
+                  <a:pt x="0" y="0"/>
+                </a:lnTo>
+              </a:path>
+            </a:pathLst>
+          </a:custGeom>
+          <a:noFill/>
+        </p:spPr>
+        <p:style>
+          <a:lnRef idx="2">
+            <a:schemeClr val="accent1">
+              <a:shade val="50000"/>
+            </a:schemeClr>
+          </a:lnRef>
+          <a:fillRef idx="1">
+            <a:schemeClr val="accent1"/>
+          </a:fillRef>
+          <a:effectRef idx="0">
+            <a:schemeClr val="accent1"/>
+          </a:effectRef>
+          <a:fontRef idx="minor">
+            <a:schemeClr val="lt1"/>
+          </a:fontRef>
+        </p:style>
+        <p:txBody>
+          <a:bodyPr rtlCol="0" anchor="ctr"/>
+          <a:lstStyle/>
+          <a:p>
+            <a:pPr algn="ctr"/>
+            <a:endParaRPr lang="pt-BR"/>
+          </a:p>
+        </p:txBody>
+      </p:sp>
+      <p:sp>
+        <p:nvSpPr>
+          <p:cNvPr id="122" name="CaixaDeTexto 121">
+            <a:extLst>
+              <a:ext uri="{FF2B5EF4-FFF2-40B4-BE49-F238E27FC236}">
+                <a16:creationId xmlns:a16="http://schemas.microsoft.com/office/drawing/2014/main" id="{6D5378FA-1A3F-364C-8B5D-1081FEE88A68}"/>
+              </a:ext>
+            </a:extLst>
+          </p:cNvPr>
+          <p:cNvSpPr txBox="1"/>
+          <p:nvPr/>
+        </p:nvSpPr>
+        <p:spPr>
+          <a:xfrm>
+            <a:off x="2506819" y="324451"/>
+            <a:ext cx="1946495" cy="584775"/>
+          </a:xfrm>
+          <a:prstGeom prst="rect">
+            <a:avLst/>
+          </a:prstGeom>
+          <a:noFill/>
+        </p:spPr>
+        <p:txBody>
+          <a:bodyPr wrap="none" rtlCol="0">
+            <a:spAutoFit/>
+          </a:bodyPr>
+          <a:lstStyle/>
+          <a:p>
+            <a:pPr algn="ctr"/>
+            <a:r>
+              <a:rPr lang="pt-BR" sz="1600" b="1" dirty="0" err="1"/>
+              <a:t>Traditional</a:t>
+            </a:r>
+            <a:r>
+              <a:rPr lang="pt-BR" sz="1600" b="1" dirty="0"/>
+              <a:t> approach</a:t>
+            </a:r>
+          </a:p>
+          <a:p>
+            <a:pPr algn="ctr"/>
+            <a:r>
+              <a:rPr lang="pt-BR" sz="1600" b="1" dirty="0"/>
+              <a:t>“</a:t>
+            </a:r>
+            <a:r>
+              <a:rPr lang="pt-BR" sz="1600" b="1" dirty="0" err="1"/>
+              <a:t>chasing</a:t>
+            </a:r>
+            <a:r>
+              <a:rPr lang="pt-BR" sz="1600" b="1" dirty="0"/>
+              <a:t> </a:t>
+            </a:r>
+            <a:r>
+              <a:rPr lang="pt-BR" sz="1600" b="1" dirty="0" err="1"/>
+              <a:t>the</a:t>
+            </a:r>
+            <a:r>
+              <a:rPr lang="pt-BR" sz="1600" b="1" dirty="0"/>
+              <a:t> data”</a:t>
+            </a:r>
+          </a:p>
+        </p:txBody>
+      </p:sp>
+      <p:sp>
+        <p:nvSpPr>
+          <p:cNvPr id="123" name="CaixaDeTexto 122">
+            <a:extLst>
+              <a:ext uri="{FF2B5EF4-FFF2-40B4-BE49-F238E27FC236}">
+                <a16:creationId xmlns:a16="http://schemas.microsoft.com/office/drawing/2014/main" id="{128A5A9C-3DFA-25DA-5C5C-1EA560BA83D4}"/>
+              </a:ext>
+            </a:extLst>
+          </p:cNvPr>
+          <p:cNvSpPr txBox="1"/>
+          <p:nvPr/>
+        </p:nvSpPr>
+        <p:spPr>
+          <a:xfrm>
+            <a:off x="5789643" y="475674"/>
+            <a:ext cx="1787156" cy="338554"/>
+          </a:xfrm>
+          <a:prstGeom prst="rect">
+            <a:avLst/>
+          </a:prstGeom>
+          <a:noFill/>
+        </p:spPr>
+        <p:txBody>
+          <a:bodyPr wrap="none" rtlCol="0">
+            <a:spAutoFit/>
+          </a:bodyPr>
+          <a:lstStyle/>
+          <a:p>
+            <a:pPr algn="ctr"/>
+            <a:r>
+              <a:rPr lang="pt-BR" sz="1600" b="1" dirty="0" err="1"/>
+              <a:t>Bayesian</a:t>
+            </a:r>
+            <a:r>
+              <a:rPr lang="pt-BR" sz="1600" b="1" dirty="0"/>
+              <a:t> approach</a:t>
+            </a:r>
+          </a:p>
+        </p:txBody>
+      </p:sp>
+      <p:grpSp>
+        <p:nvGrpSpPr>
+          <p:cNvPr id="131" name="Agrupar 130">
+            <a:extLst>
+              <a:ext uri="{FF2B5EF4-FFF2-40B4-BE49-F238E27FC236}">
+                <a16:creationId xmlns:a16="http://schemas.microsoft.com/office/drawing/2014/main" id="{A8827C05-D5AC-DA37-6E39-B0D925CCFB37}"/>
+              </a:ext>
+            </a:extLst>
+          </p:cNvPr>
+          <p:cNvGrpSpPr/>
+          <p:nvPr/>
+        </p:nvGrpSpPr>
+        <p:grpSpPr>
+          <a:xfrm>
+            <a:off x="5789643" y="4684091"/>
+            <a:ext cx="2080341" cy="154294"/>
+            <a:chOff x="2769931" y="6156308"/>
+            <a:chExt cx="777852" cy="279534"/>
+          </a:xfrm>
+        </p:grpSpPr>
+        <p:cxnSp>
+          <p:nvCxnSpPr>
+            <p:cNvPr id="125" name="Conector reto 124">
+              <a:extLst>
+                <a:ext uri="{FF2B5EF4-FFF2-40B4-BE49-F238E27FC236}">
+                  <a16:creationId xmlns:a16="http://schemas.microsoft.com/office/drawing/2014/main" id="{90F0D619-2BCC-8580-1C91-E1E1B1575347}"/>
+                </a:ext>
+              </a:extLst>
+            </p:cNvPr>
+            <p:cNvCxnSpPr/>
+            <p:nvPr/>
+          </p:nvCxnSpPr>
+          <p:spPr>
+            <a:xfrm>
+              <a:off x="2769931" y="6156308"/>
+              <a:ext cx="0" cy="278721"/>
+            </a:xfrm>
+            <a:prstGeom prst="line">
+              <a:avLst/>
+            </a:prstGeom>
+            <a:ln w="19050"/>
+          </p:spPr>
+          <p:style>
+            <a:lnRef idx="1">
+              <a:schemeClr val="accent1"/>
+            </a:lnRef>
+            <a:fillRef idx="0">
+              <a:schemeClr val="accent1"/>
+            </a:fillRef>
+            <a:effectRef idx="0">
+              <a:schemeClr val="accent1"/>
+            </a:effectRef>
+            <a:fontRef idx="minor">
+              <a:schemeClr val="tx1"/>
+            </a:fontRef>
+          </p:style>
+        </p:cxnSp>
+        <p:cxnSp>
+          <p:nvCxnSpPr>
+            <p:cNvPr id="126" name="Conector reto 125">
+              <a:extLst>
+                <a:ext uri="{FF2B5EF4-FFF2-40B4-BE49-F238E27FC236}">
+                  <a16:creationId xmlns:a16="http://schemas.microsoft.com/office/drawing/2014/main" id="{9408D67D-A72C-2876-7978-009A58C66661}"/>
+                </a:ext>
+              </a:extLst>
+            </p:cNvPr>
+            <p:cNvCxnSpPr/>
+            <p:nvPr/>
+          </p:nvCxnSpPr>
+          <p:spPr>
+            <a:xfrm>
+              <a:off x="3547783" y="6157121"/>
+              <a:ext cx="0" cy="278721"/>
+            </a:xfrm>
+            <a:prstGeom prst="line">
+              <a:avLst/>
+            </a:prstGeom>
+            <a:ln w="19050"/>
+          </p:spPr>
+          <p:style>
+            <a:lnRef idx="1">
+              <a:schemeClr val="accent1"/>
+            </a:lnRef>
+            <a:fillRef idx="0">
+              <a:schemeClr val="accent1"/>
+            </a:fillRef>
+            <a:effectRef idx="0">
+              <a:schemeClr val="accent1"/>
+            </a:effectRef>
+            <a:fontRef idx="minor">
+              <a:schemeClr val="tx1"/>
+            </a:fontRef>
+          </p:style>
+        </p:cxnSp>
+        <p:cxnSp>
+          <p:nvCxnSpPr>
+            <p:cNvPr id="127" name="Conector reto 126">
+              <a:extLst>
+                <a:ext uri="{FF2B5EF4-FFF2-40B4-BE49-F238E27FC236}">
+                  <a16:creationId xmlns:a16="http://schemas.microsoft.com/office/drawing/2014/main" id="{2E60017C-1006-31F3-C809-2D909BBB7D45}"/>
+                </a:ext>
+              </a:extLst>
+            </p:cNvPr>
+            <p:cNvCxnSpPr>
+              <a:cxnSpLocks/>
+            </p:cNvCxnSpPr>
+            <p:nvPr/>
+          </p:nvCxnSpPr>
+          <p:spPr>
+            <a:xfrm flipH="1">
+              <a:off x="2777792" y="6295668"/>
+              <a:ext cx="760551" cy="0"/>
+            </a:xfrm>
+            <a:prstGeom prst="line">
+              <a:avLst/>
+            </a:prstGeom>
+            <a:ln w="19050"/>
+          </p:spPr>
+          <p:style>
+            <a:lnRef idx="1">
+              <a:schemeClr val="accent1"/>
+            </a:lnRef>
+            <a:fillRef idx="0">
+              <a:schemeClr val="accent1"/>
+            </a:fillRef>
+            <a:effectRef idx="0">
+              <a:schemeClr val="accent1"/>
+            </a:effectRef>
+            <a:fontRef idx="minor">
+              <a:schemeClr val="tx1"/>
+            </a:fontRef>
+          </p:style>
+        </p:cxnSp>
+      </p:grpSp>
+      <p:grpSp>
+        <p:nvGrpSpPr>
+          <p:cNvPr id="132" name="Agrupar 131">
+            <a:extLst>
+              <a:ext uri="{FF2B5EF4-FFF2-40B4-BE49-F238E27FC236}">
+                <a16:creationId xmlns:a16="http://schemas.microsoft.com/office/drawing/2014/main" id="{DA915705-D8A8-5D3A-C790-8B885F952517}"/>
+              </a:ext>
+            </a:extLst>
+          </p:cNvPr>
+          <p:cNvGrpSpPr/>
+          <p:nvPr/>
+        </p:nvGrpSpPr>
+        <p:grpSpPr>
+          <a:xfrm>
+            <a:off x="5907774" y="4461154"/>
+            <a:ext cx="2034803" cy="154294"/>
+            <a:chOff x="2769931" y="6156308"/>
+            <a:chExt cx="777852" cy="279534"/>
+          </a:xfrm>
+        </p:grpSpPr>
+        <p:cxnSp>
+          <p:nvCxnSpPr>
+            <p:cNvPr id="133" name="Conector reto 132">
+              <a:extLst>
+                <a:ext uri="{FF2B5EF4-FFF2-40B4-BE49-F238E27FC236}">
+                  <a16:creationId xmlns:a16="http://schemas.microsoft.com/office/drawing/2014/main" id="{183E9119-E9EA-DA44-A20D-0407C8B81AF1}"/>
+                </a:ext>
+              </a:extLst>
+            </p:cNvPr>
+            <p:cNvCxnSpPr/>
+            <p:nvPr/>
+          </p:nvCxnSpPr>
+          <p:spPr>
+            <a:xfrm>
+              <a:off x="2769931" y="6156308"/>
+              <a:ext cx="0" cy="278721"/>
+            </a:xfrm>
+            <a:prstGeom prst="line">
+              <a:avLst/>
+            </a:prstGeom>
+            <a:ln w="19050"/>
+          </p:spPr>
+          <p:style>
+            <a:lnRef idx="1">
+              <a:schemeClr val="accent1"/>
+            </a:lnRef>
+            <a:fillRef idx="0">
+              <a:schemeClr val="accent1"/>
+            </a:fillRef>
+            <a:effectRef idx="0">
+              <a:schemeClr val="accent1"/>
+            </a:effectRef>
+            <a:fontRef idx="minor">
+              <a:schemeClr val="tx1"/>
+            </a:fontRef>
+          </p:style>
+        </p:cxnSp>
+        <p:cxnSp>
+          <p:nvCxnSpPr>
+            <p:cNvPr id="134" name="Conector reto 133">
+              <a:extLst>
+                <a:ext uri="{FF2B5EF4-FFF2-40B4-BE49-F238E27FC236}">
+                  <a16:creationId xmlns:a16="http://schemas.microsoft.com/office/drawing/2014/main" id="{C8AA168A-201D-6BDA-DD58-3309E073648E}"/>
+                </a:ext>
+              </a:extLst>
+            </p:cNvPr>
+            <p:cNvCxnSpPr/>
+            <p:nvPr/>
+          </p:nvCxnSpPr>
+          <p:spPr>
+            <a:xfrm>
+              <a:off x="3547783" y="6157121"/>
+              <a:ext cx="0" cy="278721"/>
+            </a:xfrm>
+            <a:prstGeom prst="line">
+              <a:avLst/>
+            </a:prstGeom>
+            <a:ln w="19050"/>
+          </p:spPr>
+          <p:style>
+            <a:lnRef idx="1">
+              <a:schemeClr val="accent1"/>
+            </a:lnRef>
+            <a:fillRef idx="0">
+              <a:schemeClr val="accent1"/>
+            </a:fillRef>
+            <a:effectRef idx="0">
+              <a:schemeClr val="accent1"/>
+            </a:effectRef>
+            <a:fontRef idx="minor">
+              <a:schemeClr val="tx1"/>
+            </a:fontRef>
+          </p:style>
+        </p:cxnSp>
+        <p:cxnSp>
+          <p:nvCxnSpPr>
+            <p:cNvPr id="135" name="Conector reto 134">
+              <a:extLst>
+                <a:ext uri="{FF2B5EF4-FFF2-40B4-BE49-F238E27FC236}">
+                  <a16:creationId xmlns:a16="http://schemas.microsoft.com/office/drawing/2014/main" id="{C1FD4A64-2367-737E-CB27-79BD0B2DA834}"/>
+                </a:ext>
+              </a:extLst>
+            </p:cNvPr>
+            <p:cNvCxnSpPr>
+              <a:cxnSpLocks/>
+            </p:cNvCxnSpPr>
+            <p:nvPr/>
+          </p:nvCxnSpPr>
+          <p:spPr>
+            <a:xfrm flipH="1">
+              <a:off x="2777792" y="6295668"/>
+              <a:ext cx="760551" cy="0"/>
+            </a:xfrm>
+            <a:prstGeom prst="line">
+              <a:avLst/>
+            </a:prstGeom>
+            <a:ln w="19050"/>
+          </p:spPr>
+          <p:style>
+            <a:lnRef idx="1">
+              <a:schemeClr val="accent1"/>
+            </a:lnRef>
+            <a:fillRef idx="0">
+              <a:schemeClr val="accent1"/>
+            </a:fillRef>
+            <a:effectRef idx="0">
+              <a:schemeClr val="accent1"/>
+            </a:effectRef>
+            <a:fontRef idx="minor">
+              <a:schemeClr val="tx1"/>
+            </a:fontRef>
+          </p:style>
+        </p:cxnSp>
+      </p:grpSp>
+      <p:grpSp>
+        <p:nvGrpSpPr>
+          <p:cNvPr id="136" name="Agrupar 135">
+            <a:extLst>
+              <a:ext uri="{FF2B5EF4-FFF2-40B4-BE49-F238E27FC236}">
+                <a16:creationId xmlns:a16="http://schemas.microsoft.com/office/drawing/2014/main" id="{4F0BACDF-D184-401F-E2AA-F568F80F075F}"/>
+              </a:ext>
+            </a:extLst>
+          </p:cNvPr>
+          <p:cNvGrpSpPr/>
+          <p:nvPr/>
+        </p:nvGrpSpPr>
+        <p:grpSpPr>
+          <a:xfrm>
+            <a:off x="6096000" y="4263100"/>
+            <a:ext cx="1795780" cy="154294"/>
+            <a:chOff x="2769931" y="6156308"/>
+            <a:chExt cx="777852" cy="279534"/>
+          </a:xfrm>
+        </p:grpSpPr>
+        <p:cxnSp>
+          <p:nvCxnSpPr>
+            <p:cNvPr id="137" name="Conector reto 136">
+              <a:extLst>
+                <a:ext uri="{FF2B5EF4-FFF2-40B4-BE49-F238E27FC236}">
+                  <a16:creationId xmlns:a16="http://schemas.microsoft.com/office/drawing/2014/main" id="{5E57E06A-3593-F686-0ED1-841D65EFA075}"/>
+                </a:ext>
+              </a:extLst>
+            </p:cNvPr>
+            <p:cNvCxnSpPr/>
+            <p:nvPr/>
+          </p:nvCxnSpPr>
+          <p:spPr>
+            <a:xfrm>
+              <a:off x="2769931" y="6156308"/>
+              <a:ext cx="0" cy="278721"/>
+            </a:xfrm>
+            <a:prstGeom prst="line">
+              <a:avLst/>
+            </a:prstGeom>
+            <a:ln w="19050"/>
+          </p:spPr>
+          <p:style>
+            <a:lnRef idx="1">
+              <a:schemeClr val="accent1"/>
+            </a:lnRef>
+            <a:fillRef idx="0">
+              <a:schemeClr val="accent1"/>
+            </a:fillRef>
+            <a:effectRef idx="0">
+              <a:schemeClr val="accent1"/>
+            </a:effectRef>
+            <a:fontRef idx="minor">
+              <a:schemeClr val="tx1"/>
+            </a:fontRef>
+          </p:style>
+        </p:cxnSp>
+        <p:cxnSp>
+          <p:nvCxnSpPr>
+            <p:cNvPr id="138" name="Conector reto 137">
+              <a:extLst>
+                <a:ext uri="{FF2B5EF4-FFF2-40B4-BE49-F238E27FC236}">
+                  <a16:creationId xmlns:a16="http://schemas.microsoft.com/office/drawing/2014/main" id="{E32499BB-BA16-F359-F115-6C158C742527}"/>
+                </a:ext>
+              </a:extLst>
+            </p:cNvPr>
+            <p:cNvCxnSpPr/>
+            <p:nvPr/>
+          </p:nvCxnSpPr>
+          <p:spPr>
+            <a:xfrm>
+              <a:off x="3547783" y="6157121"/>
+              <a:ext cx="0" cy="278721"/>
+            </a:xfrm>
+            <a:prstGeom prst="line">
+              <a:avLst/>
+            </a:prstGeom>
+            <a:ln w="19050"/>
+          </p:spPr>
+          <p:style>
+            <a:lnRef idx="1">
+              <a:schemeClr val="accent1"/>
+            </a:lnRef>
+            <a:fillRef idx="0">
+              <a:schemeClr val="accent1"/>
+            </a:fillRef>
+            <a:effectRef idx="0">
+              <a:schemeClr val="accent1"/>
+            </a:effectRef>
+            <a:fontRef idx="minor">
+              <a:schemeClr val="tx1"/>
+            </a:fontRef>
+          </p:style>
+        </p:cxnSp>
+        <p:cxnSp>
+          <p:nvCxnSpPr>
+            <p:cNvPr id="139" name="Conector reto 138">
+              <a:extLst>
+                <a:ext uri="{FF2B5EF4-FFF2-40B4-BE49-F238E27FC236}">
+                  <a16:creationId xmlns:a16="http://schemas.microsoft.com/office/drawing/2014/main" id="{1233DF01-01CB-DF6D-62E2-2CAD52C48CB3}"/>
+                </a:ext>
+              </a:extLst>
+            </p:cNvPr>
+            <p:cNvCxnSpPr>
+              <a:cxnSpLocks/>
+            </p:cNvCxnSpPr>
+            <p:nvPr/>
+          </p:nvCxnSpPr>
+          <p:spPr>
+            <a:xfrm flipH="1">
+              <a:off x="2777792" y="6295668"/>
+              <a:ext cx="760551" cy="0"/>
+            </a:xfrm>
+            <a:prstGeom prst="line">
+              <a:avLst/>
+            </a:prstGeom>
+            <a:ln w="19050"/>
+          </p:spPr>
+          <p:style>
+            <a:lnRef idx="1">
+              <a:schemeClr val="accent1"/>
+            </a:lnRef>
+            <a:fillRef idx="0">
+              <a:schemeClr val="accent1"/>
+            </a:fillRef>
+            <a:effectRef idx="0">
+              <a:schemeClr val="accent1"/>
+            </a:effectRef>
+            <a:fontRef idx="minor">
+              <a:schemeClr val="tx1"/>
+            </a:fontRef>
+          </p:style>
+        </p:cxnSp>
+      </p:grpSp>
+      <p:grpSp>
+        <p:nvGrpSpPr>
+          <p:cNvPr id="140" name="Agrupar 139">
+            <a:extLst>
+              <a:ext uri="{FF2B5EF4-FFF2-40B4-BE49-F238E27FC236}">
+                <a16:creationId xmlns:a16="http://schemas.microsoft.com/office/drawing/2014/main" id="{1356086C-469C-B404-51F0-B58D15E9F6D7}"/>
+              </a:ext>
+            </a:extLst>
+          </p:cNvPr>
+          <p:cNvGrpSpPr/>
+          <p:nvPr/>
+        </p:nvGrpSpPr>
+        <p:grpSpPr>
+          <a:xfrm>
+            <a:off x="6298805" y="4001876"/>
+            <a:ext cx="1547099" cy="154294"/>
+            <a:chOff x="2769931" y="6156308"/>
+            <a:chExt cx="777852" cy="279534"/>
+          </a:xfrm>
+        </p:grpSpPr>
+        <p:cxnSp>
+          <p:nvCxnSpPr>
+            <p:cNvPr id="142" name="Conector reto 141">
+              <a:extLst>
+                <a:ext uri="{FF2B5EF4-FFF2-40B4-BE49-F238E27FC236}">
+                  <a16:creationId xmlns:a16="http://schemas.microsoft.com/office/drawing/2014/main" id="{8AA56451-DB03-963F-6AC7-DC1857C3B467}"/>
+                </a:ext>
+              </a:extLst>
+            </p:cNvPr>
+            <p:cNvCxnSpPr/>
+            <p:nvPr/>
+          </p:nvCxnSpPr>
+          <p:spPr>
+            <a:xfrm>
+              <a:off x="2769931" y="6156308"/>
+              <a:ext cx="0" cy="278721"/>
+            </a:xfrm>
+            <a:prstGeom prst="line">
+              <a:avLst/>
+            </a:prstGeom>
+            <a:ln w="19050"/>
+          </p:spPr>
+          <p:style>
+            <a:lnRef idx="1">
+              <a:schemeClr val="accent1"/>
+            </a:lnRef>
+            <a:fillRef idx="0">
+              <a:schemeClr val="accent1"/>
+            </a:fillRef>
+            <a:effectRef idx="0">
+              <a:schemeClr val="accent1"/>
+            </a:effectRef>
+            <a:fontRef idx="minor">
+              <a:schemeClr val="tx1"/>
+            </a:fontRef>
+          </p:style>
+        </p:cxnSp>
+        <p:cxnSp>
+          <p:nvCxnSpPr>
+            <p:cNvPr id="143" name="Conector reto 142">
+              <a:extLst>
+                <a:ext uri="{FF2B5EF4-FFF2-40B4-BE49-F238E27FC236}">
+                  <a16:creationId xmlns:a16="http://schemas.microsoft.com/office/drawing/2014/main" id="{E13F6BBD-6FE0-25C9-331D-0E38F224CBD0}"/>
+                </a:ext>
+              </a:extLst>
+            </p:cNvPr>
+            <p:cNvCxnSpPr/>
+            <p:nvPr/>
+          </p:nvCxnSpPr>
+          <p:spPr>
+            <a:xfrm>
+              <a:off x="3547783" y="6157121"/>
+              <a:ext cx="0" cy="278721"/>
+            </a:xfrm>
+            <a:prstGeom prst="line">
+              <a:avLst/>
+            </a:prstGeom>
+            <a:ln w="19050"/>
+          </p:spPr>
+          <p:style>
+            <a:lnRef idx="1">
+              <a:schemeClr val="accent1"/>
+            </a:lnRef>
+            <a:fillRef idx="0">
+              <a:schemeClr val="accent1"/>
+            </a:fillRef>
+            <a:effectRef idx="0">
+              <a:schemeClr val="accent1"/>
+            </a:effectRef>
+            <a:fontRef idx="minor">
+              <a:schemeClr val="tx1"/>
+            </a:fontRef>
+          </p:style>
+        </p:cxnSp>
+        <p:cxnSp>
+          <p:nvCxnSpPr>
+            <p:cNvPr id="144" name="Conector reto 143">
+              <a:extLst>
+                <a:ext uri="{FF2B5EF4-FFF2-40B4-BE49-F238E27FC236}">
+                  <a16:creationId xmlns:a16="http://schemas.microsoft.com/office/drawing/2014/main" id="{21D41A7C-6B44-4418-3A92-D9377014F3CB}"/>
+                </a:ext>
+              </a:extLst>
+            </p:cNvPr>
+            <p:cNvCxnSpPr>
+              <a:cxnSpLocks/>
+            </p:cNvCxnSpPr>
+            <p:nvPr/>
+          </p:nvCxnSpPr>
+          <p:spPr>
+            <a:xfrm flipH="1">
+              <a:off x="2777792" y="6295668"/>
+              <a:ext cx="760551" cy="0"/>
+            </a:xfrm>
+            <a:prstGeom prst="line">
+              <a:avLst/>
+            </a:prstGeom>
+            <a:ln w="19050"/>
+          </p:spPr>
+          <p:style>
+            <a:lnRef idx="1">
+              <a:schemeClr val="accent1"/>
+            </a:lnRef>
+            <a:fillRef idx="0">
+              <a:schemeClr val="accent1"/>
+            </a:fillRef>
+            <a:effectRef idx="0">
+              <a:schemeClr val="accent1"/>
+            </a:effectRef>
+            <a:fontRef idx="minor">
+              <a:schemeClr val="tx1"/>
+            </a:fontRef>
+          </p:style>
+        </p:cxnSp>
+      </p:grpSp>
+      <p:grpSp>
+        <p:nvGrpSpPr>
+          <p:cNvPr id="145" name="Agrupar 144">
+            <a:extLst>
+              <a:ext uri="{FF2B5EF4-FFF2-40B4-BE49-F238E27FC236}">
+                <a16:creationId xmlns:a16="http://schemas.microsoft.com/office/drawing/2014/main" id="{52CDB892-172F-D342-46AC-8007A88AEF42}"/>
+              </a:ext>
+            </a:extLst>
+          </p:cNvPr>
+          <p:cNvGrpSpPr/>
+          <p:nvPr/>
+        </p:nvGrpSpPr>
+        <p:grpSpPr>
+          <a:xfrm>
+            <a:off x="6438078" y="3463072"/>
+            <a:ext cx="1271440" cy="154294"/>
+            <a:chOff x="2769931" y="6156308"/>
+            <a:chExt cx="777852" cy="279534"/>
+          </a:xfrm>
+        </p:grpSpPr>
+        <p:cxnSp>
+          <p:nvCxnSpPr>
+            <p:cNvPr id="146" name="Conector reto 145">
+              <a:extLst>
+                <a:ext uri="{FF2B5EF4-FFF2-40B4-BE49-F238E27FC236}">
+                  <a16:creationId xmlns:a16="http://schemas.microsoft.com/office/drawing/2014/main" id="{1D0CED61-E2A1-27EF-56D7-3B8F739BF264}"/>
+                </a:ext>
+              </a:extLst>
+            </p:cNvPr>
+            <p:cNvCxnSpPr/>
+            <p:nvPr/>
+          </p:nvCxnSpPr>
+          <p:spPr>
+            <a:xfrm>
+              <a:off x="2769931" y="6156308"/>
+              <a:ext cx="0" cy="278721"/>
+            </a:xfrm>
+            <a:prstGeom prst="line">
+              <a:avLst/>
+            </a:prstGeom>
+            <a:ln w="19050"/>
+          </p:spPr>
+          <p:style>
+            <a:lnRef idx="1">
+              <a:schemeClr val="accent1"/>
+            </a:lnRef>
+            <a:fillRef idx="0">
+              <a:schemeClr val="accent1"/>
+            </a:fillRef>
+            <a:effectRef idx="0">
+              <a:schemeClr val="accent1"/>
+            </a:effectRef>
+            <a:fontRef idx="minor">
+              <a:schemeClr val="tx1"/>
+            </a:fontRef>
+          </p:style>
+        </p:cxnSp>
+        <p:cxnSp>
+          <p:nvCxnSpPr>
+            <p:cNvPr id="147" name="Conector reto 146">
+              <a:extLst>
+                <a:ext uri="{FF2B5EF4-FFF2-40B4-BE49-F238E27FC236}">
+                  <a16:creationId xmlns:a16="http://schemas.microsoft.com/office/drawing/2014/main" id="{72C44F5F-ECF4-82DD-8523-C48DDC77FCD9}"/>
+                </a:ext>
+              </a:extLst>
+            </p:cNvPr>
+            <p:cNvCxnSpPr/>
+            <p:nvPr/>
+          </p:nvCxnSpPr>
+          <p:spPr>
+            <a:xfrm>
+              <a:off x="3547783" y="6157121"/>
+              <a:ext cx="0" cy="278721"/>
+            </a:xfrm>
+            <a:prstGeom prst="line">
+              <a:avLst/>
+            </a:prstGeom>
+            <a:ln w="19050"/>
+          </p:spPr>
+          <p:style>
+            <a:lnRef idx="1">
+              <a:schemeClr val="accent1"/>
+            </a:lnRef>
+            <a:fillRef idx="0">
+              <a:schemeClr val="accent1"/>
+            </a:fillRef>
+            <a:effectRef idx="0">
+              <a:schemeClr val="accent1"/>
+            </a:effectRef>
+            <a:fontRef idx="minor">
+              <a:schemeClr val="tx1"/>
+            </a:fontRef>
+          </p:style>
+        </p:cxnSp>
+        <p:cxnSp>
+          <p:nvCxnSpPr>
+            <p:cNvPr id="149" name="Conector reto 148">
+              <a:extLst>
+                <a:ext uri="{FF2B5EF4-FFF2-40B4-BE49-F238E27FC236}">
+                  <a16:creationId xmlns:a16="http://schemas.microsoft.com/office/drawing/2014/main" id="{EF9C41AA-F001-E18A-06FC-5869F8CF07DD}"/>
+                </a:ext>
+              </a:extLst>
+            </p:cNvPr>
+            <p:cNvCxnSpPr>
+              <a:cxnSpLocks/>
+            </p:cNvCxnSpPr>
+            <p:nvPr/>
+          </p:nvCxnSpPr>
+          <p:spPr>
+            <a:xfrm flipH="1">
+              <a:off x="2777792" y="6295668"/>
+              <a:ext cx="760551" cy="0"/>
+            </a:xfrm>
+            <a:prstGeom prst="line">
+              <a:avLst/>
+            </a:prstGeom>
+            <a:ln w="19050"/>
+          </p:spPr>
+          <p:style>
+            <a:lnRef idx="1">
+              <a:schemeClr val="accent1"/>
+            </a:lnRef>
+            <a:fillRef idx="0">
+              <a:schemeClr val="accent1"/>
+            </a:fillRef>
+            <a:effectRef idx="0">
+              <a:schemeClr val="accent1"/>
+            </a:effectRef>
+            <a:fontRef idx="minor">
+              <a:schemeClr val="tx1"/>
+            </a:fontRef>
+          </p:style>
+        </p:cxnSp>
+      </p:grpSp>
+      <p:grpSp>
+        <p:nvGrpSpPr>
+          <p:cNvPr id="150" name="Agrupar 149">
+            <a:extLst>
+              <a:ext uri="{FF2B5EF4-FFF2-40B4-BE49-F238E27FC236}">
+                <a16:creationId xmlns:a16="http://schemas.microsoft.com/office/drawing/2014/main" id="{572E6668-38CA-91BE-B8C3-1DAAE4D09F40}"/>
+              </a:ext>
+            </a:extLst>
+          </p:cNvPr>
+          <p:cNvGrpSpPr/>
+          <p:nvPr/>
+        </p:nvGrpSpPr>
+        <p:grpSpPr>
+          <a:xfrm>
+            <a:off x="6480538" y="3064807"/>
+            <a:ext cx="1143545" cy="154294"/>
+            <a:chOff x="2769931" y="6156308"/>
+            <a:chExt cx="777852" cy="279534"/>
+          </a:xfrm>
+        </p:grpSpPr>
+        <p:cxnSp>
+          <p:nvCxnSpPr>
+            <p:cNvPr id="151" name="Conector reto 150">
+              <a:extLst>
+                <a:ext uri="{FF2B5EF4-FFF2-40B4-BE49-F238E27FC236}">
+                  <a16:creationId xmlns:a16="http://schemas.microsoft.com/office/drawing/2014/main" id="{635E1E27-9889-3AB2-7583-D798A9F82715}"/>
+                </a:ext>
+              </a:extLst>
+            </p:cNvPr>
+            <p:cNvCxnSpPr/>
+            <p:nvPr/>
+          </p:nvCxnSpPr>
+          <p:spPr>
+            <a:xfrm>
+              <a:off x="2769931" y="6156308"/>
+              <a:ext cx="0" cy="278721"/>
+            </a:xfrm>
+            <a:prstGeom prst="line">
+              <a:avLst/>
+            </a:prstGeom>
+            <a:ln w="19050"/>
+          </p:spPr>
+          <p:style>
+            <a:lnRef idx="1">
+              <a:schemeClr val="accent1"/>
+            </a:lnRef>
+            <a:fillRef idx="0">
+              <a:schemeClr val="accent1"/>
+            </a:fillRef>
+            <a:effectRef idx="0">
+              <a:schemeClr val="accent1"/>
+            </a:effectRef>
+            <a:fontRef idx="minor">
+              <a:schemeClr val="tx1"/>
+            </a:fontRef>
+          </p:style>
+        </p:cxnSp>
+        <p:cxnSp>
+          <p:nvCxnSpPr>
+            <p:cNvPr id="152" name="Conector reto 151">
+              <a:extLst>
+                <a:ext uri="{FF2B5EF4-FFF2-40B4-BE49-F238E27FC236}">
+                  <a16:creationId xmlns:a16="http://schemas.microsoft.com/office/drawing/2014/main" id="{718DA3D5-3B7A-081F-AA6A-3D539C059E25}"/>
+                </a:ext>
+              </a:extLst>
+            </p:cNvPr>
+            <p:cNvCxnSpPr/>
+            <p:nvPr/>
+          </p:nvCxnSpPr>
+          <p:spPr>
+            <a:xfrm>
+              <a:off x="3547783" y="6157121"/>
+              <a:ext cx="0" cy="278721"/>
+            </a:xfrm>
+            <a:prstGeom prst="line">
+              <a:avLst/>
+            </a:prstGeom>
+            <a:ln w="19050"/>
+          </p:spPr>
+          <p:style>
+            <a:lnRef idx="1">
+              <a:schemeClr val="accent1"/>
+            </a:lnRef>
+            <a:fillRef idx="0">
+              <a:schemeClr val="accent1"/>
+            </a:fillRef>
+            <a:effectRef idx="0">
+              <a:schemeClr val="accent1"/>
+            </a:effectRef>
+            <a:fontRef idx="minor">
+              <a:schemeClr val="tx1"/>
+            </a:fontRef>
+          </p:style>
+        </p:cxnSp>
+        <p:cxnSp>
+          <p:nvCxnSpPr>
+            <p:cNvPr id="153" name="Conector reto 152">
+              <a:extLst>
+                <a:ext uri="{FF2B5EF4-FFF2-40B4-BE49-F238E27FC236}">
+                  <a16:creationId xmlns:a16="http://schemas.microsoft.com/office/drawing/2014/main" id="{8930A255-CFFB-790F-50AE-ECF0CDF3F1FC}"/>
+                </a:ext>
+              </a:extLst>
+            </p:cNvPr>
+            <p:cNvCxnSpPr>
+              <a:cxnSpLocks/>
+            </p:cNvCxnSpPr>
+            <p:nvPr/>
+          </p:nvCxnSpPr>
+          <p:spPr>
+            <a:xfrm flipH="1">
+              <a:off x="2777792" y="6295668"/>
+              <a:ext cx="760551" cy="0"/>
+            </a:xfrm>
+            <a:prstGeom prst="line">
+              <a:avLst/>
+            </a:prstGeom>
+            <a:ln w="19050"/>
+          </p:spPr>
+          <p:style>
+            <a:lnRef idx="1">
+              <a:schemeClr val="accent1"/>
+            </a:lnRef>
+            <a:fillRef idx="0">
+              <a:schemeClr val="accent1"/>
+            </a:fillRef>
+            <a:effectRef idx="0">
+              <a:schemeClr val="accent1"/>
+            </a:effectRef>
+            <a:fontRef idx="minor">
+              <a:schemeClr val="tx1"/>
+            </a:fontRef>
+          </p:style>
+        </p:cxnSp>
+      </p:grpSp>
+      <p:grpSp>
+        <p:nvGrpSpPr>
+          <p:cNvPr id="154" name="Agrupar 153">
+            <a:extLst>
+              <a:ext uri="{FF2B5EF4-FFF2-40B4-BE49-F238E27FC236}">
+                <a16:creationId xmlns:a16="http://schemas.microsoft.com/office/drawing/2014/main" id="{D0056062-63CF-B80A-6A57-A0418AFA8DD8}"/>
+              </a:ext>
+            </a:extLst>
+          </p:cNvPr>
+          <p:cNvGrpSpPr/>
+          <p:nvPr/>
+        </p:nvGrpSpPr>
+        <p:grpSpPr>
+          <a:xfrm>
+            <a:off x="6568133" y="2777597"/>
+            <a:ext cx="896591" cy="154294"/>
+            <a:chOff x="2769931" y="6156308"/>
+            <a:chExt cx="777852" cy="279534"/>
+          </a:xfrm>
+        </p:grpSpPr>
+        <p:cxnSp>
+          <p:nvCxnSpPr>
+            <p:cNvPr id="155" name="Conector reto 154">
+              <a:extLst>
+                <a:ext uri="{FF2B5EF4-FFF2-40B4-BE49-F238E27FC236}">
+                  <a16:creationId xmlns:a16="http://schemas.microsoft.com/office/drawing/2014/main" id="{B4876B68-2F34-0B25-836F-C43209064E16}"/>
+                </a:ext>
+              </a:extLst>
+            </p:cNvPr>
+            <p:cNvCxnSpPr/>
+            <p:nvPr/>
+          </p:nvCxnSpPr>
+          <p:spPr>
+            <a:xfrm>
+              <a:off x="2769931" y="6156308"/>
+              <a:ext cx="0" cy="278721"/>
+            </a:xfrm>
+            <a:prstGeom prst="line">
+              <a:avLst/>
+            </a:prstGeom>
+            <a:ln w="19050"/>
+          </p:spPr>
+          <p:style>
+            <a:lnRef idx="1">
+              <a:schemeClr val="accent1"/>
+            </a:lnRef>
+            <a:fillRef idx="0">
+              <a:schemeClr val="accent1"/>
+            </a:fillRef>
+            <a:effectRef idx="0">
+              <a:schemeClr val="accent1"/>
+            </a:effectRef>
+            <a:fontRef idx="minor">
+              <a:schemeClr val="tx1"/>
+            </a:fontRef>
+          </p:style>
+        </p:cxnSp>
+        <p:cxnSp>
+          <p:nvCxnSpPr>
+            <p:cNvPr id="156" name="Conector reto 155">
+              <a:extLst>
+                <a:ext uri="{FF2B5EF4-FFF2-40B4-BE49-F238E27FC236}">
+                  <a16:creationId xmlns:a16="http://schemas.microsoft.com/office/drawing/2014/main" id="{F41B2FFA-8F80-9036-0FD5-5E3FB40998BA}"/>
+                </a:ext>
+              </a:extLst>
+            </p:cNvPr>
+            <p:cNvCxnSpPr/>
+            <p:nvPr/>
+          </p:nvCxnSpPr>
+          <p:spPr>
+            <a:xfrm>
+              <a:off x="3547783" y="6157121"/>
+              <a:ext cx="0" cy="278721"/>
+            </a:xfrm>
+            <a:prstGeom prst="line">
+              <a:avLst/>
+            </a:prstGeom>
+            <a:ln w="19050"/>
+          </p:spPr>
+          <p:style>
+            <a:lnRef idx="1">
+              <a:schemeClr val="accent1"/>
+            </a:lnRef>
+            <a:fillRef idx="0">
+              <a:schemeClr val="accent1"/>
+            </a:fillRef>
+            <a:effectRef idx="0">
+              <a:schemeClr val="accent1"/>
+            </a:effectRef>
+            <a:fontRef idx="minor">
+              <a:schemeClr val="tx1"/>
+            </a:fontRef>
+          </p:style>
+        </p:cxnSp>
+        <p:cxnSp>
+          <p:nvCxnSpPr>
+            <p:cNvPr id="157" name="Conector reto 156">
+              <a:extLst>
+                <a:ext uri="{FF2B5EF4-FFF2-40B4-BE49-F238E27FC236}">
+                  <a16:creationId xmlns:a16="http://schemas.microsoft.com/office/drawing/2014/main" id="{68F1E6ED-BFA8-DB8E-9DB0-E6A4C2D3F8BA}"/>
+                </a:ext>
+              </a:extLst>
+            </p:cNvPr>
+            <p:cNvCxnSpPr>
+              <a:cxnSpLocks/>
+            </p:cNvCxnSpPr>
+            <p:nvPr/>
+          </p:nvCxnSpPr>
+          <p:spPr>
+            <a:xfrm flipH="1">
+              <a:off x="2777792" y="6295668"/>
+              <a:ext cx="760551" cy="0"/>
+            </a:xfrm>
+            <a:prstGeom prst="line">
+              <a:avLst/>
+            </a:prstGeom>
+            <a:ln w="19050"/>
+          </p:spPr>
+          <p:style>
+            <a:lnRef idx="1">
+              <a:schemeClr val="accent1"/>
+            </a:lnRef>
+            <a:fillRef idx="0">
+              <a:schemeClr val="accent1"/>
+            </a:fillRef>
+            <a:effectRef idx="0">
+              <a:schemeClr val="accent1"/>
+            </a:effectRef>
+            <a:fontRef idx="minor">
+              <a:schemeClr val="tx1"/>
+            </a:fontRef>
+          </p:style>
+        </p:cxnSp>
+      </p:grpSp>
+      <p:grpSp>
+        <p:nvGrpSpPr>
+          <p:cNvPr id="158" name="Agrupar 157">
+            <a:extLst>
+              <a:ext uri="{FF2B5EF4-FFF2-40B4-BE49-F238E27FC236}">
+                <a16:creationId xmlns:a16="http://schemas.microsoft.com/office/drawing/2014/main" id="{D92A0561-A2AE-76A7-33A9-687FA6C1E4C7}"/>
+              </a:ext>
+            </a:extLst>
+          </p:cNvPr>
+          <p:cNvGrpSpPr/>
+          <p:nvPr/>
+        </p:nvGrpSpPr>
+        <p:grpSpPr>
+          <a:xfrm>
+            <a:off x="6609417" y="2462034"/>
+            <a:ext cx="685814" cy="154294"/>
+            <a:chOff x="2769931" y="6156308"/>
+            <a:chExt cx="777852" cy="279534"/>
+          </a:xfrm>
+        </p:grpSpPr>
+        <p:cxnSp>
+          <p:nvCxnSpPr>
+            <p:cNvPr id="159" name="Conector reto 158">
+              <a:extLst>
+                <a:ext uri="{FF2B5EF4-FFF2-40B4-BE49-F238E27FC236}">
+                  <a16:creationId xmlns:a16="http://schemas.microsoft.com/office/drawing/2014/main" id="{1B5F30A6-D8DD-F2E5-D8CE-9A446434DBE2}"/>
+                </a:ext>
+              </a:extLst>
+            </p:cNvPr>
+            <p:cNvCxnSpPr/>
+            <p:nvPr/>
+          </p:nvCxnSpPr>
+          <p:spPr>
+            <a:xfrm>
+              <a:off x="2769931" y="6156308"/>
+              <a:ext cx="0" cy="278721"/>
+            </a:xfrm>
+            <a:prstGeom prst="line">
+              <a:avLst/>
+            </a:prstGeom>
+            <a:ln w="19050"/>
+          </p:spPr>
+          <p:style>
+            <a:lnRef idx="1">
+              <a:schemeClr val="accent1"/>
+            </a:lnRef>
+            <a:fillRef idx="0">
+              <a:schemeClr val="accent1"/>
+            </a:fillRef>
+            <a:effectRef idx="0">
+              <a:schemeClr val="accent1"/>
+            </a:effectRef>
+            <a:fontRef idx="minor">
+              <a:schemeClr val="tx1"/>
+            </a:fontRef>
+          </p:style>
+        </p:cxnSp>
+        <p:cxnSp>
+          <p:nvCxnSpPr>
+            <p:cNvPr id="160" name="Conector reto 159">
+              <a:extLst>
+                <a:ext uri="{FF2B5EF4-FFF2-40B4-BE49-F238E27FC236}">
+                  <a16:creationId xmlns:a16="http://schemas.microsoft.com/office/drawing/2014/main" id="{D57A3FED-F210-5158-ACD5-EB80BB3327E0}"/>
+                </a:ext>
+              </a:extLst>
+            </p:cNvPr>
+            <p:cNvCxnSpPr/>
+            <p:nvPr/>
+          </p:nvCxnSpPr>
+          <p:spPr>
+            <a:xfrm>
+              <a:off x="3547783" y="6157121"/>
+              <a:ext cx="0" cy="278721"/>
+            </a:xfrm>
+            <a:prstGeom prst="line">
+              <a:avLst/>
+            </a:prstGeom>
+            <a:ln w="19050"/>
+          </p:spPr>
+          <p:style>
+            <a:lnRef idx="1">
+              <a:schemeClr val="accent1"/>
+            </a:lnRef>
+            <a:fillRef idx="0">
+              <a:schemeClr val="accent1"/>
+            </a:fillRef>
+            <a:effectRef idx="0">
+              <a:schemeClr val="accent1"/>
+            </a:effectRef>
+            <a:fontRef idx="minor">
+              <a:schemeClr val="tx1"/>
+            </a:fontRef>
+          </p:style>
+        </p:cxnSp>
+        <p:cxnSp>
+          <p:nvCxnSpPr>
+            <p:cNvPr id="161" name="Conector reto 160">
+              <a:extLst>
+                <a:ext uri="{FF2B5EF4-FFF2-40B4-BE49-F238E27FC236}">
+                  <a16:creationId xmlns:a16="http://schemas.microsoft.com/office/drawing/2014/main" id="{2C1855E7-7F27-6523-2ED2-24F5A6EB75D0}"/>
+                </a:ext>
+              </a:extLst>
+            </p:cNvPr>
+            <p:cNvCxnSpPr>
+              <a:cxnSpLocks/>
+            </p:cNvCxnSpPr>
+            <p:nvPr/>
+          </p:nvCxnSpPr>
+          <p:spPr>
+            <a:xfrm flipH="1">
+              <a:off x="2777792" y="6295668"/>
+              <a:ext cx="760551" cy="0"/>
+            </a:xfrm>
+            <a:prstGeom prst="line">
+              <a:avLst/>
+            </a:prstGeom>
+            <a:ln w="19050"/>
+          </p:spPr>
+          <p:style>
+            <a:lnRef idx="1">
+              <a:schemeClr val="accent1"/>
+            </a:lnRef>
+            <a:fillRef idx="0">
+              <a:schemeClr val="accent1"/>
+            </a:fillRef>
+            <a:effectRef idx="0">
+              <a:schemeClr val="accent1"/>
+            </a:effectRef>
+            <a:fontRef idx="minor">
+              <a:schemeClr val="tx1"/>
+            </a:fontRef>
+          </p:style>
+        </p:cxnSp>
+      </p:grpSp>
+      <p:grpSp>
+        <p:nvGrpSpPr>
+          <p:cNvPr id="162" name="Agrupar 161">
+            <a:extLst>
+              <a:ext uri="{FF2B5EF4-FFF2-40B4-BE49-F238E27FC236}">
+                <a16:creationId xmlns:a16="http://schemas.microsoft.com/office/drawing/2014/main" id="{7BCAA5F6-4F48-BCE4-02AA-2A24F63570E3}"/>
+              </a:ext>
+            </a:extLst>
+          </p:cNvPr>
+          <p:cNvGrpSpPr/>
+          <p:nvPr/>
+        </p:nvGrpSpPr>
+        <p:grpSpPr>
+          <a:xfrm>
+            <a:off x="6577194" y="2162096"/>
+            <a:ext cx="482645" cy="154294"/>
+            <a:chOff x="2769931" y="6156308"/>
+            <a:chExt cx="777852" cy="279534"/>
+          </a:xfrm>
+        </p:grpSpPr>
+        <p:cxnSp>
+          <p:nvCxnSpPr>
+            <p:cNvPr id="163" name="Conector reto 162">
+              <a:extLst>
+                <a:ext uri="{FF2B5EF4-FFF2-40B4-BE49-F238E27FC236}">
+                  <a16:creationId xmlns:a16="http://schemas.microsoft.com/office/drawing/2014/main" id="{09C2C352-0567-B083-1693-8D2DD1A35B9A}"/>
+                </a:ext>
+              </a:extLst>
+            </p:cNvPr>
+            <p:cNvCxnSpPr/>
+            <p:nvPr/>
+          </p:nvCxnSpPr>
+          <p:spPr>
+            <a:xfrm>
+              <a:off x="2769931" y="6156308"/>
+              <a:ext cx="0" cy="278721"/>
+            </a:xfrm>
+            <a:prstGeom prst="line">
+              <a:avLst/>
+            </a:prstGeom>
+            <a:ln w="19050"/>
+          </p:spPr>
+          <p:style>
+            <a:lnRef idx="1">
+              <a:schemeClr val="accent1"/>
+            </a:lnRef>
+            <a:fillRef idx="0">
+              <a:schemeClr val="accent1"/>
+            </a:fillRef>
+            <a:effectRef idx="0">
+              <a:schemeClr val="accent1"/>
+            </a:effectRef>
+            <a:fontRef idx="minor">
+              <a:schemeClr val="tx1"/>
+            </a:fontRef>
+          </p:style>
+        </p:cxnSp>
+        <p:cxnSp>
+          <p:nvCxnSpPr>
+            <p:cNvPr id="164" name="Conector reto 163">
+              <a:extLst>
+                <a:ext uri="{FF2B5EF4-FFF2-40B4-BE49-F238E27FC236}">
+                  <a16:creationId xmlns:a16="http://schemas.microsoft.com/office/drawing/2014/main" id="{7BA91A02-2526-25FD-9C2F-6FFCF43456E6}"/>
+                </a:ext>
+              </a:extLst>
+            </p:cNvPr>
+            <p:cNvCxnSpPr/>
+            <p:nvPr/>
+          </p:nvCxnSpPr>
+          <p:spPr>
+            <a:xfrm>
+              <a:off x="3547783" y="6157121"/>
+              <a:ext cx="0" cy="278721"/>
+            </a:xfrm>
+            <a:prstGeom prst="line">
+              <a:avLst/>
+            </a:prstGeom>
+            <a:ln w="19050"/>
+          </p:spPr>
+          <p:style>
+            <a:lnRef idx="1">
+              <a:schemeClr val="accent1"/>
+            </a:lnRef>
+            <a:fillRef idx="0">
+              <a:schemeClr val="accent1"/>
+            </a:fillRef>
+            <a:effectRef idx="0">
+              <a:schemeClr val="accent1"/>
+            </a:effectRef>
+            <a:fontRef idx="minor">
+              <a:schemeClr val="tx1"/>
+            </a:fontRef>
+          </p:style>
+        </p:cxnSp>
+        <p:cxnSp>
+          <p:nvCxnSpPr>
+            <p:cNvPr id="165" name="Conector reto 164">
+              <a:extLst>
+                <a:ext uri="{FF2B5EF4-FFF2-40B4-BE49-F238E27FC236}">
+                  <a16:creationId xmlns:a16="http://schemas.microsoft.com/office/drawing/2014/main" id="{179DACB6-4DDB-6103-1A53-7F6321847A1B}"/>
+                </a:ext>
+              </a:extLst>
+            </p:cNvPr>
+            <p:cNvCxnSpPr>
+              <a:cxnSpLocks/>
+            </p:cNvCxnSpPr>
+            <p:nvPr/>
+          </p:nvCxnSpPr>
+          <p:spPr>
+            <a:xfrm flipH="1">
+              <a:off x="2777792" y="6295668"/>
+              <a:ext cx="760551" cy="0"/>
+            </a:xfrm>
+            <a:prstGeom prst="line">
+              <a:avLst/>
+            </a:prstGeom>
+            <a:ln w="19050"/>
+          </p:spPr>
+          <p:style>
+            <a:lnRef idx="1">
+              <a:schemeClr val="accent1"/>
+            </a:lnRef>
+            <a:fillRef idx="0">
+              <a:schemeClr val="accent1"/>
+            </a:fillRef>
+            <a:effectRef idx="0">
+              <a:schemeClr val="accent1"/>
+            </a:effectRef>
+            <a:fontRef idx="minor">
+              <a:schemeClr val="tx1"/>
+            </a:fontRef>
+          </p:style>
+        </p:cxnSp>
+      </p:grpSp>
+      <p:grpSp>
+        <p:nvGrpSpPr>
+          <p:cNvPr id="166" name="Agrupar 165">
+            <a:extLst>
+              <a:ext uri="{FF2B5EF4-FFF2-40B4-BE49-F238E27FC236}">
+                <a16:creationId xmlns:a16="http://schemas.microsoft.com/office/drawing/2014/main" id="{3496BFA2-87AE-D006-3F58-8D76D092A031}"/>
+              </a:ext>
+            </a:extLst>
+          </p:cNvPr>
+          <p:cNvGrpSpPr/>
+          <p:nvPr/>
+        </p:nvGrpSpPr>
+        <p:grpSpPr>
+          <a:xfrm>
+            <a:off x="6532377" y="1870537"/>
+            <a:ext cx="410502" cy="154294"/>
+            <a:chOff x="2769931" y="6156308"/>
+            <a:chExt cx="777852" cy="279534"/>
+          </a:xfrm>
+        </p:grpSpPr>
+        <p:cxnSp>
+          <p:nvCxnSpPr>
+            <p:cNvPr id="167" name="Conector reto 166">
+              <a:extLst>
+                <a:ext uri="{FF2B5EF4-FFF2-40B4-BE49-F238E27FC236}">
+                  <a16:creationId xmlns:a16="http://schemas.microsoft.com/office/drawing/2014/main" id="{651504CC-BDBC-40DB-2F49-BFC5DD087C2E}"/>
+                </a:ext>
+              </a:extLst>
+            </p:cNvPr>
+            <p:cNvCxnSpPr/>
+            <p:nvPr/>
+          </p:nvCxnSpPr>
+          <p:spPr>
+            <a:xfrm>
+              <a:off x="2769931" y="6156308"/>
+              <a:ext cx="0" cy="278721"/>
+            </a:xfrm>
+            <a:prstGeom prst="line">
+              <a:avLst/>
+            </a:prstGeom>
+            <a:ln w="19050"/>
+          </p:spPr>
+          <p:style>
+            <a:lnRef idx="1">
+              <a:schemeClr val="accent1"/>
+            </a:lnRef>
+            <a:fillRef idx="0">
+              <a:schemeClr val="accent1"/>
+            </a:fillRef>
+            <a:effectRef idx="0">
+              <a:schemeClr val="accent1"/>
+            </a:effectRef>
+            <a:fontRef idx="minor">
+              <a:schemeClr val="tx1"/>
+            </a:fontRef>
+          </p:style>
+        </p:cxnSp>
+        <p:cxnSp>
+          <p:nvCxnSpPr>
+            <p:cNvPr id="168" name="Conector reto 167">
+              <a:extLst>
+                <a:ext uri="{FF2B5EF4-FFF2-40B4-BE49-F238E27FC236}">
+                  <a16:creationId xmlns:a16="http://schemas.microsoft.com/office/drawing/2014/main" id="{B8C320FC-2FEB-7C87-9903-6400738D080E}"/>
+                </a:ext>
+              </a:extLst>
+            </p:cNvPr>
+            <p:cNvCxnSpPr/>
+            <p:nvPr/>
+          </p:nvCxnSpPr>
+          <p:spPr>
+            <a:xfrm>
+              <a:off x="3547783" y="6157121"/>
+              <a:ext cx="0" cy="278721"/>
+            </a:xfrm>
+            <a:prstGeom prst="line">
+              <a:avLst/>
+            </a:prstGeom>
+            <a:ln w="19050"/>
+          </p:spPr>
+          <p:style>
+            <a:lnRef idx="1">
+              <a:schemeClr val="accent1"/>
+            </a:lnRef>
+            <a:fillRef idx="0">
+              <a:schemeClr val="accent1"/>
+            </a:fillRef>
+            <a:effectRef idx="0">
+              <a:schemeClr val="accent1"/>
+            </a:effectRef>
+            <a:fontRef idx="minor">
+              <a:schemeClr val="tx1"/>
+            </a:fontRef>
+          </p:style>
+        </p:cxnSp>
+        <p:cxnSp>
+          <p:nvCxnSpPr>
+            <p:cNvPr id="169" name="Conector reto 168">
+              <a:extLst>
+                <a:ext uri="{FF2B5EF4-FFF2-40B4-BE49-F238E27FC236}">
+                  <a16:creationId xmlns:a16="http://schemas.microsoft.com/office/drawing/2014/main" id="{7E0E7DCC-F1B1-7A41-0EBC-7FDFE6F3C19F}"/>
+                </a:ext>
+              </a:extLst>
+            </p:cNvPr>
+            <p:cNvCxnSpPr>
+              <a:cxnSpLocks/>
+            </p:cNvCxnSpPr>
+            <p:nvPr/>
+          </p:nvCxnSpPr>
+          <p:spPr>
+            <a:xfrm flipH="1">
+              <a:off x="2777792" y="6295668"/>
+              <a:ext cx="760551" cy="0"/>
+            </a:xfrm>
+            <a:prstGeom prst="line">
+              <a:avLst/>
+            </a:prstGeom>
+            <a:ln w="19050"/>
+          </p:spPr>
+          <p:style>
+            <a:lnRef idx="1">
+              <a:schemeClr val="accent1"/>
+            </a:lnRef>
+            <a:fillRef idx="0">
+              <a:schemeClr val="accent1"/>
+            </a:fillRef>
+            <a:effectRef idx="0">
+              <a:schemeClr val="accent1"/>
+            </a:effectRef>
+            <a:fontRef idx="minor">
+              <a:schemeClr val="tx1"/>
+            </a:fontRef>
+          </p:style>
+        </p:cxnSp>
+      </p:grpSp>
+      <p:grpSp>
+        <p:nvGrpSpPr>
+          <p:cNvPr id="170" name="Agrupar 169">
+            <a:extLst>
+              <a:ext uri="{FF2B5EF4-FFF2-40B4-BE49-F238E27FC236}">
+                <a16:creationId xmlns:a16="http://schemas.microsoft.com/office/drawing/2014/main" id="{367AC6F8-F9DA-156C-6293-2B3C17F48618}"/>
+              </a:ext>
+            </a:extLst>
+          </p:cNvPr>
+          <p:cNvGrpSpPr/>
+          <p:nvPr/>
+        </p:nvGrpSpPr>
+        <p:grpSpPr>
+          <a:xfrm>
+            <a:off x="5414864" y="5241944"/>
+            <a:ext cx="499618" cy="154294"/>
+            <a:chOff x="2769931" y="6156308"/>
+            <a:chExt cx="777852" cy="279534"/>
+          </a:xfrm>
+        </p:grpSpPr>
+        <p:cxnSp>
+          <p:nvCxnSpPr>
+            <p:cNvPr id="171" name="Conector reto 170">
+              <a:extLst>
+                <a:ext uri="{FF2B5EF4-FFF2-40B4-BE49-F238E27FC236}">
+                  <a16:creationId xmlns:a16="http://schemas.microsoft.com/office/drawing/2014/main" id="{E5FA872B-3621-76BC-312D-4FB2DEA56AEE}"/>
+                </a:ext>
+              </a:extLst>
+            </p:cNvPr>
+            <p:cNvCxnSpPr/>
+            <p:nvPr/>
+          </p:nvCxnSpPr>
+          <p:spPr>
+            <a:xfrm>
+              <a:off x="2769931" y="6156308"/>
+              <a:ext cx="0" cy="278721"/>
+            </a:xfrm>
+            <a:prstGeom prst="line">
+              <a:avLst/>
+            </a:prstGeom>
+            <a:ln w="19050"/>
+          </p:spPr>
+          <p:style>
+            <a:lnRef idx="1">
+              <a:schemeClr val="accent1"/>
+            </a:lnRef>
+            <a:fillRef idx="0">
+              <a:schemeClr val="accent1"/>
+            </a:fillRef>
+            <a:effectRef idx="0">
+              <a:schemeClr val="accent1"/>
+            </a:effectRef>
+            <a:fontRef idx="minor">
+              <a:schemeClr val="tx1"/>
+            </a:fontRef>
+          </p:style>
+        </p:cxnSp>
+        <p:cxnSp>
+          <p:nvCxnSpPr>
+            <p:cNvPr id="172" name="Conector reto 171">
+              <a:extLst>
+                <a:ext uri="{FF2B5EF4-FFF2-40B4-BE49-F238E27FC236}">
+                  <a16:creationId xmlns:a16="http://schemas.microsoft.com/office/drawing/2014/main" id="{7F7B3932-A6A1-5473-0C6A-D4FC88D04628}"/>
+                </a:ext>
+              </a:extLst>
+            </p:cNvPr>
+            <p:cNvCxnSpPr/>
+            <p:nvPr/>
+          </p:nvCxnSpPr>
+          <p:spPr>
+            <a:xfrm>
+              <a:off x="3547783" y="6157121"/>
+              <a:ext cx="0" cy="278721"/>
+            </a:xfrm>
+            <a:prstGeom prst="line">
+              <a:avLst/>
+            </a:prstGeom>
+            <a:ln w="19050"/>
+          </p:spPr>
+          <p:style>
+            <a:lnRef idx="1">
+              <a:schemeClr val="accent1"/>
+            </a:lnRef>
+            <a:fillRef idx="0">
+              <a:schemeClr val="accent1"/>
+            </a:fillRef>
+            <a:effectRef idx="0">
+              <a:schemeClr val="accent1"/>
+            </a:effectRef>
+            <a:fontRef idx="minor">
+              <a:schemeClr val="tx1"/>
+            </a:fontRef>
+          </p:style>
+        </p:cxnSp>
+        <p:cxnSp>
+          <p:nvCxnSpPr>
+            <p:cNvPr id="173" name="Conector reto 172">
+              <a:extLst>
+                <a:ext uri="{FF2B5EF4-FFF2-40B4-BE49-F238E27FC236}">
+                  <a16:creationId xmlns:a16="http://schemas.microsoft.com/office/drawing/2014/main" id="{298CC1CD-B41B-C152-3F78-097229BB5441}"/>
+                </a:ext>
+              </a:extLst>
+            </p:cNvPr>
+            <p:cNvCxnSpPr>
+              <a:cxnSpLocks/>
+            </p:cNvCxnSpPr>
+            <p:nvPr/>
+          </p:nvCxnSpPr>
+          <p:spPr>
+            <a:xfrm flipH="1">
+              <a:off x="2777792" y="6295668"/>
+              <a:ext cx="760551" cy="0"/>
+            </a:xfrm>
+            <a:prstGeom prst="line">
+              <a:avLst/>
+            </a:prstGeom>
+            <a:ln w="19050"/>
+          </p:spPr>
+          <p:style>
+            <a:lnRef idx="1">
+              <a:schemeClr val="accent1"/>
+            </a:lnRef>
+            <a:fillRef idx="0">
+              <a:schemeClr val="accent1"/>
+            </a:fillRef>
+            <a:effectRef idx="0">
+              <a:schemeClr val="accent1"/>
+            </a:effectRef>
+            <a:fontRef idx="minor">
+              <a:schemeClr val="tx1"/>
+            </a:fontRef>
+          </p:style>
+        </p:cxnSp>
+      </p:grpSp>
+      <p:sp>
+        <p:nvSpPr>
+          <p:cNvPr id="174" name="Elipse 173">
+            <a:extLst>
+              <a:ext uri="{FF2B5EF4-FFF2-40B4-BE49-F238E27FC236}">
+                <a16:creationId xmlns:a16="http://schemas.microsoft.com/office/drawing/2014/main" id="{C341BDCC-6688-C79C-CE47-5A49248A3252}"/>
+              </a:ext>
+            </a:extLst>
+          </p:cNvPr>
+          <p:cNvSpPr/>
+          <p:nvPr/>
+        </p:nvSpPr>
+        <p:spPr>
+          <a:xfrm rot="10800000">
+            <a:off x="5581256" y="5213648"/>
+            <a:ext cx="190701" cy="190701"/>
+          </a:xfrm>
+          <a:prstGeom prst="ellipse">
+            <a:avLst/>
+          </a:prstGeom>
+        </p:spPr>
+        <p:style>
+          <a:lnRef idx="2">
+            <a:schemeClr val="accent1">
+              <a:shade val="50000"/>
+            </a:schemeClr>
+          </a:lnRef>
+          <a:fillRef idx="1">
+            <a:schemeClr val="accent1"/>
+          </a:fillRef>
+          <a:effectRef idx="0">
+            <a:schemeClr val="accent1"/>
+          </a:effectRef>
+          <a:fontRef idx="minor">
+            <a:schemeClr val="lt1"/>
+          </a:fontRef>
+        </p:style>
+        <p:txBody>
+          <a:bodyPr rtlCol="0" anchor="ctr"/>
+          <a:lstStyle/>
+          <a:p>
+            <a:pPr algn="ctr"/>
+            <a:endParaRPr lang="pt-BR"/>
+          </a:p>
+        </p:txBody>
+      </p:sp>
+      <p:sp>
+        <p:nvSpPr>
+          <p:cNvPr id="175" name="CaixaDeTexto 174">
+            <a:extLst>
+              <a:ext uri="{FF2B5EF4-FFF2-40B4-BE49-F238E27FC236}">
+                <a16:creationId xmlns:a16="http://schemas.microsoft.com/office/drawing/2014/main" id="{780F37EB-181B-7205-E1C6-A0B931FA51B6}"/>
+              </a:ext>
+            </a:extLst>
+          </p:cNvPr>
+          <p:cNvSpPr txBox="1"/>
+          <p:nvPr/>
+        </p:nvSpPr>
+        <p:spPr>
+          <a:xfrm>
+            <a:off x="5983172" y="5149065"/>
+            <a:ext cx="2485680" cy="307777"/>
+          </a:xfrm>
+          <a:prstGeom prst="rect">
+            <a:avLst/>
+          </a:prstGeom>
+          <a:noFill/>
+        </p:spPr>
+        <p:txBody>
+          <a:bodyPr wrap="none" rtlCol="0">
+            <a:spAutoFit/>
+          </a:bodyPr>
+          <a:lstStyle/>
+          <a:p>
+            <a:r>
+              <a:rPr lang="pt-BR" sz="1400" dirty="0"/>
+              <a:t>= </a:t>
+            </a:r>
+            <a:r>
+              <a:rPr lang="pt-BR" sz="1400" dirty="0" err="1"/>
+              <a:t>uncertain</a:t>
+            </a:r>
+            <a:r>
+              <a:rPr lang="pt-BR" sz="1400" dirty="0"/>
+              <a:t> model </a:t>
+            </a:r>
+            <a:r>
+              <a:rPr lang="pt-BR" sz="1400" dirty="0" err="1"/>
+              <a:t>around</a:t>
+            </a:r>
+            <a:r>
+              <a:rPr lang="pt-BR" sz="1400" dirty="0"/>
+              <a:t> data </a:t>
+            </a:r>
+          </a:p>
+        </p:txBody>
+      </p:sp>
+    </p:spTree>
+    <p:extLst>
+      <p:ext uri="{BB962C8B-B14F-4D97-AF65-F5344CB8AC3E}">
+        <p14:creationId xmlns:p14="http://schemas.microsoft.com/office/powerpoint/2010/main" val="294333902"/>
+      </p:ext>
+    </p:extLst>
+  </p:cSld>
+  <p:clrMapOvr>
+    <a:masterClrMapping/>
+  </p:clrMapOvr>
+</p:sld>
+</file>
+
+<file path=ppt/slides/slide31.xml><?xml version="1.0" encoding="utf-8"?>
+<p:sld xmlns:a="http://schemas.openxmlformats.org/drawingml/2006/main" xmlns:r="http://schemas.openxmlformats.org/officeDocument/2006/relationships" xmlns:p="http://schemas.openxmlformats.org/presentationml/2006/main">
+  <p:cSld>
+    <p:spTree>
+      <p:nvGrpSpPr>
+        <p:cNvPr id="1" name=""/>
+        <p:cNvGrpSpPr/>
+        <p:nvPr/>
+      </p:nvGrpSpPr>
+      <p:grpSpPr>
+        <a:xfrm>
+          <a:off x="0" y="0"/>
+          <a:ext cx="0" cy="0"/>
+          <a:chOff x="0" y="0"/>
+          <a:chExt cx="0" cy="0"/>
+        </a:xfrm>
+      </p:grpSpPr>
       <p:pic>
         <p:nvPicPr>
           <p:cNvPr id="4" name="Imagem 3"/>
@@ -30823,7 +34833,7 @@
 </p:sld>
 </file>
 
-<file path=ppt/slides/slide31.xml><?xml version="1.0" encoding="utf-8"?>
+<file path=ppt/slides/slide32.xml><?xml version="1.0" encoding="utf-8"?>
 <p:sld xmlns:a="http://schemas.openxmlformats.org/drawingml/2006/main" xmlns:r="http://schemas.openxmlformats.org/officeDocument/2006/relationships" xmlns:p="http://schemas.openxmlformats.org/presentationml/2006/main">
   <p:cSld>
     <p:spTree>

</xml_diff>